<commit_message>
small changes to 2021 presentation
</commit_message>
<xml_diff>
--- a/presentations/MOI-CONCEPTS-2021/Soontiens_Sutherland_drift_DFO-MOI.pptx
+++ b/presentations/MOI-CONCEPTS-2021/Soontiens_Sutherland_drift_DFO-MOI.pptx
@@ -13,6 +13,13 @@
     <p:sldId id="261" r:id="rId10"/>
     <p:sldId id="262" r:id="rId11"/>
     <p:sldId id="263" r:id="rId12"/>
+    <p:sldId id="264" r:id="rId13"/>
+    <p:sldId id="265" r:id="rId14"/>
+    <p:sldId id="266" r:id="rId15"/>
+    <p:sldId id="267" r:id="rId16"/>
+    <p:sldId id="268" r:id="rId17"/>
+    <p:sldId id="269" r:id="rId18"/>
+    <p:sldId id="270" r:id="rId19"/>
   </p:sldIdLst>
   <p:sldSz cx="9144000" cy="6858000" type="screen4x3"/>
   <p:notesSz cx="6858000" cy="9144000"/>
@@ -342,7 +349,7 @@
           <a:p>
             <a:fld id="{6F037ADB-4FB9-482D-A1A4-E1F489B212F5}" type="datetimeFigureOut">
               <a:rPr lang="en-US" smtClean="0"/>
-              <a:t>9/28/21</a:t>
+              <a:t>10/5/21</a:t>
             </a:fld>
             <a:endParaRPr lang="en-US" dirty="0"/>
           </a:p>
@@ -489,7 +496,7 @@
           <a:p>
             <a:fld id="{6F037ADB-4FB9-482D-A1A4-E1F489B212F5}" type="datetimeFigureOut">
               <a:rPr lang="en-US" smtClean="0"/>
-              <a:t>9/28/21</a:t>
+              <a:t>10/5/21</a:t>
             </a:fld>
             <a:endParaRPr lang="en-US"/>
           </a:p>
@@ -692,7 +699,7 @@
           <a:p>
             <a:fld id="{6F037ADB-4FB9-482D-A1A4-E1F489B212F5}" type="datetimeFigureOut">
               <a:rPr lang="en-US" smtClean="0"/>
-              <a:t>9/28/21</a:t>
+              <a:t>10/5/21</a:t>
             </a:fld>
             <a:endParaRPr lang="en-US"/>
           </a:p>
@@ -1079,6 +1086,730 @@
 </p:sld>
 </file>
 
+<file path=ppt/slides/slide10.xml><?xml version="1.0" encoding="utf-8"?>
+<p:sld xmlns:a="http://schemas.openxmlformats.org/drawingml/2006/main" xmlns:r="http://schemas.openxmlformats.org/officeDocument/2006/relationships" xmlns:p="http://schemas.openxmlformats.org/presentationml/2006/main">
+  <p:cSld>
+    <p:spTree>
+      <p:nvGrpSpPr>
+        <p:cNvPr id="1" name=""/>
+        <p:cNvGrpSpPr/>
+        <p:nvPr/>
+      </p:nvGrpSpPr>
+      <p:grpSpPr>
+        <a:xfrm>
+          <a:off x="0" y="0"/>
+          <a:ext cx="0" cy="0"/>
+          <a:chOff x="0" y="0"/>
+          <a:chExt cx="0" cy="0"/>
+        </a:xfrm>
+      </p:grpSpPr>
+      <p:sp>
+        <p:nvSpPr>
+          <p:cNvPr id="2" name="Title 1">
+            <a:extLst>
+              <a:ext uri="{FF2B5EF4-FFF2-40B4-BE49-F238E27FC236}">
+                <a16:creationId xmlns:a16="http://schemas.microsoft.com/office/drawing/2014/main" id="{8058D311-CAA8-844C-B273-7FC3480C4A43}"/>
+              </a:ext>
+            </a:extLst>
+          </p:cNvPr>
+          <p:cNvSpPr>
+            <a:spLocks noGrp="1"/>
+          </p:cNvSpPr>
+          <p:nvPr>
+            <p:ph type="title"/>
+          </p:nvPr>
+        </p:nvSpPr>
+        <p:spPr/>
+        <p:txBody>
+          <a:bodyPr/>
+          <a:lstStyle/>
+          <a:p>
+            <a:r>
+              <a:rPr lang="en-CA" dirty="0"/>
+              <a:t>FSLE – Gulf of St. Lawrence</a:t>
+            </a:r>
+          </a:p>
+        </p:txBody>
+      </p:sp>
+      <mc:AlternateContent xmlns:mc="http://schemas.openxmlformats.org/markup-compatibility/2006">
+        <mc:Choice xmlns:a14="http://schemas.microsoft.com/office/drawing/2010/main" Requires="a14">
+          <p:sp>
+            <p:nvSpPr>
+              <p:cNvPr id="3" name="Content Placeholder 2">
+                <a:extLst>
+                  <a:ext uri="{FF2B5EF4-FFF2-40B4-BE49-F238E27FC236}">
+                    <a16:creationId xmlns:a16="http://schemas.microsoft.com/office/drawing/2014/main" id="{2D8EA8B2-F406-5144-9AAE-84F14A9580F3}"/>
+                  </a:ext>
+                </a:extLst>
+              </p:cNvPr>
+              <p:cNvSpPr>
+                <a:spLocks noGrp="1"/>
+              </p:cNvSpPr>
+              <p:nvPr>
+                <p:ph idx="1"/>
+              </p:nvPr>
+            </p:nvSpPr>
+            <p:spPr/>
+            <p:txBody>
+              <a:bodyPr>
+                <a:normAutofit fontScale="92500" lnSpcReduction="10000"/>
+              </a:bodyPr>
+              <a:lstStyle/>
+              <a:p>
+                <a:r>
+                  <a:rPr lang="en-CA" dirty="0"/>
+                  <a:t>Calculate FSLE from 232 drifters deployed (26796 unique pairs) in the Gulf of St. Lawrence</a:t>
+                </a:r>
+              </a:p>
+              <a:p>
+                <a:r>
+                  <a:rPr lang="en-CA" dirty="0"/>
+                  <a:t>Set </a:t>
+                </a:r>
+                <a14:m>
+                  <m:oMath xmlns:m="http://schemas.openxmlformats.org/officeDocument/2006/math">
+                    <m:sSub>
+                      <m:sSubPr>
+                        <m:ctrlPr>
+                          <a:rPr lang="en-US" b="0" i="1" smtClean="0">
+                            <a:latin typeface="Cambria Math" panose="02040503050406030204" pitchFamily="18" charset="0"/>
+                          </a:rPr>
+                        </m:ctrlPr>
+                      </m:sSubPr>
+                      <m:e>
+                        <m:r>
+                          <a:rPr lang="en-US" b="0" i="1" smtClean="0">
+                            <a:latin typeface="Cambria Math" panose="02040503050406030204" pitchFamily="18" charset="0"/>
+                          </a:rPr>
+                          <m:t>𝑑</m:t>
+                        </m:r>
+                      </m:e>
+                      <m:sub>
+                        <m:r>
+                          <a:rPr lang="en-US" b="0" i="1" smtClean="0">
+                            <a:latin typeface="Cambria Math" panose="02040503050406030204" pitchFamily="18" charset="0"/>
+                          </a:rPr>
+                          <m:t>0</m:t>
+                        </m:r>
+                      </m:sub>
+                    </m:sSub>
+                    <m:r>
+                      <a:rPr lang="en-US" b="0" i="0" smtClean="0">
+                        <a:latin typeface="Cambria Math" panose="02040503050406030204" pitchFamily="18" charset="0"/>
+                      </a:rPr>
+                      <m:t>=100</m:t>
+                    </m:r>
+                  </m:oMath>
+                </a14:m>
+                <a:r>
+                  <a:rPr lang="en-CA" dirty="0"/>
+                  <a:t> m and </a:t>
+                </a:r>
+                <a14:m>
+                  <m:oMath xmlns:m="http://schemas.openxmlformats.org/officeDocument/2006/math">
+                    <m:r>
+                      <a:rPr lang="en-US" b="0" i="1" smtClean="0">
+                        <a:latin typeface="Cambria Math" panose="02040503050406030204" pitchFamily="18" charset="0"/>
+                      </a:rPr>
+                      <m:t>𝑟</m:t>
+                    </m:r>
+                    <m:r>
+                      <a:rPr lang="en-US" b="0" i="1" smtClean="0">
+                        <a:latin typeface="Cambria Math" panose="02040503050406030204" pitchFamily="18" charset="0"/>
+                      </a:rPr>
+                      <m:t>=</m:t>
+                    </m:r>
+                    <m:rad>
+                      <m:radPr>
+                        <m:degHide m:val="on"/>
+                        <m:ctrlPr>
+                          <a:rPr lang="en-US" b="0" i="1" smtClean="0">
+                            <a:latin typeface="Cambria Math" panose="02040503050406030204" pitchFamily="18" charset="0"/>
+                          </a:rPr>
+                        </m:ctrlPr>
+                      </m:radPr>
+                      <m:deg/>
+                      <m:e>
+                        <m:r>
+                          <a:rPr lang="en-US" b="0" i="1" smtClean="0">
+                            <a:latin typeface="Cambria Math" panose="02040503050406030204" pitchFamily="18" charset="0"/>
+                          </a:rPr>
+                          <m:t>2</m:t>
+                        </m:r>
+                      </m:e>
+                    </m:rad>
+                  </m:oMath>
+                </a14:m>
+                <a:endParaRPr lang="en-CA" dirty="0"/>
+              </a:p>
+              <a:p>
+                <a:r>
+                  <a:rPr lang="en-CA" dirty="0"/>
+                  <a:t>Calculate FSLE from simulated trajectories (MLDP particle tracking software) using 3 model configurations</a:t>
+                </a:r>
+              </a:p>
+              <a:p>
+                <a:pPr marL="971550" lvl="1" indent="-514350">
+                  <a:buFont typeface="+mj-lt"/>
+                  <a:buAutoNum type="arabicPeriod"/>
+                </a:pPr>
+                <a:r>
+                  <a:rPr lang="en-CA" dirty="0"/>
+                  <a:t>CIOPSE + HRDPS </a:t>
+                </a:r>
+              </a:p>
+              <a:p>
+                <a:pPr marL="971550" lvl="1" indent="-514350">
+                  <a:buFont typeface="+mj-lt"/>
+                  <a:buAutoNum type="arabicPeriod"/>
+                </a:pPr>
+                <a:r>
+                  <a:rPr lang="en-CA" dirty="0"/>
+                  <a:t>GSL500 + HRDPS </a:t>
+                </a:r>
+              </a:p>
+              <a:p>
+                <a:pPr marL="971550" lvl="1" indent="-514350">
+                  <a:buFont typeface="+mj-lt"/>
+                  <a:buAutoNum type="arabicPeriod"/>
+                </a:pPr>
+                <a:r>
+                  <a:rPr lang="en-CA" dirty="0"/>
+                  <a:t>GSL500 + RELOC</a:t>
+                </a:r>
+              </a:p>
+              <a:p>
+                <a:endParaRPr lang="en-CA" dirty="0"/>
+              </a:p>
+              <a:p>
+                <a:endParaRPr lang="en-CA" dirty="0"/>
+              </a:p>
+              <a:p>
+                <a:endParaRPr lang="en-CA" dirty="0"/>
+              </a:p>
+            </p:txBody>
+          </p:sp>
+        </mc:Choice>
+        <mc:Fallback>
+          <p:sp>
+            <p:nvSpPr>
+              <p:cNvPr id="3" name="Content Placeholder 2">
+                <a:extLst>
+                  <a:ext uri="{FF2B5EF4-FFF2-40B4-BE49-F238E27FC236}">
+                    <a16:creationId xmlns:a16="http://schemas.microsoft.com/office/drawing/2014/main" id="{2D8EA8B2-F406-5144-9AAE-84F14A9580F3}"/>
+                  </a:ext>
+                </a:extLst>
+              </p:cNvPr>
+              <p:cNvSpPr>
+                <a:spLocks noGrp="1" noRot="1" noChangeAspect="1" noMove="1" noResize="1" noEditPoints="1" noAdjustHandles="1" noChangeArrowheads="1" noChangeShapeType="1" noTextEdit="1"/>
+              </p:cNvSpPr>
+              <p:nvPr>
+                <p:ph idx="1"/>
+              </p:nvPr>
+            </p:nvSpPr>
+            <p:spPr>
+              <a:blipFill>
+                <a:blip r:embed="rId2"/>
+                <a:stretch>
+                  <a:fillRect l="-1698" t="-2521" b="-3081"/>
+                </a:stretch>
+              </a:blipFill>
+            </p:spPr>
+            <p:txBody>
+              <a:bodyPr/>
+              <a:lstStyle/>
+              <a:p>
+                <a:r>
+                  <a:rPr lang="en-CA">
+                    <a:noFill/>
+                  </a:rPr>
+                  <a:t> </a:t>
+                </a:r>
+              </a:p>
+            </p:txBody>
+          </p:sp>
+        </mc:Fallback>
+      </mc:AlternateContent>
+    </p:spTree>
+    <p:extLst>
+      <p:ext uri="{BB962C8B-B14F-4D97-AF65-F5344CB8AC3E}">
+        <p14:creationId xmlns:p14="http://schemas.microsoft.com/office/powerpoint/2010/main" val="2273072772"/>
+      </p:ext>
+    </p:extLst>
+  </p:cSld>
+  <p:clrMapOvr>
+    <a:masterClrMapping/>
+  </p:clrMapOvr>
+</p:sld>
+</file>
+
+<file path=ppt/slides/slide11.xml><?xml version="1.0" encoding="utf-8"?>
+<p:sld xmlns:a="http://schemas.openxmlformats.org/drawingml/2006/main" xmlns:r="http://schemas.openxmlformats.org/officeDocument/2006/relationships" xmlns:p="http://schemas.openxmlformats.org/presentationml/2006/main">
+  <p:cSld>
+    <p:spTree>
+      <p:nvGrpSpPr>
+        <p:cNvPr id="1" name=""/>
+        <p:cNvGrpSpPr/>
+        <p:nvPr/>
+      </p:nvGrpSpPr>
+      <p:grpSpPr>
+        <a:xfrm>
+          <a:off x="0" y="0"/>
+          <a:ext cx="0" cy="0"/>
+          <a:chOff x="0" y="0"/>
+          <a:chExt cx="0" cy="0"/>
+        </a:xfrm>
+      </p:grpSpPr>
+      <p:sp>
+        <p:nvSpPr>
+          <p:cNvPr id="2" name="Title 1">
+            <a:extLst>
+              <a:ext uri="{FF2B5EF4-FFF2-40B4-BE49-F238E27FC236}">
+                <a16:creationId xmlns:a16="http://schemas.microsoft.com/office/drawing/2014/main" id="{A8BDAEC8-8A68-1E4F-A8CA-703AFD78CF5F}"/>
+              </a:ext>
+            </a:extLst>
+          </p:cNvPr>
+          <p:cNvSpPr>
+            <a:spLocks noGrp="1"/>
+          </p:cNvSpPr>
+          <p:nvPr>
+            <p:ph type="title"/>
+          </p:nvPr>
+        </p:nvSpPr>
+        <p:spPr/>
+        <p:txBody>
+          <a:bodyPr/>
+          <a:lstStyle/>
+          <a:p>
+            <a:r>
+              <a:rPr lang="en-CA" dirty="0"/>
+              <a:t>FSLE: CIOPSE + HRDPS</a:t>
+            </a:r>
+          </a:p>
+        </p:txBody>
+      </p:sp>
+      <p:pic>
+        <p:nvPicPr>
+          <p:cNvPr id="5" name="Content Placeholder 4">
+            <a:extLst>
+              <a:ext uri="{FF2B5EF4-FFF2-40B4-BE49-F238E27FC236}">
+                <a16:creationId xmlns:a16="http://schemas.microsoft.com/office/drawing/2014/main" id="{165CC40B-D9F9-5A4E-B959-D15186399D8B}"/>
+              </a:ext>
+            </a:extLst>
+          </p:cNvPr>
+          <p:cNvPicPr>
+            <a:picLocks noGrp="1" noChangeAspect="1"/>
+          </p:cNvPicPr>
+          <p:nvPr>
+            <p:ph idx="1"/>
+          </p:nvPr>
+        </p:nvPicPr>
+        <p:blipFill>
+          <a:blip r:embed="rId2">
+            <a:extLst>
+              <a:ext uri="{28A0092B-C50C-407E-A947-70E740481C1C}">
+                <a14:useLocalDpi xmlns:a14="http://schemas.microsoft.com/office/drawing/2010/main" val="0"/>
+              </a:ext>
+            </a:extLst>
+          </a:blip>
+          <a:stretch>
+            <a:fillRect/>
+          </a:stretch>
+        </p:blipFill>
+        <p:spPr>
+          <a:xfrm>
+            <a:off x="2512502" y="1600200"/>
+            <a:ext cx="4118996" cy="4525963"/>
+          </a:xfrm>
+        </p:spPr>
+      </p:pic>
+    </p:spTree>
+    <p:extLst>
+      <p:ext uri="{BB962C8B-B14F-4D97-AF65-F5344CB8AC3E}">
+        <p14:creationId xmlns:p14="http://schemas.microsoft.com/office/powerpoint/2010/main" val="679001275"/>
+      </p:ext>
+    </p:extLst>
+  </p:cSld>
+  <p:clrMapOvr>
+    <a:masterClrMapping/>
+  </p:clrMapOvr>
+</p:sld>
+</file>
+
+<file path=ppt/slides/slide12.xml><?xml version="1.0" encoding="utf-8"?>
+<p:sld xmlns:a="http://schemas.openxmlformats.org/drawingml/2006/main" xmlns:r="http://schemas.openxmlformats.org/officeDocument/2006/relationships" xmlns:p="http://schemas.openxmlformats.org/presentationml/2006/main">
+  <p:cSld>
+    <p:spTree>
+      <p:nvGrpSpPr>
+        <p:cNvPr id="1" name=""/>
+        <p:cNvGrpSpPr/>
+        <p:nvPr/>
+      </p:nvGrpSpPr>
+      <p:grpSpPr>
+        <a:xfrm>
+          <a:off x="0" y="0"/>
+          <a:ext cx="0" cy="0"/>
+          <a:chOff x="0" y="0"/>
+          <a:chExt cx="0" cy="0"/>
+        </a:xfrm>
+      </p:grpSpPr>
+      <p:sp>
+        <p:nvSpPr>
+          <p:cNvPr id="2" name="Title 1">
+            <a:extLst>
+              <a:ext uri="{FF2B5EF4-FFF2-40B4-BE49-F238E27FC236}">
+                <a16:creationId xmlns:a16="http://schemas.microsoft.com/office/drawing/2014/main" id="{96D8972D-CF09-EF48-9459-41D7DE392652}"/>
+              </a:ext>
+            </a:extLst>
+          </p:cNvPr>
+          <p:cNvSpPr>
+            <a:spLocks noGrp="1"/>
+          </p:cNvSpPr>
+          <p:nvPr>
+            <p:ph type="title"/>
+          </p:nvPr>
+        </p:nvSpPr>
+        <p:spPr/>
+        <p:txBody>
+          <a:bodyPr/>
+          <a:lstStyle/>
+          <a:p>
+            <a:r>
+              <a:rPr lang="en-CA" dirty="0"/>
+              <a:t>FSLE: GSL500 + HRDPS</a:t>
+            </a:r>
+          </a:p>
+        </p:txBody>
+      </p:sp>
+      <p:pic>
+        <p:nvPicPr>
+          <p:cNvPr id="5" name="Content Placeholder 4">
+            <a:extLst>
+              <a:ext uri="{FF2B5EF4-FFF2-40B4-BE49-F238E27FC236}">
+                <a16:creationId xmlns:a16="http://schemas.microsoft.com/office/drawing/2014/main" id="{970C5E7A-122A-B14F-8DDE-96A4D3305138}"/>
+              </a:ext>
+            </a:extLst>
+          </p:cNvPr>
+          <p:cNvPicPr>
+            <a:picLocks noGrp="1" noChangeAspect="1"/>
+          </p:cNvPicPr>
+          <p:nvPr>
+            <p:ph idx="1"/>
+          </p:nvPr>
+        </p:nvPicPr>
+        <p:blipFill>
+          <a:blip r:embed="rId2">
+            <a:extLst>
+              <a:ext uri="{28A0092B-C50C-407E-A947-70E740481C1C}">
+                <a14:useLocalDpi xmlns:a14="http://schemas.microsoft.com/office/drawing/2010/main" val="0"/>
+              </a:ext>
+            </a:extLst>
+          </a:blip>
+          <a:stretch>
+            <a:fillRect/>
+          </a:stretch>
+        </p:blipFill>
+        <p:spPr>
+          <a:xfrm>
+            <a:off x="2512502" y="1600200"/>
+            <a:ext cx="4118996" cy="4525963"/>
+          </a:xfrm>
+        </p:spPr>
+      </p:pic>
+    </p:spTree>
+    <p:extLst>
+      <p:ext uri="{BB962C8B-B14F-4D97-AF65-F5344CB8AC3E}">
+        <p14:creationId xmlns:p14="http://schemas.microsoft.com/office/powerpoint/2010/main" val="1782880595"/>
+      </p:ext>
+    </p:extLst>
+  </p:cSld>
+  <p:clrMapOvr>
+    <a:masterClrMapping/>
+  </p:clrMapOvr>
+</p:sld>
+</file>
+
+<file path=ppt/slides/slide13.xml><?xml version="1.0" encoding="utf-8"?>
+<p:sld xmlns:a="http://schemas.openxmlformats.org/drawingml/2006/main" xmlns:r="http://schemas.openxmlformats.org/officeDocument/2006/relationships" xmlns:p="http://schemas.openxmlformats.org/presentationml/2006/main">
+  <p:cSld>
+    <p:spTree>
+      <p:nvGrpSpPr>
+        <p:cNvPr id="1" name=""/>
+        <p:cNvGrpSpPr/>
+        <p:nvPr/>
+      </p:nvGrpSpPr>
+      <p:grpSpPr>
+        <a:xfrm>
+          <a:off x="0" y="0"/>
+          <a:ext cx="0" cy="0"/>
+          <a:chOff x="0" y="0"/>
+          <a:chExt cx="0" cy="0"/>
+        </a:xfrm>
+      </p:grpSpPr>
+      <p:sp>
+        <p:nvSpPr>
+          <p:cNvPr id="2" name="Title 1">
+            <a:extLst>
+              <a:ext uri="{FF2B5EF4-FFF2-40B4-BE49-F238E27FC236}">
+                <a16:creationId xmlns:a16="http://schemas.microsoft.com/office/drawing/2014/main" id="{E2A0656B-91E8-FD4B-ACF6-FDC4A6ADE7EF}"/>
+              </a:ext>
+            </a:extLst>
+          </p:cNvPr>
+          <p:cNvSpPr>
+            <a:spLocks noGrp="1"/>
+          </p:cNvSpPr>
+          <p:nvPr>
+            <p:ph type="title"/>
+          </p:nvPr>
+        </p:nvSpPr>
+        <p:spPr/>
+        <p:txBody>
+          <a:bodyPr/>
+          <a:lstStyle/>
+          <a:p>
+            <a:r>
+              <a:rPr lang="en-CA" dirty="0"/>
+              <a:t>FSLE: GSL500 + RELOC</a:t>
+            </a:r>
+          </a:p>
+        </p:txBody>
+      </p:sp>
+      <p:pic>
+        <p:nvPicPr>
+          <p:cNvPr id="5" name="Content Placeholder 4">
+            <a:extLst>
+              <a:ext uri="{FF2B5EF4-FFF2-40B4-BE49-F238E27FC236}">
+                <a16:creationId xmlns:a16="http://schemas.microsoft.com/office/drawing/2014/main" id="{3B082D56-BBE4-3445-AAF0-60CC4758D742}"/>
+              </a:ext>
+            </a:extLst>
+          </p:cNvPr>
+          <p:cNvPicPr>
+            <a:picLocks noGrp="1" noChangeAspect="1"/>
+          </p:cNvPicPr>
+          <p:nvPr>
+            <p:ph idx="1"/>
+          </p:nvPr>
+        </p:nvPicPr>
+        <p:blipFill>
+          <a:blip r:embed="rId2">
+            <a:extLst>
+              <a:ext uri="{28A0092B-C50C-407E-A947-70E740481C1C}">
+                <a14:useLocalDpi xmlns:a14="http://schemas.microsoft.com/office/drawing/2010/main" val="0"/>
+              </a:ext>
+            </a:extLst>
+          </a:blip>
+          <a:stretch>
+            <a:fillRect/>
+          </a:stretch>
+        </p:blipFill>
+        <p:spPr>
+          <a:xfrm>
+            <a:off x="2512502" y="1600200"/>
+            <a:ext cx="4118996" cy="4525963"/>
+          </a:xfrm>
+        </p:spPr>
+      </p:pic>
+    </p:spTree>
+    <p:extLst>
+      <p:ext uri="{BB962C8B-B14F-4D97-AF65-F5344CB8AC3E}">
+        <p14:creationId xmlns:p14="http://schemas.microsoft.com/office/powerpoint/2010/main" val="4167055406"/>
+      </p:ext>
+    </p:extLst>
+  </p:cSld>
+  <p:clrMapOvr>
+    <a:masterClrMapping/>
+  </p:clrMapOvr>
+</p:sld>
+</file>
+
+<file path=ppt/slides/slide14.xml><?xml version="1.0" encoding="utf-8"?>
+<p:sld xmlns:a="http://schemas.openxmlformats.org/drawingml/2006/main" xmlns:r="http://schemas.openxmlformats.org/officeDocument/2006/relationships" xmlns:p="http://schemas.openxmlformats.org/presentationml/2006/main">
+  <p:cSld>
+    <p:spTree>
+      <p:nvGrpSpPr>
+        <p:cNvPr id="1" name=""/>
+        <p:cNvGrpSpPr/>
+        <p:nvPr/>
+      </p:nvGrpSpPr>
+      <p:grpSpPr>
+        <a:xfrm>
+          <a:off x="0" y="0"/>
+          <a:ext cx="0" cy="0"/>
+          <a:chOff x="0" y="0"/>
+          <a:chExt cx="0" cy="0"/>
+        </a:xfrm>
+      </p:grpSpPr>
+      <p:sp>
+        <p:nvSpPr>
+          <p:cNvPr id="2" name="Title 1">
+            <a:extLst>
+              <a:ext uri="{FF2B5EF4-FFF2-40B4-BE49-F238E27FC236}">
+                <a16:creationId xmlns:a16="http://schemas.microsoft.com/office/drawing/2014/main" id="{8C834AFE-71E9-A34A-A279-787547BBFF23}"/>
+              </a:ext>
+            </a:extLst>
+          </p:cNvPr>
+          <p:cNvSpPr>
+            <a:spLocks noGrp="1"/>
+          </p:cNvSpPr>
+          <p:nvPr>
+            <p:ph type="title"/>
+          </p:nvPr>
+        </p:nvSpPr>
+        <p:spPr/>
+        <p:txBody>
+          <a:bodyPr>
+            <a:normAutofit/>
+          </a:bodyPr>
+          <a:lstStyle/>
+          <a:p>
+            <a:r>
+              <a:rPr lang="en-CA" dirty="0"/>
+              <a:t>FSLE: CIOPSE + HRDPS + 2% wind</a:t>
+            </a:r>
+          </a:p>
+        </p:txBody>
+      </p:sp>
+      <p:pic>
+        <p:nvPicPr>
+          <p:cNvPr id="5" name="Content Placeholder 4">
+            <a:extLst>
+              <a:ext uri="{FF2B5EF4-FFF2-40B4-BE49-F238E27FC236}">
+                <a16:creationId xmlns:a16="http://schemas.microsoft.com/office/drawing/2014/main" id="{9DB35F43-1587-BA43-AC33-AA170BA78D03}"/>
+              </a:ext>
+            </a:extLst>
+          </p:cNvPr>
+          <p:cNvPicPr>
+            <a:picLocks noGrp="1" noChangeAspect="1"/>
+          </p:cNvPicPr>
+          <p:nvPr>
+            <p:ph idx="1"/>
+          </p:nvPr>
+        </p:nvPicPr>
+        <p:blipFill>
+          <a:blip r:embed="rId2">
+            <a:extLst>
+              <a:ext uri="{28A0092B-C50C-407E-A947-70E740481C1C}">
+                <a14:useLocalDpi xmlns:a14="http://schemas.microsoft.com/office/drawing/2010/main" val="0"/>
+              </a:ext>
+            </a:extLst>
+          </a:blip>
+          <a:stretch>
+            <a:fillRect/>
+          </a:stretch>
+        </p:blipFill>
+        <p:spPr>
+          <a:xfrm>
+            <a:off x="2512502" y="1600200"/>
+            <a:ext cx="4118996" cy="4525963"/>
+          </a:xfrm>
+        </p:spPr>
+      </p:pic>
+    </p:spTree>
+    <p:extLst>
+      <p:ext uri="{BB962C8B-B14F-4D97-AF65-F5344CB8AC3E}">
+        <p14:creationId xmlns:p14="http://schemas.microsoft.com/office/powerpoint/2010/main" val="885411843"/>
+      </p:ext>
+    </p:extLst>
+  </p:cSld>
+  <p:clrMapOvr>
+    <a:masterClrMapping/>
+  </p:clrMapOvr>
+</p:sld>
+</file>
+
+<file path=ppt/slides/slide15.xml><?xml version="1.0" encoding="utf-8"?>
+<p:sld xmlns:a="http://schemas.openxmlformats.org/drawingml/2006/main" xmlns:r="http://schemas.openxmlformats.org/officeDocument/2006/relationships" xmlns:p="http://schemas.openxmlformats.org/presentationml/2006/main">
+  <p:cSld>
+    <p:spTree>
+      <p:nvGrpSpPr>
+        <p:cNvPr id="1" name=""/>
+        <p:cNvGrpSpPr/>
+        <p:nvPr/>
+      </p:nvGrpSpPr>
+      <p:grpSpPr>
+        <a:xfrm>
+          <a:off x="0" y="0"/>
+          <a:ext cx="0" cy="0"/>
+          <a:chOff x="0" y="0"/>
+          <a:chExt cx="0" cy="0"/>
+        </a:xfrm>
+      </p:grpSpPr>
+      <p:sp>
+        <p:nvSpPr>
+          <p:cNvPr id="2" name="Title 1">
+            <a:extLst>
+              <a:ext uri="{FF2B5EF4-FFF2-40B4-BE49-F238E27FC236}">
+                <a16:creationId xmlns:a16="http://schemas.microsoft.com/office/drawing/2014/main" id="{38C19242-F71A-6F4D-A57B-09C6E6C4905D}"/>
+              </a:ext>
+            </a:extLst>
+          </p:cNvPr>
+          <p:cNvSpPr>
+            <a:spLocks noGrp="1"/>
+          </p:cNvSpPr>
+          <p:nvPr>
+            <p:ph type="title"/>
+          </p:nvPr>
+        </p:nvSpPr>
+        <p:spPr/>
+        <p:txBody>
+          <a:bodyPr/>
+          <a:lstStyle/>
+          <a:p>
+            <a:r>
+              <a:rPr lang="en-CA" dirty="0"/>
+              <a:t>FSLE: GSL500 + HRDPS + 2% wind</a:t>
+            </a:r>
+          </a:p>
+        </p:txBody>
+      </p:sp>
+      <p:pic>
+        <p:nvPicPr>
+          <p:cNvPr id="5" name="Content Placeholder 4">
+            <a:extLst>
+              <a:ext uri="{FF2B5EF4-FFF2-40B4-BE49-F238E27FC236}">
+                <a16:creationId xmlns:a16="http://schemas.microsoft.com/office/drawing/2014/main" id="{816E7166-FA43-2A45-B453-21AB70AE0CA2}"/>
+              </a:ext>
+            </a:extLst>
+          </p:cNvPr>
+          <p:cNvPicPr>
+            <a:picLocks noGrp="1" noChangeAspect="1"/>
+          </p:cNvPicPr>
+          <p:nvPr>
+            <p:ph idx="1"/>
+          </p:nvPr>
+        </p:nvPicPr>
+        <p:blipFill>
+          <a:blip r:embed="rId2">
+            <a:extLst>
+              <a:ext uri="{28A0092B-C50C-407E-A947-70E740481C1C}">
+                <a14:useLocalDpi xmlns:a14="http://schemas.microsoft.com/office/drawing/2010/main" val="0"/>
+              </a:ext>
+            </a:extLst>
+          </a:blip>
+          <a:stretch>
+            <a:fillRect/>
+          </a:stretch>
+        </p:blipFill>
+        <p:spPr>
+          <a:xfrm>
+            <a:off x="2512502" y="1600200"/>
+            <a:ext cx="4118996" cy="4525963"/>
+          </a:xfrm>
+        </p:spPr>
+      </p:pic>
+    </p:spTree>
+    <p:extLst>
+      <p:ext uri="{BB962C8B-B14F-4D97-AF65-F5344CB8AC3E}">
+        <p14:creationId xmlns:p14="http://schemas.microsoft.com/office/powerpoint/2010/main" val="3914736472"/>
+      </p:ext>
+    </p:extLst>
+  </p:cSld>
+  <p:clrMapOvr>
+    <a:masterClrMapping/>
+  </p:clrMapOvr>
+</p:sld>
+</file>
+
 <file path=ppt/slides/slide2.xml><?xml version="1.0" encoding="utf-8"?>
 <p:sld xmlns:a="http://schemas.openxmlformats.org/drawingml/2006/main" xmlns:r="http://schemas.openxmlformats.org/officeDocument/2006/relationships" xmlns:p="http://schemas.openxmlformats.org/presentationml/2006/main">
   <p:cSld>
@@ -1143,17 +1874,6 @@
               <a:rPr lang="en-US" dirty="0"/>
               <a:t>Windage tuning paper</a:t>
             </a:r>
-          </a:p>
-          <a:p>
-            <a:r>
-              <a:rPr lang="en-US" dirty="0"/>
-              <a:t>Dispersion using </a:t>
-            </a:r>
-            <a:r>
-              <a:rPr lang="en-US" dirty="0" err="1"/>
-              <a:t>Smagorinsky</a:t>
-            </a:r>
-            <a:endParaRPr lang="en-US" dirty="0"/>
           </a:p>
           <a:p>
             <a:r>
@@ -1216,18 +1936,20 @@
         </p:nvSpPr>
         <p:spPr/>
         <p:txBody>
-          <a:bodyPr/>
+          <a:bodyPr>
+            <a:normAutofit fontScale="90000"/>
+          </a:bodyPr>
           <a:lstStyle/>
           <a:p>
             <a:r>
               <a:rPr lang="en-US" dirty="0"/>
-              <a:t>Drift modeling</a:t>
+              <a:t>Assessing uncertainty using drifters</a:t>
             </a:r>
           </a:p>
         </p:txBody>
       </p:sp>
-      <mc:AlternateContent xmlns:mc="http://schemas.openxmlformats.org/markup-compatibility/2006">
-        <mc:Choice xmlns:a14="http://schemas.microsoft.com/office/drawing/2010/main" Requires="a14">
+      <mc:AlternateContent xmlns:mc="http://schemas.openxmlformats.org/markup-compatibility/2006" xmlns:a14="http://schemas.microsoft.com/office/drawing/2010/main">
+        <mc:Choice Requires="a14">
           <p:sp>
             <p:nvSpPr>
               <p:cNvPr id="3" name="Content Placeholder 2"/>
@@ -1688,7 +2410,7 @@
             </p:txBody>
           </p:sp>
         </mc:Choice>
-        <mc:Fallback>
+        <mc:Fallback xmlns="">
           <p:sp>
             <p:nvSpPr>
               <p:cNvPr id="3" name="Content Placeholder 2"/>
@@ -2543,6 +3265,667 @@
     <p:extLst>
       <p:ext uri="{BB962C8B-B14F-4D97-AF65-F5344CB8AC3E}">
         <p14:creationId xmlns:p14="http://schemas.microsoft.com/office/powerpoint/2010/main" val="3991940567"/>
+      </p:ext>
+    </p:extLst>
+  </p:cSld>
+  <p:clrMapOvr>
+    <a:masterClrMapping/>
+  </p:clrMapOvr>
+</p:sld>
+</file>
+
+<file path=ppt/slides/slide9.xml><?xml version="1.0" encoding="utf-8"?>
+<p:sld xmlns:a="http://schemas.openxmlformats.org/drawingml/2006/main" xmlns:r="http://schemas.openxmlformats.org/officeDocument/2006/relationships" xmlns:p="http://schemas.openxmlformats.org/presentationml/2006/main">
+  <p:cSld>
+    <p:spTree>
+      <p:nvGrpSpPr>
+        <p:cNvPr id="1" name=""/>
+        <p:cNvGrpSpPr/>
+        <p:nvPr/>
+      </p:nvGrpSpPr>
+      <p:grpSpPr>
+        <a:xfrm>
+          <a:off x="0" y="0"/>
+          <a:ext cx="0" cy="0"/>
+          <a:chOff x="0" y="0"/>
+          <a:chExt cx="0" cy="0"/>
+        </a:xfrm>
+      </p:grpSpPr>
+      <p:sp>
+        <p:nvSpPr>
+          <p:cNvPr id="2" name="Title 1">
+            <a:extLst>
+              <a:ext uri="{FF2B5EF4-FFF2-40B4-BE49-F238E27FC236}">
+                <a16:creationId xmlns:a16="http://schemas.microsoft.com/office/drawing/2014/main" id="{52F89091-A38D-CB48-8958-9075C24806CE}"/>
+              </a:ext>
+            </a:extLst>
+          </p:cNvPr>
+          <p:cNvSpPr>
+            <a:spLocks noGrp="1"/>
+          </p:cNvSpPr>
+          <p:nvPr>
+            <p:ph type="title"/>
+          </p:nvPr>
+        </p:nvSpPr>
+        <p:spPr/>
+        <p:txBody>
+          <a:bodyPr>
+            <a:normAutofit fontScale="90000"/>
+          </a:bodyPr>
+          <a:lstStyle/>
+          <a:p>
+            <a:r>
+              <a:rPr lang="en-CA" dirty="0"/>
+              <a:t>Finite Scale Lyapunov Exponent (FSLE)</a:t>
+            </a:r>
+          </a:p>
+        </p:txBody>
+      </p:sp>
+      <mc:AlternateContent xmlns:mc="http://schemas.openxmlformats.org/markup-compatibility/2006" xmlns:a14="http://schemas.microsoft.com/office/drawing/2010/main">
+        <mc:Choice Requires="a14">
+          <p:sp>
+            <p:nvSpPr>
+              <p:cNvPr id="3" name="Content Placeholder 2">
+                <a:extLst>
+                  <a:ext uri="{FF2B5EF4-FFF2-40B4-BE49-F238E27FC236}">
+                    <a16:creationId xmlns:a16="http://schemas.microsoft.com/office/drawing/2014/main" id="{0FE13DA4-569E-9E44-9E57-8543AA7273FE}"/>
+                  </a:ext>
+                </a:extLst>
+              </p:cNvPr>
+              <p:cNvSpPr>
+                <a:spLocks noGrp="1"/>
+              </p:cNvSpPr>
+              <p:nvPr>
+                <p:ph idx="1"/>
+              </p:nvPr>
+            </p:nvSpPr>
+            <p:spPr/>
+            <p:txBody>
+              <a:bodyPr>
+                <a:normAutofit fontScale="92500" lnSpcReduction="20000"/>
+              </a:bodyPr>
+              <a:lstStyle/>
+              <a:p>
+                <a:r>
+                  <a:rPr lang="en-CA" dirty="0"/>
+                  <a:t>An alternative approach to relative dispersion is to use the separation distance as the independent variable and average exit times</a:t>
+                </a:r>
+              </a:p>
+              <a:p>
+                <a:r>
+                  <a:rPr lang="en-CA" dirty="0"/>
+                  <a:t>Choose distances that increase multiplicatively </a:t>
+                </a:r>
+                <a14:m>
+                  <m:oMath xmlns:m="http://schemas.openxmlformats.org/officeDocument/2006/math">
+                    <m:sSub>
+                      <m:sSubPr>
+                        <m:ctrlPr>
+                          <a:rPr lang="en-US" b="0" i="1" smtClean="0">
+                            <a:latin typeface="Cambria Math" panose="02040503050406030204" pitchFamily="18" charset="0"/>
+                          </a:rPr>
+                        </m:ctrlPr>
+                      </m:sSubPr>
+                      <m:e>
+                        <m:r>
+                          <a:rPr lang="en-US" b="0" i="1" smtClean="0">
+                            <a:latin typeface="Cambria Math" panose="02040503050406030204" pitchFamily="18" charset="0"/>
+                          </a:rPr>
+                          <m:t>𝛿</m:t>
+                        </m:r>
+                      </m:e>
+                      <m:sub>
+                        <m:r>
+                          <a:rPr lang="en-US" b="0" i="1" smtClean="0">
+                            <a:latin typeface="Cambria Math" panose="02040503050406030204" pitchFamily="18" charset="0"/>
+                          </a:rPr>
+                          <m:t>𝑛</m:t>
+                        </m:r>
+                      </m:sub>
+                    </m:sSub>
+                    <m:r>
+                      <a:rPr lang="en-US" b="0" i="1" smtClean="0">
+                        <a:latin typeface="Cambria Math" panose="02040503050406030204" pitchFamily="18" charset="0"/>
+                      </a:rPr>
+                      <m:t>=</m:t>
+                    </m:r>
+                    <m:r>
+                      <a:rPr lang="en-US" b="0" i="1" smtClean="0">
+                        <a:latin typeface="Cambria Math" panose="02040503050406030204" pitchFamily="18" charset="0"/>
+                      </a:rPr>
+                      <m:t>𝑟</m:t>
+                    </m:r>
+                    <m:sSub>
+                      <m:sSubPr>
+                        <m:ctrlPr>
+                          <a:rPr lang="en-US" b="0" i="1" smtClean="0">
+                            <a:latin typeface="Cambria Math" panose="02040503050406030204" pitchFamily="18" charset="0"/>
+                          </a:rPr>
+                        </m:ctrlPr>
+                      </m:sSubPr>
+                      <m:e>
+                        <m:r>
+                          <a:rPr lang="en-US" b="0" i="1" smtClean="0">
+                            <a:latin typeface="Cambria Math" panose="02040503050406030204" pitchFamily="18" charset="0"/>
+                          </a:rPr>
+                          <m:t>𝛿</m:t>
+                        </m:r>
+                      </m:e>
+                      <m:sub>
+                        <m:r>
+                          <a:rPr lang="en-US" b="0" i="1" smtClean="0">
+                            <a:latin typeface="Cambria Math" panose="02040503050406030204" pitchFamily="18" charset="0"/>
+                          </a:rPr>
+                          <m:t>𝑛</m:t>
+                        </m:r>
+                        <m:r>
+                          <a:rPr lang="en-US" b="0" i="1" smtClean="0">
+                            <a:latin typeface="Cambria Math" panose="02040503050406030204" pitchFamily="18" charset="0"/>
+                          </a:rPr>
+                          <m:t>−1</m:t>
+                        </m:r>
+                      </m:sub>
+                    </m:sSub>
+                    <m:r>
+                      <a:rPr lang="en-US" b="0" i="1" smtClean="0">
+                        <a:latin typeface="Cambria Math" panose="02040503050406030204" pitchFamily="18" charset="0"/>
+                      </a:rPr>
+                      <m:t>=</m:t>
+                    </m:r>
+                    <m:sSup>
+                      <m:sSupPr>
+                        <m:ctrlPr>
+                          <a:rPr lang="en-US" b="0" i="1" smtClean="0">
+                            <a:latin typeface="Cambria Math" panose="02040503050406030204" pitchFamily="18" charset="0"/>
+                          </a:rPr>
+                        </m:ctrlPr>
+                      </m:sSupPr>
+                      <m:e>
+                        <m:r>
+                          <a:rPr lang="en-US" b="0" i="1" smtClean="0">
+                            <a:latin typeface="Cambria Math" panose="02040503050406030204" pitchFamily="18" charset="0"/>
+                          </a:rPr>
+                          <m:t>𝑟</m:t>
+                        </m:r>
+                      </m:e>
+                      <m:sup>
+                        <m:r>
+                          <a:rPr lang="en-US" b="0" i="1" smtClean="0">
+                            <a:latin typeface="Cambria Math" panose="02040503050406030204" pitchFamily="18" charset="0"/>
+                          </a:rPr>
+                          <m:t>𝑛</m:t>
+                        </m:r>
+                      </m:sup>
+                    </m:sSup>
+                    <m:sSub>
+                      <m:sSubPr>
+                        <m:ctrlPr>
+                          <a:rPr lang="en-US" b="0" i="1" smtClean="0">
+                            <a:latin typeface="Cambria Math" panose="02040503050406030204" pitchFamily="18" charset="0"/>
+                          </a:rPr>
+                        </m:ctrlPr>
+                      </m:sSubPr>
+                      <m:e>
+                        <m:r>
+                          <a:rPr lang="en-US" b="0" i="1" smtClean="0">
+                            <a:latin typeface="Cambria Math" panose="02040503050406030204" pitchFamily="18" charset="0"/>
+                          </a:rPr>
+                          <m:t>𝑑</m:t>
+                        </m:r>
+                      </m:e>
+                      <m:sub>
+                        <m:r>
+                          <a:rPr lang="en-US" b="0" i="1" smtClean="0">
+                            <a:latin typeface="Cambria Math" panose="02040503050406030204" pitchFamily="18" charset="0"/>
+                          </a:rPr>
+                          <m:t>0</m:t>
+                        </m:r>
+                      </m:sub>
+                    </m:sSub>
+                  </m:oMath>
+                </a14:m>
+                <a:endParaRPr lang="en-CA" dirty="0"/>
+              </a:p>
+              <a:p>
+                <a:r>
+                  <a:rPr lang="en-CA" dirty="0"/>
+                  <a:t>Assuming exponential increase between bins </a:t>
+                </a:r>
+                <a14:m>
+                  <m:oMath xmlns:m="http://schemas.openxmlformats.org/officeDocument/2006/math">
+                    <m:sSub>
+                      <m:sSubPr>
+                        <m:ctrlPr>
+                          <a:rPr lang="en-US" b="0" i="1" smtClean="0">
+                            <a:latin typeface="Cambria Math" panose="02040503050406030204" pitchFamily="18" charset="0"/>
+                          </a:rPr>
+                        </m:ctrlPr>
+                      </m:sSubPr>
+                      <m:e>
+                        <m:r>
+                          <a:rPr lang="en-US" b="0" i="1" smtClean="0">
+                            <a:latin typeface="Cambria Math" panose="02040503050406030204" pitchFamily="18" charset="0"/>
+                          </a:rPr>
+                          <m:t>𝛿</m:t>
+                        </m:r>
+                      </m:e>
+                      <m:sub>
+                        <m:r>
+                          <a:rPr lang="en-US" b="0" i="1" smtClean="0">
+                            <a:latin typeface="Cambria Math" panose="02040503050406030204" pitchFamily="18" charset="0"/>
+                          </a:rPr>
+                          <m:t>𝑛</m:t>
+                        </m:r>
+                      </m:sub>
+                    </m:sSub>
+                    <m:r>
+                      <a:rPr lang="en-US" b="0" i="1" smtClean="0">
+                        <a:latin typeface="Cambria Math" panose="02040503050406030204" pitchFamily="18" charset="0"/>
+                      </a:rPr>
+                      <m:t>=</m:t>
+                    </m:r>
+                    <m:sSub>
+                      <m:sSubPr>
+                        <m:ctrlPr>
+                          <a:rPr lang="en-US" b="0" i="1" smtClean="0">
+                            <a:latin typeface="Cambria Math" panose="02040503050406030204" pitchFamily="18" charset="0"/>
+                          </a:rPr>
+                        </m:ctrlPr>
+                      </m:sSubPr>
+                      <m:e>
+                        <m:r>
+                          <a:rPr lang="en-US" b="0" i="1" smtClean="0">
+                            <a:latin typeface="Cambria Math" panose="02040503050406030204" pitchFamily="18" charset="0"/>
+                          </a:rPr>
+                          <m:t>𝛿</m:t>
+                        </m:r>
+                      </m:e>
+                      <m:sub>
+                        <m:r>
+                          <a:rPr lang="en-US" b="0" i="1" smtClean="0">
+                            <a:latin typeface="Cambria Math" panose="02040503050406030204" pitchFamily="18" charset="0"/>
+                          </a:rPr>
+                          <m:t>𝑛</m:t>
+                        </m:r>
+                        <m:r>
+                          <a:rPr lang="en-US" b="0" i="1" smtClean="0">
+                            <a:latin typeface="Cambria Math" panose="02040503050406030204" pitchFamily="18" charset="0"/>
+                          </a:rPr>
+                          <m:t>−1</m:t>
+                        </m:r>
+                      </m:sub>
+                    </m:sSub>
+                    <m:sSup>
+                      <m:sSupPr>
+                        <m:ctrlPr>
+                          <a:rPr lang="en-US" b="0" i="1" smtClean="0">
+                            <a:latin typeface="Cambria Math" panose="02040503050406030204" pitchFamily="18" charset="0"/>
+                          </a:rPr>
+                        </m:ctrlPr>
+                      </m:sSupPr>
+                      <m:e>
+                        <m:r>
+                          <a:rPr lang="en-US" b="0" i="1" smtClean="0">
+                            <a:latin typeface="Cambria Math" panose="02040503050406030204" pitchFamily="18" charset="0"/>
+                          </a:rPr>
+                          <m:t>𝑒</m:t>
+                        </m:r>
+                      </m:e>
+                      <m:sup>
+                        <m:sSub>
+                          <m:sSubPr>
+                            <m:ctrlPr>
+                              <a:rPr lang="en-US" b="0" i="1" smtClean="0">
+                                <a:latin typeface="Cambria Math" panose="02040503050406030204" pitchFamily="18" charset="0"/>
+                              </a:rPr>
+                            </m:ctrlPr>
+                          </m:sSubPr>
+                          <m:e>
+                            <m:r>
+                              <a:rPr lang="en-US" b="0" i="1" smtClean="0">
+                                <a:latin typeface="Cambria Math" panose="02040503050406030204" pitchFamily="18" charset="0"/>
+                              </a:rPr>
+                              <m:t>𝜆</m:t>
+                            </m:r>
+                          </m:e>
+                          <m:sub>
+                            <m:r>
+                              <a:rPr lang="en-US" b="0" i="1" smtClean="0">
+                                <a:latin typeface="Cambria Math" panose="02040503050406030204" pitchFamily="18" charset="0"/>
+                              </a:rPr>
+                              <m:t>𝑛</m:t>
+                            </m:r>
+                          </m:sub>
+                        </m:sSub>
+                        <m:r>
+                          <a:rPr lang="en-US" b="0" i="1" smtClean="0">
+                            <a:latin typeface="Cambria Math" panose="02040503050406030204" pitchFamily="18" charset="0"/>
+                          </a:rPr>
+                          <m:t>𝑡</m:t>
+                        </m:r>
+                      </m:sup>
+                    </m:sSup>
+                    <m:r>
+                      <a:rPr lang="en-US" b="0" i="1" smtClean="0">
+                        <a:latin typeface="Cambria Math" panose="02040503050406030204" pitchFamily="18" charset="0"/>
+                      </a:rPr>
+                      <m:t>→</m:t>
+                    </m:r>
+                    <m:sSub>
+                      <m:sSubPr>
+                        <m:ctrlPr>
+                          <a:rPr lang="en-US" b="0" i="1" smtClean="0">
+                            <a:latin typeface="Cambria Math" panose="02040503050406030204" pitchFamily="18" charset="0"/>
+                          </a:rPr>
+                        </m:ctrlPr>
+                      </m:sSubPr>
+                      <m:e>
+                        <m:r>
+                          <a:rPr lang="en-US" b="0" i="1" smtClean="0">
+                            <a:latin typeface="Cambria Math" panose="02040503050406030204" pitchFamily="18" charset="0"/>
+                          </a:rPr>
+                          <m:t>𝜆</m:t>
+                        </m:r>
+                      </m:e>
+                      <m:sub>
+                        <m:r>
+                          <a:rPr lang="en-US" b="0" i="1" smtClean="0">
+                            <a:latin typeface="Cambria Math" panose="02040503050406030204" pitchFamily="18" charset="0"/>
+                          </a:rPr>
+                          <m:t>𝑛</m:t>
+                        </m:r>
+                      </m:sub>
+                    </m:sSub>
+                    <m:r>
+                      <a:rPr lang="en-US" b="0" i="1" smtClean="0">
+                        <a:latin typeface="Cambria Math" panose="02040503050406030204" pitchFamily="18" charset="0"/>
+                      </a:rPr>
+                      <m:t>=</m:t>
+                    </m:r>
+                    <m:f>
+                      <m:fPr>
+                        <m:ctrlPr>
+                          <a:rPr lang="en-US" b="0" i="1" smtClean="0">
+                            <a:latin typeface="Cambria Math" panose="02040503050406030204" pitchFamily="18" charset="0"/>
+                          </a:rPr>
+                        </m:ctrlPr>
+                      </m:fPr>
+                      <m:num>
+                        <m:func>
+                          <m:funcPr>
+                            <m:ctrlPr>
+                              <a:rPr lang="en-US" b="0" i="1" smtClean="0">
+                                <a:latin typeface="Cambria Math" panose="02040503050406030204" pitchFamily="18" charset="0"/>
+                              </a:rPr>
+                            </m:ctrlPr>
+                          </m:funcPr>
+                          <m:fName>
+                            <m:r>
+                              <m:rPr>
+                                <m:sty m:val="p"/>
+                              </m:rPr>
+                              <a:rPr lang="en-US" b="0" i="0" smtClean="0">
+                                <a:latin typeface="Cambria Math" panose="02040503050406030204" pitchFamily="18" charset="0"/>
+                              </a:rPr>
+                              <m:t>ln</m:t>
+                            </m:r>
+                          </m:fName>
+                          <m:e>
+                            <m:d>
+                              <m:dPr>
+                                <m:ctrlPr>
+                                  <a:rPr lang="en-US" b="0" i="1" smtClean="0">
+                                    <a:latin typeface="Cambria Math" panose="02040503050406030204" pitchFamily="18" charset="0"/>
+                                  </a:rPr>
+                                </m:ctrlPr>
+                              </m:dPr>
+                              <m:e>
+                                <m:r>
+                                  <a:rPr lang="en-US" b="0" i="1" smtClean="0">
+                                    <a:latin typeface="Cambria Math" panose="02040503050406030204" pitchFamily="18" charset="0"/>
+                                  </a:rPr>
+                                  <m:t>𝑟</m:t>
+                                </m:r>
+                              </m:e>
+                            </m:d>
+                          </m:e>
+                        </m:func>
+                      </m:num>
+                      <m:den>
+                        <m:r>
+                          <a:rPr lang="en-US" b="0" i="1" smtClean="0">
+                            <a:latin typeface="Cambria Math" panose="02040503050406030204" pitchFamily="18" charset="0"/>
+                          </a:rPr>
+                          <m:t>&lt;</m:t>
+                        </m:r>
+                        <m:sSub>
+                          <m:sSubPr>
+                            <m:ctrlPr>
+                              <a:rPr lang="en-US" b="0" i="1" smtClean="0">
+                                <a:latin typeface="Cambria Math" panose="02040503050406030204" pitchFamily="18" charset="0"/>
+                              </a:rPr>
+                            </m:ctrlPr>
+                          </m:sSubPr>
+                          <m:e>
+                            <m:r>
+                              <a:rPr lang="en-US" b="0" i="1" smtClean="0">
+                                <a:latin typeface="Cambria Math" panose="02040503050406030204" pitchFamily="18" charset="0"/>
+                              </a:rPr>
+                              <m:t>𝑇</m:t>
+                            </m:r>
+                          </m:e>
+                          <m:sub>
+                            <m:r>
+                              <a:rPr lang="en-US" b="0" i="1" smtClean="0">
+                                <a:latin typeface="Cambria Math" panose="02040503050406030204" pitchFamily="18" charset="0"/>
+                              </a:rPr>
+                              <m:t>𝑛</m:t>
+                            </m:r>
+                          </m:sub>
+                        </m:sSub>
+                        <m:r>
+                          <a:rPr lang="en-US" b="0" i="1" smtClean="0">
+                            <a:latin typeface="Cambria Math" panose="02040503050406030204" pitchFamily="18" charset="0"/>
+                          </a:rPr>
+                          <m:t>&gt;</m:t>
+                        </m:r>
+                      </m:den>
+                    </m:f>
+                  </m:oMath>
+                </a14:m>
+                <a:endParaRPr lang="en-CA" dirty="0"/>
+              </a:p>
+              <a:p>
+                <a14:m>
+                  <m:oMath xmlns:m="http://schemas.openxmlformats.org/officeDocument/2006/math">
+                    <m:r>
+                      <a:rPr lang="en-US" i="1">
+                        <a:latin typeface="Cambria Math" panose="02040503050406030204" pitchFamily="18" charset="0"/>
+                      </a:rPr>
+                      <m:t>𝜆</m:t>
+                    </m:r>
+                  </m:oMath>
+                </a14:m>
+                <a:r>
+                  <a:rPr lang="en-CA" dirty="0"/>
+                  <a:t> &gt; 0 implies chaos. Can also be used to assess scale dependence of dispersion</a:t>
+                </a:r>
+              </a:p>
+              <a:p>
+                <a:r>
+                  <a:rPr lang="en-CA" dirty="0"/>
+                  <a:t>If rms separation is </a:t>
+                </a:r>
+                <a14:m>
+                  <m:oMath xmlns:m="http://schemas.openxmlformats.org/officeDocument/2006/math">
+                    <m:r>
+                      <a:rPr lang="en-US" b="0" i="1" smtClean="0">
+                        <a:latin typeface="Cambria Math" panose="02040503050406030204" pitchFamily="18" charset="0"/>
+                      </a:rPr>
+                      <m:t>&lt;</m:t>
+                    </m:r>
+                    <m:sSup>
+                      <m:sSupPr>
+                        <m:ctrlPr>
+                          <a:rPr lang="en-US" b="0" i="1" smtClean="0">
+                            <a:latin typeface="Cambria Math" panose="02040503050406030204" pitchFamily="18" charset="0"/>
+                          </a:rPr>
+                        </m:ctrlPr>
+                      </m:sSupPr>
+                      <m:e>
+                        <m:r>
+                          <a:rPr lang="en-US" b="0" i="1" smtClean="0">
+                            <a:latin typeface="Cambria Math" panose="02040503050406030204" pitchFamily="18" charset="0"/>
+                          </a:rPr>
+                          <m:t>𝑦</m:t>
+                        </m:r>
+                      </m:e>
+                      <m:sup>
+                        <m:r>
+                          <a:rPr lang="en-US" b="0" i="1" smtClean="0">
+                            <a:latin typeface="Cambria Math" panose="02040503050406030204" pitchFamily="18" charset="0"/>
+                          </a:rPr>
+                          <m:t>2</m:t>
+                        </m:r>
+                      </m:sup>
+                    </m:sSup>
+                    <m:r>
+                      <a:rPr lang="en-US" b="0" i="1" smtClean="0">
+                        <a:latin typeface="Cambria Math" panose="02040503050406030204" pitchFamily="18" charset="0"/>
+                      </a:rPr>
+                      <m:t>&gt; ∝</m:t>
+                    </m:r>
+                    <m:sSup>
+                      <m:sSupPr>
+                        <m:ctrlPr>
+                          <a:rPr lang="en-US" b="0" i="1" smtClean="0">
+                            <a:latin typeface="Cambria Math" panose="02040503050406030204" pitchFamily="18" charset="0"/>
+                          </a:rPr>
+                        </m:ctrlPr>
+                      </m:sSupPr>
+                      <m:e>
+                        <m:r>
+                          <a:rPr lang="en-US" b="0" i="1" smtClean="0">
+                            <a:latin typeface="Cambria Math" panose="02040503050406030204" pitchFamily="18" charset="0"/>
+                          </a:rPr>
+                          <m:t>𝑡</m:t>
+                        </m:r>
+                      </m:e>
+                      <m:sup>
+                        <m:r>
+                          <a:rPr lang="en-US" b="0" i="1" smtClean="0">
+                            <a:latin typeface="Cambria Math" panose="02040503050406030204" pitchFamily="18" charset="0"/>
+                          </a:rPr>
+                          <m:t>𝛼</m:t>
+                        </m:r>
+                      </m:sup>
+                    </m:sSup>
+                    <m:r>
+                      <a:rPr lang="en-US" b="0" i="1" smtClean="0">
+                        <a:latin typeface="Cambria Math" panose="02040503050406030204" pitchFamily="18" charset="0"/>
+                      </a:rPr>
+                      <m:t>→</m:t>
+                    </m:r>
+                    <m:r>
+                      <a:rPr lang="en-US" b="0" i="1" smtClean="0">
+                        <a:latin typeface="Cambria Math" panose="02040503050406030204" pitchFamily="18" charset="0"/>
+                      </a:rPr>
+                      <m:t>𝜆</m:t>
+                    </m:r>
+                    <m:r>
+                      <a:rPr lang="en-US" b="0" i="1" smtClean="0">
+                        <a:latin typeface="Cambria Math" panose="02040503050406030204" pitchFamily="18" charset="0"/>
+                      </a:rPr>
+                      <m:t>∝</m:t>
+                    </m:r>
+                    <m:sSup>
+                      <m:sSupPr>
+                        <m:ctrlPr>
+                          <a:rPr lang="en-US" b="0" i="1" smtClean="0">
+                            <a:latin typeface="Cambria Math" panose="02040503050406030204" pitchFamily="18" charset="0"/>
+                          </a:rPr>
+                        </m:ctrlPr>
+                      </m:sSupPr>
+                      <m:e>
+                        <m:r>
+                          <a:rPr lang="en-US" b="0" i="1" smtClean="0">
+                            <a:latin typeface="Cambria Math" panose="02040503050406030204" pitchFamily="18" charset="0"/>
+                          </a:rPr>
+                          <m:t>𝑦</m:t>
+                        </m:r>
+                      </m:e>
+                      <m:sup>
+                        <m:r>
+                          <a:rPr lang="en-US" b="0" i="1" smtClean="0">
+                            <a:latin typeface="Cambria Math" panose="02040503050406030204" pitchFamily="18" charset="0"/>
+                          </a:rPr>
+                          <m:t>−2/</m:t>
+                        </m:r>
+                        <m:r>
+                          <a:rPr lang="en-US" b="0" i="1" smtClean="0">
+                            <a:latin typeface="Cambria Math" panose="02040503050406030204" pitchFamily="18" charset="0"/>
+                          </a:rPr>
+                          <m:t>𝛼</m:t>
+                        </m:r>
+                      </m:sup>
+                    </m:sSup>
+                  </m:oMath>
+                </a14:m>
+                <a:endParaRPr lang="en-CA" dirty="0"/>
+              </a:p>
+              <a:p>
+                <a:endParaRPr lang="en-CA" dirty="0"/>
+              </a:p>
+              <a:p>
+                <a:endParaRPr lang="en-CA" dirty="0"/>
+              </a:p>
+            </p:txBody>
+          </p:sp>
+        </mc:Choice>
+        <mc:Fallback xmlns="">
+          <p:sp>
+            <p:nvSpPr>
+              <p:cNvPr id="3" name="Content Placeholder 2">
+                <a:extLst>
+                  <a:ext uri="{FF2B5EF4-FFF2-40B4-BE49-F238E27FC236}">
+                    <a16:creationId xmlns:a16="http://schemas.microsoft.com/office/drawing/2014/main" id="{0FE13DA4-569E-9E44-9E57-8543AA7273FE}"/>
+                  </a:ext>
+                </a:extLst>
+              </p:cNvPr>
+              <p:cNvSpPr>
+                <a:spLocks noGrp="1" noRot="1" noChangeAspect="1" noMove="1" noResize="1" noEditPoints="1" noAdjustHandles="1" noChangeArrowheads="1" noChangeShapeType="1" noTextEdit="1"/>
+              </p:cNvSpPr>
+              <p:nvPr>
+                <p:ph idx="1"/>
+              </p:nvPr>
+            </p:nvSpPr>
+            <p:spPr>
+              <a:blipFill>
+                <a:blip r:embed="rId2"/>
+                <a:stretch>
+                  <a:fillRect l="-1698" t="-3641" r="-1852" b="-280"/>
+                </a:stretch>
+              </a:blipFill>
+            </p:spPr>
+            <p:txBody>
+              <a:bodyPr/>
+              <a:lstStyle/>
+              <a:p>
+                <a:r>
+                  <a:rPr lang="en-CA">
+                    <a:noFill/>
+                  </a:rPr>
+                  <a:t> </a:t>
+                </a:r>
+              </a:p>
+            </p:txBody>
+          </p:sp>
+        </mc:Fallback>
+      </mc:AlternateContent>
+    </p:spTree>
+    <p:extLst>
+      <p:ext uri="{BB962C8B-B14F-4D97-AF65-F5344CB8AC3E}">
+        <p14:creationId xmlns:p14="http://schemas.microsoft.com/office/powerpoint/2010/main" val="1751915560"/>
       </p:ext>
     </p:extLst>
   </p:cSld>
@@ -2841,6 +4224,15 @@
 </file>
 
 <file path=customXml/item1.xml><?xml version="1.0" encoding="utf-8"?>
+<?mso-contentType ?>
+<FormTemplates xmlns="http://schemas.microsoft.com/sharepoint/v3/contenttype/forms">
+  <Display>DocumentLibraryForm</Display>
+  <Edit>DocumentLibraryForm</Edit>
+  <New>DocumentLibraryForm</New>
+</FormTemplates>
+</file>
+
+<file path=customXml/item2.xml><?xml version="1.0" encoding="utf-8"?>
 <ct:contentTypeSchema xmlns:ct="http://schemas.microsoft.com/office/2006/metadata/contentType" xmlns:ma="http://schemas.microsoft.com/office/2006/metadata/properties/metaAttributes" ct:_="" ma:_="" ma:contentTypeName="Document" ma:contentTypeID="0x01010075D0B20BB41BF245A74357C5242D202F" ma:contentTypeVersion="10" ma:contentTypeDescription="Create a new document." ma:contentTypeScope="" ma:versionID="1d63c453300229499d35ee3cdb122db5">
   <xsd:schema xmlns:xsd="http://www.w3.org/2001/XMLSchema" xmlns:xs="http://www.w3.org/2001/XMLSchema" xmlns:p="http://schemas.microsoft.com/office/2006/metadata/properties" xmlns:ns3="acbb3e5d-5d9a-41a2-b23c-a652c639d82c" xmlns:ns4="b6e7370b-7179-4676-9a6f-0d2482e7e8cc" targetNamespace="http://schemas.microsoft.com/office/2006/metadata/properties" ma:root="true" ma:fieldsID="d0431d3bfc2050b05195e48dfbe7c542" ns3:_="" ns4:_="">
     <xsd:import namespace="acbb3e5d-5d9a-41a2-b23c-a652c639d82c"/>
@@ -3057,7 +4449,7 @@
 </ct:contentTypeSchema>
 </file>
 
-<file path=customXml/item2.xml><?xml version="1.0" encoding="utf-8"?>
+<file path=customXml/item3.xml><?xml version="1.0" encoding="utf-8"?>
 <p:properties xmlns:p="http://schemas.microsoft.com/office/2006/metadata/properties" xmlns:xsi="http://www.w3.org/2001/XMLSchema-instance" xmlns:pc="http://schemas.microsoft.com/office/infopath/2007/PartnerControls">
   <documentManagement>
     <Branch xmlns="acbb3e5d-5d9a-41a2-b23c-a652c639d82c" xsi:nil="true"/>
@@ -3077,16 +4469,15 @@
 </p:properties>
 </file>
 
-<file path=customXml/item3.xml><?xml version="1.0" encoding="utf-8"?>
-<?mso-contentType ?>
-<FormTemplates xmlns="http://schemas.microsoft.com/sharepoint/v3/contenttype/forms">
-  <Display>DocumentLibraryForm</Display>
-  <Edit>DocumentLibraryForm</Edit>
-  <New>DocumentLibraryForm</New>
-</FormTemplates>
+<file path=customXml/itemProps1.xml><?xml version="1.0" encoding="utf-8"?>
+<ds:datastoreItem xmlns:ds="http://schemas.openxmlformats.org/officeDocument/2006/customXml" ds:itemID="{3FEA80A5-E996-4AFB-AE99-8EED984C9B80}">
+  <ds:schemaRefs>
+    <ds:schemaRef ds:uri="http://schemas.microsoft.com/sharepoint/v3/contenttype/forms"/>
+  </ds:schemaRefs>
+</ds:datastoreItem>
 </file>
 
-<file path=customXml/itemProps1.xml><?xml version="1.0" encoding="utf-8"?>
+<file path=customXml/itemProps2.xml><?xml version="1.0" encoding="utf-8"?>
 <ds:datastoreItem xmlns:ds="http://schemas.openxmlformats.org/officeDocument/2006/customXml" ds:itemID="{2C5073C6-8F39-4D0C-98A3-3188256BBC8F}">
   <ds:schemaRefs>
     <ds:schemaRef ds:uri="http://schemas.microsoft.com/office/2006/metadata/contentType"/>
@@ -3105,7 +4496,7 @@
 </ds:datastoreItem>
 </file>
 
-<file path=customXml/itemProps2.xml><?xml version="1.0" encoding="utf-8"?>
+<file path=customXml/itemProps3.xml><?xml version="1.0" encoding="utf-8"?>
 <ds:datastoreItem xmlns:ds="http://schemas.openxmlformats.org/officeDocument/2006/customXml" ds:itemID="{D017B7C4-7C08-4A59-890F-4719C7EEBD0B}">
   <ds:schemaRefs>
     <ds:schemaRef ds:uri="http://purl.org/dc/dcmitype/"/>
@@ -3120,12 +4511,4 @@
     <ds:schemaRef ds:uri="http://www.w3.org/XML/1998/namespace"/>
   </ds:schemaRefs>
 </ds:datastoreItem>
-</file>
-
-<file path=customXml/itemProps3.xml><?xml version="1.0" encoding="utf-8"?>
-<ds:datastoreItem xmlns:ds="http://schemas.openxmlformats.org/officeDocument/2006/customXml" ds:itemID="{3FEA80A5-E996-4AFB-AE99-8EED984C9B80}">
-  <ds:schemaRefs>
-    <ds:schemaRef ds:uri="http://schemas.microsoft.com/sharepoint/v3/contenttype/forms"/>
-  </ds:schemaRefs>
-</ds:datastoreItem>
 </file>
</xml_diff>

<commit_message>
added TREX error maps to slides
</commit_message>
<xml_diff>
--- a/presentations/MOI-CONCEPTS-2021/Soontiens_Sutherland_drift_DFO-MOI.pptx
+++ b/presentations/MOI-CONCEPTS-2021/Soontiens_Sutherland_drift_DFO-MOI.pptx
@@ -13,13 +13,19 @@
     <p:sldId id="261" r:id="rId10"/>
     <p:sldId id="262" r:id="rId11"/>
     <p:sldId id="263" r:id="rId12"/>
-    <p:sldId id="264" r:id="rId13"/>
-    <p:sldId id="265" r:id="rId14"/>
-    <p:sldId id="266" r:id="rId15"/>
-    <p:sldId id="267" r:id="rId16"/>
-    <p:sldId id="268" r:id="rId17"/>
-    <p:sldId id="269" r:id="rId18"/>
-    <p:sldId id="270" r:id="rId19"/>
+    <p:sldId id="271" r:id="rId13"/>
+    <p:sldId id="272" r:id="rId14"/>
+    <p:sldId id="273" r:id="rId15"/>
+    <p:sldId id="274" r:id="rId16"/>
+    <p:sldId id="275" r:id="rId17"/>
+    <p:sldId id="276" r:id="rId18"/>
+    <p:sldId id="264" r:id="rId19"/>
+    <p:sldId id="265" r:id="rId20"/>
+    <p:sldId id="266" r:id="rId21"/>
+    <p:sldId id="267" r:id="rId22"/>
+    <p:sldId id="268" r:id="rId23"/>
+    <p:sldId id="269" r:id="rId24"/>
+    <p:sldId id="270" r:id="rId25"/>
   </p:sldIdLst>
   <p:sldSz cx="9144000" cy="6858000" type="screen4x3"/>
   <p:notesSz cx="6858000" cy="9144000"/>
@@ -349,7 +355,7 @@
           <a:p>
             <a:fld id="{6F037ADB-4FB9-482D-A1A4-E1F489B212F5}" type="datetimeFigureOut">
               <a:rPr lang="en-US" smtClean="0"/>
-              <a:t>10/5/21</a:t>
+              <a:t>10/5/2021</a:t>
             </a:fld>
             <a:endParaRPr lang="en-US" dirty="0"/>
           </a:p>
@@ -496,7 +502,7 @@
           <a:p>
             <a:fld id="{6F037ADB-4FB9-482D-A1A4-E1F489B212F5}" type="datetimeFigureOut">
               <a:rPr lang="en-US" smtClean="0"/>
-              <a:t>10/5/21</a:t>
+              <a:t>10/5/2021</a:t>
             </a:fld>
             <a:endParaRPr lang="en-US"/>
           </a:p>
@@ -699,7 +705,7 @@
           <a:p>
             <a:fld id="{6F037ADB-4FB9-482D-A1A4-E1F489B212F5}" type="datetimeFigureOut">
               <a:rPr lang="en-US" smtClean="0"/>
-              <a:t>10/5/21</a:t>
+              <a:t>10/5/2021</a:t>
             </a:fld>
             <a:endParaRPr lang="en-US"/>
           </a:p>
@@ -1105,6 +1111,2116 @@
       </p:grpSpPr>
       <p:sp>
         <p:nvSpPr>
+          <p:cNvPr id="2" name="Title 1"/>
+          <p:cNvSpPr>
+            <a:spLocks noGrp="1"/>
+          </p:cNvSpPr>
+          <p:nvPr>
+            <p:ph type="title"/>
+          </p:nvPr>
+        </p:nvSpPr>
+        <p:spPr/>
+        <p:txBody>
+          <a:bodyPr/>
+          <a:lstStyle/>
+          <a:p>
+            <a:r>
+              <a:rPr lang="en-US" dirty="0" smtClean="0"/>
+              <a:t>BIAS Correction</a:t>
+            </a:r>
+            <a:endParaRPr lang="en-US" dirty="0"/>
+          </a:p>
+        </p:txBody>
+      </p:sp>
+      <mc:AlternateContent xmlns:mc="http://schemas.openxmlformats.org/markup-compatibility/2006">
+        <mc:Choice xmlns:a14="http://schemas.microsoft.com/office/drawing/2010/main" Requires="a14">
+          <p:sp>
+            <p:nvSpPr>
+              <p:cNvPr id="3" name="Content Placeholder 2"/>
+              <p:cNvSpPr>
+                <a:spLocks noGrp="1"/>
+              </p:cNvSpPr>
+              <p:nvPr>
+                <p:ph idx="1"/>
+              </p:nvPr>
+            </p:nvSpPr>
+            <p:spPr/>
+            <p:txBody>
+              <a:bodyPr>
+                <a:normAutofit/>
+              </a:bodyPr>
+              <a:lstStyle/>
+              <a:p>
+                <a:r>
+                  <a:rPr lang="en-US" dirty="0" smtClean="0"/>
+                  <a:t>For each drifter track</a:t>
+                </a:r>
+              </a:p>
+              <a:p>
+                <a:pPr lvl="1"/>
+                <a:r>
+                  <a:rPr lang="en-US" dirty="0" smtClean="0"/>
+                  <a:t>calculate </a:t>
+                </a:r>
+                <a14:m>
+                  <m:oMath xmlns:m="http://schemas.openxmlformats.org/officeDocument/2006/math">
+                    <m:r>
+                      <a:rPr lang="en-US" b="1" i="1" smtClean="0">
+                        <a:latin typeface="Cambria Math" panose="02040503050406030204" pitchFamily="18" charset="0"/>
+                        <a:ea typeface="Cambria Math" panose="02040503050406030204" pitchFamily="18" charset="0"/>
+                      </a:rPr>
+                      <m:t>𝜶</m:t>
+                    </m:r>
+                    <m:d>
+                      <m:dPr>
+                        <m:ctrlPr>
+                          <a:rPr lang="en-US" b="0" i="1" smtClean="0">
+                            <a:latin typeface="Cambria Math" panose="02040503050406030204" pitchFamily="18" charset="0"/>
+                            <a:ea typeface="Cambria Math" panose="02040503050406030204" pitchFamily="18" charset="0"/>
+                          </a:rPr>
+                        </m:ctrlPr>
+                      </m:dPr>
+                      <m:e>
+                        <m:r>
+                          <a:rPr lang="en-US" b="0" i="1" smtClean="0">
+                            <a:latin typeface="Cambria Math" panose="02040503050406030204" pitchFamily="18" charset="0"/>
+                            <a:ea typeface="Cambria Math" panose="02040503050406030204" pitchFamily="18" charset="0"/>
+                          </a:rPr>
+                          <m:t>𝑡</m:t>
+                        </m:r>
+                      </m:e>
+                    </m:d>
+                  </m:oMath>
+                </a14:m>
+                <a:endParaRPr lang="en-US" b="0" dirty="0" smtClean="0">
+                  <a:ea typeface="Cambria Math" panose="02040503050406030204" pitchFamily="18" charset="0"/>
+                </a:endParaRPr>
+              </a:p>
+              <a:p>
+                <a:pPr lvl="1"/>
+                <a:r>
+                  <a:rPr lang="en-US" dirty="0" smtClean="0"/>
+                  <a:t>use </a:t>
+                </a:r>
+                <a14:m>
+                  <m:oMath xmlns:m="http://schemas.openxmlformats.org/officeDocument/2006/math">
+                    <m:r>
+                      <a:rPr lang="en-US" b="1" i="1">
+                        <a:latin typeface="Cambria Math" panose="02040503050406030204" pitchFamily="18" charset="0"/>
+                        <a:ea typeface="Cambria Math" panose="02040503050406030204" pitchFamily="18" charset="0"/>
+                      </a:rPr>
+                      <m:t>𝜶</m:t>
+                    </m:r>
+                    <m:d>
+                      <m:dPr>
+                        <m:ctrlPr>
+                          <a:rPr lang="en-US" i="1">
+                            <a:latin typeface="Cambria Math" panose="02040503050406030204" pitchFamily="18" charset="0"/>
+                            <a:ea typeface="Cambria Math" panose="02040503050406030204" pitchFamily="18" charset="0"/>
+                          </a:rPr>
+                        </m:ctrlPr>
+                      </m:dPr>
+                      <m:e>
+                        <m:r>
+                          <a:rPr lang="en-US" i="1">
+                            <a:latin typeface="Cambria Math" panose="02040503050406030204" pitchFamily="18" charset="0"/>
+                            <a:ea typeface="Cambria Math" panose="02040503050406030204" pitchFamily="18" charset="0"/>
+                          </a:rPr>
+                          <m:t>𝑡</m:t>
+                        </m:r>
+                      </m:e>
+                    </m:d>
+                  </m:oMath>
+                </a14:m>
+                <a:r>
+                  <a:rPr lang="en-US" dirty="0" smtClean="0"/>
+                  <a:t> to produce an “adjusted velocity” as follows:</a:t>
+                </a:r>
+                <a:endParaRPr lang="en-US" dirty="0"/>
+              </a:p>
+              <a:p>
+                <a:pPr lvl="2"/>
+                <a14:m>
+                  <m:oMath xmlns:m="http://schemas.openxmlformats.org/officeDocument/2006/math">
+                    <m:sSub>
+                      <m:sSubPr>
+                        <m:ctrlPr>
+                          <a:rPr lang="en-US" b="1" i="1" smtClean="0">
+                            <a:latin typeface="Cambria Math" panose="02040503050406030204" pitchFamily="18" charset="0"/>
+                          </a:rPr>
+                        </m:ctrlPr>
+                      </m:sSubPr>
+                      <m:e>
+                        <m:r>
+                          <a:rPr lang="en-US" b="1" i="1" smtClean="0">
+                            <a:latin typeface="Cambria Math" panose="02040503050406030204" pitchFamily="18" charset="0"/>
+                          </a:rPr>
+                          <m:t>𝒖</m:t>
+                        </m:r>
+                      </m:e>
+                      <m:sub>
+                        <m:r>
+                          <a:rPr lang="en-US" b="1" i="1" smtClean="0">
+                            <a:latin typeface="Cambria Math" panose="02040503050406030204" pitchFamily="18" charset="0"/>
+                          </a:rPr>
+                          <m:t>𝒂𝒅𝒋</m:t>
+                        </m:r>
+                      </m:sub>
+                    </m:sSub>
+                    <m:d>
+                      <m:dPr>
+                        <m:ctrlPr>
+                          <a:rPr lang="en-US" b="0" i="1" smtClean="0">
+                            <a:latin typeface="Cambria Math" panose="02040503050406030204" pitchFamily="18" charset="0"/>
+                          </a:rPr>
+                        </m:ctrlPr>
+                      </m:dPr>
+                      <m:e>
+                        <m:r>
+                          <a:rPr lang="en-US" b="1" i="1" smtClean="0">
+                            <a:latin typeface="Cambria Math" panose="02040503050406030204" pitchFamily="18" charset="0"/>
+                          </a:rPr>
+                          <m:t>𝒙</m:t>
+                        </m:r>
+                        <m:r>
+                          <a:rPr lang="en-US" b="0" i="1" smtClean="0">
+                            <a:latin typeface="Cambria Math" panose="02040503050406030204" pitchFamily="18" charset="0"/>
+                          </a:rPr>
+                          <m:t>,</m:t>
+                        </m:r>
+                        <m:r>
+                          <a:rPr lang="en-US" b="0" i="1" smtClean="0">
+                            <a:latin typeface="Cambria Math" panose="02040503050406030204" pitchFamily="18" charset="0"/>
+                          </a:rPr>
+                          <m:t>𝑡</m:t>
+                        </m:r>
+                      </m:e>
+                    </m:d>
+                    <m:r>
+                      <a:rPr lang="en-US" b="0" i="1" smtClean="0">
+                        <a:latin typeface="Cambria Math" panose="02040503050406030204" pitchFamily="18" charset="0"/>
+                      </a:rPr>
+                      <m:t>=</m:t>
+                    </m:r>
+                    <m:sSub>
+                      <m:sSubPr>
+                        <m:ctrlPr>
+                          <a:rPr lang="en-US" b="1" i="1" smtClean="0">
+                            <a:latin typeface="Cambria Math" panose="02040503050406030204" pitchFamily="18" charset="0"/>
+                          </a:rPr>
+                        </m:ctrlPr>
+                      </m:sSubPr>
+                      <m:e>
+                        <m:r>
+                          <a:rPr lang="en-US" b="1" i="1" smtClean="0">
+                            <a:latin typeface="Cambria Math" panose="02040503050406030204" pitchFamily="18" charset="0"/>
+                          </a:rPr>
+                          <m:t>𝒖</m:t>
+                        </m:r>
+                      </m:e>
+                      <m:sub>
+                        <m:r>
+                          <a:rPr lang="en-US" b="1" i="1" smtClean="0">
+                            <a:latin typeface="Cambria Math" panose="02040503050406030204" pitchFamily="18" charset="0"/>
+                          </a:rPr>
+                          <m:t>𝒐</m:t>
+                        </m:r>
+                      </m:sub>
+                    </m:sSub>
+                    <m:d>
+                      <m:dPr>
+                        <m:ctrlPr>
+                          <a:rPr lang="en-US" b="0" i="1" smtClean="0">
+                            <a:latin typeface="Cambria Math" panose="02040503050406030204" pitchFamily="18" charset="0"/>
+                          </a:rPr>
+                        </m:ctrlPr>
+                      </m:dPr>
+                      <m:e>
+                        <m:r>
+                          <a:rPr lang="en-US" b="1" i="1" smtClean="0">
+                            <a:latin typeface="Cambria Math" panose="02040503050406030204" pitchFamily="18" charset="0"/>
+                          </a:rPr>
+                          <m:t>𝒙</m:t>
+                        </m:r>
+                        <m:r>
+                          <a:rPr lang="en-US" b="0" i="1" smtClean="0">
+                            <a:latin typeface="Cambria Math" panose="02040503050406030204" pitchFamily="18" charset="0"/>
+                          </a:rPr>
+                          <m:t>,</m:t>
+                        </m:r>
+                        <m:r>
+                          <a:rPr lang="en-US" b="0" i="1" smtClean="0">
+                            <a:latin typeface="Cambria Math" panose="02040503050406030204" pitchFamily="18" charset="0"/>
+                          </a:rPr>
+                          <m:t>𝑡</m:t>
+                        </m:r>
+                      </m:e>
+                    </m:d>
+                    <m:r>
+                      <a:rPr lang="en-US" b="0" i="1" smtClean="0">
+                        <a:latin typeface="Cambria Math" panose="02040503050406030204" pitchFamily="18" charset="0"/>
+                      </a:rPr>
+                      <m:t>+ </m:t>
+                    </m:r>
+                    <m:acc>
+                      <m:accPr>
+                        <m:chr m:val="̅"/>
+                        <m:ctrlPr>
+                          <a:rPr lang="en-US" b="0" i="1" smtClean="0">
+                            <a:latin typeface="Cambria Math" panose="02040503050406030204" pitchFamily="18" charset="0"/>
+                          </a:rPr>
+                        </m:ctrlPr>
+                      </m:accPr>
+                      <m:e>
+                        <m:r>
+                          <a:rPr lang="en-US" b="1" i="1" smtClean="0">
+                            <a:latin typeface="Cambria Math" panose="02040503050406030204" pitchFamily="18" charset="0"/>
+                            <a:ea typeface="Cambria Math" panose="02040503050406030204" pitchFamily="18" charset="0"/>
+                          </a:rPr>
+                          <m:t>𝜶</m:t>
+                        </m:r>
+                        <m:d>
+                          <m:dPr>
+                            <m:ctrlPr>
+                              <a:rPr lang="en-US" b="0" i="1" smtClean="0">
+                                <a:latin typeface="Cambria Math" panose="02040503050406030204" pitchFamily="18" charset="0"/>
+                                <a:ea typeface="Cambria Math" panose="02040503050406030204" pitchFamily="18" charset="0"/>
+                              </a:rPr>
+                            </m:ctrlPr>
+                          </m:dPr>
+                          <m:e>
+                            <m:r>
+                              <a:rPr lang="en-US" b="0" i="1" smtClean="0">
+                                <a:latin typeface="Cambria Math" panose="02040503050406030204" pitchFamily="18" charset="0"/>
+                                <a:ea typeface="Cambria Math" panose="02040503050406030204" pitchFamily="18" charset="0"/>
+                              </a:rPr>
+                              <m:t>𝑡</m:t>
+                            </m:r>
+                          </m:e>
+                        </m:d>
+                      </m:e>
+                    </m:acc>
+                    <m:sSub>
+                      <m:sSubPr>
+                        <m:ctrlPr>
+                          <a:rPr lang="en-US" i="1" smtClean="0">
+                            <a:latin typeface="Cambria Math" panose="02040503050406030204" pitchFamily="18" charset="0"/>
+                          </a:rPr>
+                        </m:ctrlPr>
+                      </m:sSubPr>
+                      <m:e>
+                        <m:r>
+                          <a:rPr lang="en-US" b="1" i="1" smtClean="0">
+                            <a:latin typeface="Cambria Math" panose="02040503050406030204" pitchFamily="18" charset="0"/>
+                          </a:rPr>
+                          <m:t>𝑼</m:t>
+                        </m:r>
+                      </m:e>
+                      <m:sub>
+                        <m:r>
+                          <a:rPr lang="en-US" b="0" i="1" smtClean="0">
+                            <a:latin typeface="Cambria Math" panose="02040503050406030204" pitchFamily="18" charset="0"/>
+                          </a:rPr>
+                          <m:t>10</m:t>
+                        </m:r>
+                      </m:sub>
+                    </m:sSub>
+                    <m:r>
+                      <a:rPr lang="en-US" b="0" i="1" smtClean="0">
+                        <a:latin typeface="Cambria Math" panose="02040503050406030204" pitchFamily="18" charset="0"/>
+                      </a:rPr>
+                      <m:t>(</m:t>
+                    </m:r>
+                    <m:r>
+                      <a:rPr lang="en-US" b="1" i="1" smtClean="0">
+                        <a:latin typeface="Cambria Math" panose="02040503050406030204" pitchFamily="18" charset="0"/>
+                      </a:rPr>
+                      <m:t>𝒙</m:t>
+                    </m:r>
+                    <m:r>
+                      <a:rPr lang="en-US" b="0" i="1" smtClean="0">
+                        <a:latin typeface="Cambria Math" panose="02040503050406030204" pitchFamily="18" charset="0"/>
+                      </a:rPr>
+                      <m:t>,</m:t>
+                    </m:r>
+                    <m:r>
+                      <a:rPr lang="en-US" b="0" i="1" smtClean="0">
+                        <a:latin typeface="Cambria Math" panose="02040503050406030204" pitchFamily="18" charset="0"/>
+                      </a:rPr>
+                      <m:t>𝑡</m:t>
+                    </m:r>
+                    <m:r>
+                      <a:rPr lang="en-US" b="0" i="1" smtClean="0">
+                        <a:latin typeface="Cambria Math" panose="02040503050406030204" pitchFamily="18" charset="0"/>
+                      </a:rPr>
+                      <m:t>)</m:t>
+                    </m:r>
+                  </m:oMath>
+                </a14:m>
+                <a:endParaRPr lang="en-US" i="1" dirty="0" smtClean="0">
+                  <a:latin typeface="Cambria Math" panose="02040503050406030204" pitchFamily="18" charset="0"/>
+                </a:endParaRPr>
+              </a:p>
+              <a:p>
+                <a:r>
+                  <a:rPr lang="en-US" dirty="0" smtClean="0"/>
+                  <a:t>Compare </a:t>
+                </a:r>
+                <a14:m>
+                  <m:oMath xmlns:m="http://schemas.openxmlformats.org/officeDocument/2006/math">
+                    <m:sSub>
+                      <m:sSubPr>
+                        <m:ctrlPr>
+                          <a:rPr lang="en-US" b="1" i="1">
+                            <a:latin typeface="Cambria Math" panose="02040503050406030204" pitchFamily="18" charset="0"/>
+                          </a:rPr>
+                        </m:ctrlPr>
+                      </m:sSubPr>
+                      <m:e>
+                        <m:r>
+                          <a:rPr lang="en-US" b="1" i="1">
+                            <a:latin typeface="Cambria Math" panose="02040503050406030204" pitchFamily="18" charset="0"/>
+                          </a:rPr>
+                          <m:t>𝒖</m:t>
+                        </m:r>
+                      </m:e>
+                      <m:sub>
+                        <m:r>
+                          <a:rPr lang="en-US" b="1" i="1">
+                            <a:latin typeface="Cambria Math" panose="02040503050406030204" pitchFamily="18" charset="0"/>
+                          </a:rPr>
+                          <m:t>𝒂𝒅𝒋</m:t>
+                        </m:r>
+                      </m:sub>
+                    </m:sSub>
+                    <m:d>
+                      <m:dPr>
+                        <m:ctrlPr>
+                          <a:rPr lang="en-US" i="1">
+                            <a:latin typeface="Cambria Math" panose="02040503050406030204" pitchFamily="18" charset="0"/>
+                          </a:rPr>
+                        </m:ctrlPr>
+                      </m:dPr>
+                      <m:e>
+                        <m:r>
+                          <a:rPr lang="en-US" b="1" i="1">
+                            <a:latin typeface="Cambria Math" panose="02040503050406030204" pitchFamily="18" charset="0"/>
+                          </a:rPr>
+                          <m:t>𝒙</m:t>
+                        </m:r>
+                        <m:r>
+                          <a:rPr lang="en-US" i="1">
+                            <a:latin typeface="Cambria Math" panose="02040503050406030204" pitchFamily="18" charset="0"/>
+                          </a:rPr>
+                          <m:t>,</m:t>
+                        </m:r>
+                        <m:r>
+                          <a:rPr lang="en-US" i="1">
+                            <a:latin typeface="Cambria Math" panose="02040503050406030204" pitchFamily="18" charset="0"/>
+                          </a:rPr>
+                          <m:t>𝑡</m:t>
+                        </m:r>
+                      </m:e>
+                    </m:d>
+                  </m:oMath>
+                </a14:m>
+                <a:r>
+                  <a:rPr lang="en-US" dirty="0" smtClean="0"/>
+                  <a:t> to </a:t>
+                </a:r>
+                <a14:m>
+                  <m:oMath xmlns:m="http://schemas.openxmlformats.org/officeDocument/2006/math">
+                    <m:sSub>
+                      <m:sSubPr>
+                        <m:ctrlPr>
+                          <a:rPr lang="en-US" b="1" i="1">
+                            <a:latin typeface="Cambria Math" panose="02040503050406030204" pitchFamily="18" charset="0"/>
+                          </a:rPr>
+                        </m:ctrlPr>
+                      </m:sSubPr>
+                      <m:e>
+                        <m:r>
+                          <a:rPr lang="en-US" b="1" i="1">
+                            <a:latin typeface="Cambria Math" panose="02040503050406030204" pitchFamily="18" charset="0"/>
+                          </a:rPr>
+                          <m:t>𝒖</m:t>
+                        </m:r>
+                      </m:e>
+                      <m:sub>
+                        <m:r>
+                          <a:rPr lang="en-US" b="1" i="1" smtClean="0">
+                            <a:latin typeface="Cambria Math" panose="02040503050406030204" pitchFamily="18" charset="0"/>
+                          </a:rPr>
+                          <m:t>𝒅</m:t>
+                        </m:r>
+                      </m:sub>
+                    </m:sSub>
+                    <m:d>
+                      <m:dPr>
+                        <m:ctrlPr>
+                          <a:rPr lang="en-US" i="1">
+                            <a:latin typeface="Cambria Math" panose="02040503050406030204" pitchFamily="18" charset="0"/>
+                          </a:rPr>
+                        </m:ctrlPr>
+                      </m:dPr>
+                      <m:e>
+                        <m:r>
+                          <a:rPr lang="en-US" b="1" i="1">
+                            <a:latin typeface="Cambria Math" panose="02040503050406030204" pitchFamily="18" charset="0"/>
+                          </a:rPr>
+                          <m:t>𝒙</m:t>
+                        </m:r>
+                        <m:r>
+                          <a:rPr lang="en-US" i="1">
+                            <a:latin typeface="Cambria Math" panose="02040503050406030204" pitchFamily="18" charset="0"/>
+                          </a:rPr>
+                          <m:t>,</m:t>
+                        </m:r>
+                        <m:r>
+                          <a:rPr lang="en-US" i="1">
+                            <a:latin typeface="Cambria Math" panose="02040503050406030204" pitchFamily="18" charset="0"/>
+                          </a:rPr>
+                          <m:t>𝑡</m:t>
+                        </m:r>
+                      </m:e>
+                    </m:d>
+                  </m:oMath>
+                </a14:m>
+                <a:r>
+                  <a:rPr lang="en-US" dirty="0" smtClean="0"/>
+                  <a:t> to produce maps of velocity error</a:t>
+                </a:r>
+                <a:endParaRPr lang="en-US" dirty="0"/>
+              </a:p>
+              <a:p>
+                <a:endParaRPr lang="en-US" dirty="0"/>
+              </a:p>
+            </p:txBody>
+          </p:sp>
+        </mc:Choice>
+        <mc:Fallback>
+          <p:sp>
+            <p:nvSpPr>
+              <p:cNvPr id="3" name="Content Placeholder 2"/>
+              <p:cNvSpPr>
+                <a:spLocks noGrp="1" noRot="1" noChangeAspect="1" noMove="1" noResize="1" noEditPoints="1" noAdjustHandles="1" noChangeArrowheads="1" noChangeShapeType="1" noTextEdit="1"/>
+              </p:cNvSpPr>
+              <p:nvPr>
+                <p:ph idx="1"/>
+              </p:nvPr>
+            </p:nvSpPr>
+            <p:spPr>
+              <a:blipFill>
+                <a:blip r:embed="rId2"/>
+                <a:stretch>
+                  <a:fillRect l="-1704" t="-1752"/>
+                </a:stretch>
+              </a:blipFill>
+            </p:spPr>
+            <p:txBody>
+              <a:bodyPr/>
+              <a:lstStyle/>
+              <a:p>
+                <a:r>
+                  <a:rPr lang="en-US">
+                    <a:noFill/>
+                  </a:rPr>
+                  <a:t> </a:t>
+                </a:r>
+              </a:p>
+            </p:txBody>
+          </p:sp>
+        </mc:Fallback>
+      </mc:AlternateContent>
+    </p:spTree>
+    <p:extLst>
+      <p:ext uri="{BB962C8B-B14F-4D97-AF65-F5344CB8AC3E}">
+        <p14:creationId xmlns:p14="http://schemas.microsoft.com/office/powerpoint/2010/main" val="1717639535"/>
+      </p:ext>
+    </p:extLst>
+  </p:cSld>
+  <p:clrMapOvr>
+    <a:masterClrMapping/>
+  </p:clrMapOvr>
+</p:sld>
+</file>
+
+<file path=ppt/slides/slide11.xml><?xml version="1.0" encoding="utf-8"?>
+<p:sld xmlns:a="http://schemas.openxmlformats.org/drawingml/2006/main" xmlns:r="http://schemas.openxmlformats.org/officeDocument/2006/relationships" xmlns:p="http://schemas.openxmlformats.org/presentationml/2006/main">
+  <p:cSld>
+    <p:spTree>
+      <p:nvGrpSpPr>
+        <p:cNvPr id="1" name=""/>
+        <p:cNvGrpSpPr/>
+        <p:nvPr/>
+      </p:nvGrpSpPr>
+      <p:grpSpPr>
+        <a:xfrm>
+          <a:off x="0" y="0"/>
+          <a:ext cx="0" cy="0"/>
+          <a:chOff x="0" y="0"/>
+          <a:chExt cx="0" cy="0"/>
+        </a:xfrm>
+      </p:grpSpPr>
+      <p:sp>
+        <p:nvSpPr>
+          <p:cNvPr id="2" name="Title 1"/>
+          <p:cNvSpPr>
+            <a:spLocks noGrp="1"/>
+          </p:cNvSpPr>
+          <p:nvPr>
+            <p:ph type="title"/>
+          </p:nvPr>
+        </p:nvSpPr>
+        <p:spPr/>
+        <p:txBody>
+          <a:bodyPr/>
+          <a:lstStyle/>
+          <a:p>
+            <a:r>
+              <a:rPr lang="en-US" dirty="0" smtClean="0"/>
+              <a:t>CIOPSE </a:t>
+            </a:r>
+            <a:endParaRPr lang="en-US" dirty="0"/>
+          </a:p>
+        </p:txBody>
+      </p:sp>
+      <p:pic>
+        <p:nvPicPr>
+          <p:cNvPr id="4" name="Content Placeholder 3"/>
+          <p:cNvPicPr>
+            <a:picLocks noGrp="1" noChangeAspect="1"/>
+          </p:cNvPicPr>
+          <p:nvPr>
+            <p:ph idx="1"/>
+          </p:nvPr>
+        </p:nvPicPr>
+        <p:blipFill>
+          <a:blip r:embed="rId2">
+            <a:extLst>
+              <a:ext uri="{28A0092B-C50C-407E-A947-70E740481C1C}">
+                <a14:useLocalDpi xmlns:a14="http://schemas.microsoft.com/office/drawing/2010/main" val="0"/>
+              </a:ext>
+            </a:extLst>
+          </a:blip>
+          <a:stretch>
+            <a:fillRect/>
+          </a:stretch>
+        </p:blipFill>
+        <p:spPr>
+          <a:xfrm>
+            <a:off x="457200" y="1814688"/>
+            <a:ext cx="8229600" cy="4096986"/>
+          </a:xfrm>
+        </p:spPr>
+      </p:pic>
+    </p:spTree>
+    <p:extLst>
+      <p:ext uri="{BB962C8B-B14F-4D97-AF65-F5344CB8AC3E}">
+        <p14:creationId xmlns:p14="http://schemas.microsoft.com/office/powerpoint/2010/main" val="1916907661"/>
+      </p:ext>
+    </p:extLst>
+  </p:cSld>
+  <p:clrMapOvr>
+    <a:masterClrMapping/>
+  </p:clrMapOvr>
+</p:sld>
+</file>
+
+<file path=ppt/slides/slide12.xml><?xml version="1.0" encoding="utf-8"?>
+<p:sld xmlns:a="http://schemas.openxmlformats.org/drawingml/2006/main" xmlns:r="http://schemas.openxmlformats.org/officeDocument/2006/relationships" xmlns:p="http://schemas.openxmlformats.org/presentationml/2006/main">
+  <p:cSld>
+    <p:spTree>
+      <p:nvGrpSpPr>
+        <p:cNvPr id="1" name=""/>
+        <p:cNvGrpSpPr/>
+        <p:nvPr/>
+      </p:nvGrpSpPr>
+      <p:grpSpPr>
+        <a:xfrm>
+          <a:off x="0" y="0"/>
+          <a:ext cx="0" cy="0"/>
+          <a:chOff x="0" y="0"/>
+          <a:chExt cx="0" cy="0"/>
+        </a:xfrm>
+      </p:grpSpPr>
+      <p:sp>
+        <p:nvSpPr>
+          <p:cNvPr id="2" name="Title 1"/>
+          <p:cNvSpPr>
+            <a:spLocks noGrp="1"/>
+          </p:cNvSpPr>
+          <p:nvPr>
+            <p:ph type="title"/>
+          </p:nvPr>
+        </p:nvSpPr>
+        <p:spPr/>
+        <p:txBody>
+          <a:bodyPr/>
+          <a:lstStyle/>
+          <a:p>
+            <a:r>
+              <a:rPr lang="en-US" dirty="0" smtClean="0"/>
+              <a:t>GSL500</a:t>
+            </a:r>
+            <a:endParaRPr lang="en-US" dirty="0"/>
+          </a:p>
+        </p:txBody>
+      </p:sp>
+      <p:pic>
+        <p:nvPicPr>
+          <p:cNvPr id="4" name="Content Placeholder 3"/>
+          <p:cNvPicPr>
+            <a:picLocks noGrp="1" noChangeAspect="1"/>
+          </p:cNvPicPr>
+          <p:nvPr>
+            <p:ph idx="1"/>
+          </p:nvPr>
+        </p:nvPicPr>
+        <p:blipFill>
+          <a:blip r:embed="rId2">
+            <a:extLst>
+              <a:ext uri="{28A0092B-C50C-407E-A947-70E740481C1C}">
+                <a14:useLocalDpi xmlns:a14="http://schemas.microsoft.com/office/drawing/2010/main" val="0"/>
+              </a:ext>
+            </a:extLst>
+          </a:blip>
+          <a:stretch>
+            <a:fillRect/>
+          </a:stretch>
+        </p:blipFill>
+        <p:spPr>
+          <a:xfrm>
+            <a:off x="457200" y="1814688"/>
+            <a:ext cx="8229600" cy="4096986"/>
+          </a:xfrm>
+        </p:spPr>
+      </p:pic>
+    </p:spTree>
+    <p:extLst>
+      <p:ext uri="{BB962C8B-B14F-4D97-AF65-F5344CB8AC3E}">
+        <p14:creationId xmlns:p14="http://schemas.microsoft.com/office/powerpoint/2010/main" val="863453225"/>
+      </p:ext>
+    </p:extLst>
+  </p:cSld>
+  <p:clrMapOvr>
+    <a:masterClrMapping/>
+  </p:clrMapOvr>
+</p:sld>
+</file>
+
+<file path=ppt/slides/slide13.xml><?xml version="1.0" encoding="utf-8"?>
+<p:sld xmlns:a="http://schemas.openxmlformats.org/drawingml/2006/main" xmlns:r="http://schemas.openxmlformats.org/officeDocument/2006/relationships" xmlns:p="http://schemas.openxmlformats.org/presentationml/2006/main">
+  <p:cSld>
+    <p:spTree>
+      <p:nvGrpSpPr>
+        <p:cNvPr id="1" name=""/>
+        <p:cNvGrpSpPr/>
+        <p:nvPr/>
+      </p:nvGrpSpPr>
+      <p:grpSpPr>
+        <a:xfrm>
+          <a:off x="0" y="0"/>
+          <a:ext cx="0" cy="0"/>
+          <a:chOff x="0" y="0"/>
+          <a:chExt cx="0" cy="0"/>
+        </a:xfrm>
+      </p:grpSpPr>
+      <p:sp>
+        <p:nvSpPr>
+          <p:cNvPr id="2" name="Title 1"/>
+          <p:cNvSpPr>
+            <a:spLocks noGrp="1"/>
+          </p:cNvSpPr>
+          <p:nvPr>
+            <p:ph type="title"/>
+          </p:nvPr>
+        </p:nvSpPr>
+        <p:spPr/>
+        <p:txBody>
+          <a:bodyPr/>
+          <a:lstStyle/>
+          <a:p>
+            <a:r>
+              <a:rPr lang="en-US" dirty="0" smtClean="0"/>
+              <a:t>SPEED Error</a:t>
+            </a:r>
+            <a:endParaRPr lang="en-US" dirty="0"/>
+          </a:p>
+        </p:txBody>
+      </p:sp>
+      <p:pic>
+        <p:nvPicPr>
+          <p:cNvPr id="4" name="Content Placeholder 3"/>
+          <p:cNvPicPr>
+            <a:picLocks noGrp="1" noChangeAspect="1"/>
+          </p:cNvPicPr>
+          <p:nvPr>
+            <p:ph idx="1"/>
+          </p:nvPr>
+        </p:nvPicPr>
+        <p:blipFill>
+          <a:blip r:embed="rId2">
+            <a:extLst>
+              <a:ext uri="{28A0092B-C50C-407E-A947-70E740481C1C}">
+                <a14:useLocalDpi xmlns:a14="http://schemas.microsoft.com/office/drawing/2010/main" val="0"/>
+              </a:ext>
+            </a:extLst>
+          </a:blip>
+          <a:stretch>
+            <a:fillRect/>
+          </a:stretch>
+        </p:blipFill>
+        <p:spPr>
+          <a:xfrm>
+            <a:off x="80384" y="2060848"/>
+            <a:ext cx="4491615" cy="3626919"/>
+          </a:xfrm>
+        </p:spPr>
+      </p:pic>
+      <p:pic>
+        <p:nvPicPr>
+          <p:cNvPr id="5" name="Picture 4"/>
+          <p:cNvPicPr>
+            <a:picLocks noChangeAspect="1"/>
+          </p:cNvPicPr>
+          <p:nvPr/>
+        </p:nvPicPr>
+        <p:blipFill>
+          <a:blip r:embed="rId3">
+            <a:extLst>
+              <a:ext uri="{28A0092B-C50C-407E-A947-70E740481C1C}">
+                <a14:useLocalDpi xmlns:a14="http://schemas.microsoft.com/office/drawing/2010/main" val="0"/>
+              </a:ext>
+            </a:extLst>
+          </a:blip>
+          <a:stretch>
+            <a:fillRect/>
+          </a:stretch>
+        </p:blipFill>
+        <p:spPr>
+          <a:xfrm>
+            <a:off x="4572000" y="2060849"/>
+            <a:ext cx="4458774" cy="3600400"/>
+          </a:xfrm>
+          <a:prstGeom prst="rect">
+            <a:avLst/>
+          </a:prstGeom>
+        </p:spPr>
+      </p:pic>
+      <mc:AlternateContent xmlns:mc="http://schemas.openxmlformats.org/markup-compatibility/2006">
+        <mc:Choice xmlns:a14="http://schemas.microsoft.com/office/drawing/2010/main" Requires="a14">
+          <p:sp>
+            <p:nvSpPr>
+              <p:cNvPr id="6" name="TextBox 5">
+                <a:extLst>
+                  <a:ext uri="{FF2B5EF4-FFF2-40B4-BE49-F238E27FC236}">
+                    <a16:creationId xmlns:a16="http://schemas.microsoft.com/office/drawing/2014/main" id="{530C8AAD-DEBD-1D4F-9DC0-F0C3B63E2EEE}"/>
+                  </a:ext>
+                </a:extLst>
+              </p:cNvPr>
+              <p:cNvSpPr txBox="1"/>
+              <p:nvPr/>
+            </p:nvSpPr>
+            <p:spPr>
+              <a:xfrm>
+                <a:off x="429033" y="5661249"/>
+                <a:ext cx="3603261" cy="369332"/>
+              </a:xfrm>
+              <a:prstGeom prst="rect">
+                <a:avLst/>
+              </a:prstGeom>
+              <a:noFill/>
+            </p:spPr>
+            <p:txBody>
+              <a:bodyPr wrap="square" rtlCol="0">
+                <a:spAutoFit/>
+              </a:bodyPr>
+              <a:lstStyle/>
+              <a:p>
+                <a14:m>
+                  <m:oMathPara xmlns:m="http://schemas.openxmlformats.org/officeDocument/2006/math">
+                    <m:oMathParaPr>
+                      <m:jc m:val="centerGroup"/>
+                    </m:oMathParaPr>
+                    <m:oMath xmlns:m="http://schemas.openxmlformats.org/officeDocument/2006/math">
+                      <m:sSup>
+                        <m:sSupPr>
+                          <m:ctrlPr>
+                            <a:rPr lang="en-CA" i="1" smtClean="0">
+                              <a:latin typeface="Cambria Math" panose="02040503050406030204" pitchFamily="18" charset="0"/>
+                            </a:rPr>
+                          </m:ctrlPr>
+                        </m:sSupPr>
+                        <m:e>
+                          <m:r>
+                            <a:rPr lang="en-CA" i="1" smtClean="0">
+                              <a:latin typeface="Cambria Math" panose="02040503050406030204" pitchFamily="18" charset="0"/>
+                              <a:ea typeface="Cambria Math" panose="02040503050406030204" pitchFamily="18" charset="0"/>
+                            </a:rPr>
+                            <m:t>𝛾</m:t>
+                          </m:r>
+                        </m:e>
+                        <m:sup>
+                          <m:r>
+                            <a:rPr lang="en-US" b="0" i="1" smtClean="0">
+                              <a:latin typeface="Cambria Math" panose="02040503050406030204" pitchFamily="18" charset="0"/>
+                            </a:rPr>
+                            <m:t>2</m:t>
+                          </m:r>
+                        </m:sup>
+                      </m:sSup>
+                      <m:r>
+                        <a:rPr lang="en-US" b="0" i="1" smtClean="0">
+                          <a:latin typeface="Cambria Math" panose="02040503050406030204" pitchFamily="18" charset="0"/>
+                        </a:rPr>
+                        <m:t>=1.18 </m:t>
+                      </m:r>
+                    </m:oMath>
+                  </m:oMathPara>
+                </a14:m>
+                <a:endParaRPr lang="en-CA" dirty="0"/>
+              </a:p>
+            </p:txBody>
+          </p:sp>
+        </mc:Choice>
+        <mc:Fallback>
+          <p:sp>
+            <p:nvSpPr>
+              <p:cNvPr id="6" name="TextBox 5">
+                <a:extLst>
+                  <a:ext uri="{FF2B5EF4-FFF2-40B4-BE49-F238E27FC236}">
+                    <a16:creationId xmlns:a16="http://schemas.microsoft.com/office/drawing/2014/main" id="{530C8AAD-DEBD-1D4F-9DC0-F0C3B63E2EEE}"/>
+                  </a:ext>
+                </a:extLst>
+              </p:cNvPr>
+              <p:cNvSpPr txBox="1">
+                <a:spLocks noRot="1" noChangeAspect="1" noMove="1" noResize="1" noEditPoints="1" noAdjustHandles="1" noChangeArrowheads="1" noChangeShapeType="1" noTextEdit="1"/>
+              </p:cNvSpPr>
+              <p:nvPr/>
+            </p:nvSpPr>
+            <p:spPr>
+              <a:xfrm>
+                <a:off x="429033" y="5661249"/>
+                <a:ext cx="3603261" cy="369332"/>
+              </a:xfrm>
+              <a:prstGeom prst="rect">
+                <a:avLst/>
+              </a:prstGeom>
+              <a:blipFill>
+                <a:blip r:embed="rId4"/>
+                <a:stretch>
+                  <a:fillRect b="-6667"/>
+                </a:stretch>
+              </a:blipFill>
+            </p:spPr>
+            <p:txBody>
+              <a:bodyPr/>
+              <a:lstStyle/>
+              <a:p>
+                <a:r>
+                  <a:rPr lang="en-US">
+                    <a:noFill/>
+                  </a:rPr>
+                  <a:t> </a:t>
+                </a:r>
+              </a:p>
+            </p:txBody>
+          </p:sp>
+        </mc:Fallback>
+      </mc:AlternateContent>
+      <mc:AlternateContent xmlns:mc="http://schemas.openxmlformats.org/markup-compatibility/2006">
+        <mc:Choice xmlns:a14="http://schemas.microsoft.com/office/drawing/2010/main" Requires="a14">
+          <p:sp>
+            <p:nvSpPr>
+              <p:cNvPr id="8" name="TextBox 7"/>
+              <p:cNvSpPr txBox="1"/>
+              <p:nvPr/>
+            </p:nvSpPr>
+            <p:spPr>
+              <a:xfrm>
+                <a:off x="3585194" y="5853598"/>
+                <a:ext cx="2190343" cy="584712"/>
+              </a:xfrm>
+              <a:prstGeom prst="rect">
+                <a:avLst/>
+              </a:prstGeom>
+              <a:noFill/>
+            </p:spPr>
+            <p:txBody>
+              <a:bodyPr wrap="none" lIns="0" tIns="0" rIns="0" bIns="0" rtlCol="0">
+                <a:spAutoFit/>
+              </a:bodyPr>
+              <a:lstStyle/>
+              <a:p>
+                <a14:m>
+                  <m:oMathPara xmlns:m="http://schemas.openxmlformats.org/officeDocument/2006/math">
+                    <m:oMathParaPr>
+                      <m:jc m:val="centerGroup"/>
+                    </m:oMathParaPr>
+                    <m:oMath xmlns:m="http://schemas.openxmlformats.org/officeDocument/2006/math">
+                      <m:sSup>
+                        <m:sSupPr>
+                          <m:ctrlPr>
+                            <a:rPr lang="en-US" i="1" smtClean="0">
+                              <a:latin typeface="Cambria Math" panose="02040503050406030204" pitchFamily="18" charset="0"/>
+                            </a:rPr>
+                          </m:ctrlPr>
+                        </m:sSupPr>
+                        <m:e>
+                          <m:r>
+                            <a:rPr lang="en-US" i="1" smtClean="0">
+                              <a:latin typeface="Cambria Math" panose="02040503050406030204" pitchFamily="18" charset="0"/>
+                              <a:ea typeface="Cambria Math" panose="02040503050406030204" pitchFamily="18" charset="0"/>
+                            </a:rPr>
+                            <m:t>𝛾</m:t>
+                          </m:r>
+                        </m:e>
+                        <m:sup>
+                          <m:r>
+                            <a:rPr lang="en-US" b="0" i="1" smtClean="0">
+                              <a:latin typeface="Cambria Math" panose="02040503050406030204" pitchFamily="18" charset="0"/>
+                            </a:rPr>
+                            <m:t>2</m:t>
+                          </m:r>
+                        </m:sup>
+                      </m:sSup>
+                      <m:r>
+                        <a:rPr lang="en-US" b="0" i="1" smtClean="0">
+                          <a:latin typeface="Cambria Math" panose="02040503050406030204" pitchFamily="18" charset="0"/>
+                        </a:rPr>
+                        <m:t>= </m:t>
+                      </m:r>
+                      <m:f>
+                        <m:fPr>
+                          <m:ctrlPr>
+                            <a:rPr lang="en-US" b="0" i="1" smtClean="0">
+                              <a:latin typeface="Cambria Math" panose="02040503050406030204" pitchFamily="18" charset="0"/>
+                            </a:rPr>
+                          </m:ctrlPr>
+                        </m:fPr>
+                        <m:num>
+                          <m:r>
+                            <a:rPr lang="en-US" b="0" i="1" smtClean="0">
+                              <a:latin typeface="Cambria Math" panose="02040503050406030204" pitchFamily="18" charset="0"/>
+                            </a:rPr>
+                            <m:t>𝑣𝑎𝑟</m:t>
+                          </m:r>
+                          <m:r>
+                            <a:rPr lang="en-US" b="0" i="1" smtClean="0">
+                              <a:latin typeface="Cambria Math" panose="02040503050406030204" pitchFamily="18" charset="0"/>
+                            </a:rPr>
+                            <m:t>(</m:t>
+                          </m:r>
+                          <m:sSub>
+                            <m:sSubPr>
+                              <m:ctrlPr>
+                                <a:rPr lang="en-US" b="0" i="1" smtClean="0">
+                                  <a:latin typeface="Cambria Math" panose="02040503050406030204" pitchFamily="18" charset="0"/>
+                                </a:rPr>
+                              </m:ctrlPr>
+                            </m:sSubPr>
+                            <m:e>
+                              <m:r>
+                                <a:rPr lang="en-US" b="0" i="1" smtClean="0">
+                                  <a:latin typeface="Cambria Math" panose="02040503050406030204" pitchFamily="18" charset="0"/>
+                                </a:rPr>
+                                <m:t>𝑢</m:t>
+                              </m:r>
+                            </m:e>
+                            <m:sub>
+                              <m:r>
+                                <a:rPr lang="en-US" b="0" i="1" smtClean="0">
+                                  <a:latin typeface="Cambria Math" panose="02040503050406030204" pitchFamily="18" charset="0"/>
+                                </a:rPr>
+                                <m:t>𝑎𝑑𝑗</m:t>
+                              </m:r>
+                            </m:sub>
+                          </m:sSub>
+                          <m:r>
+                            <a:rPr lang="en-US" b="0" i="1" smtClean="0">
+                              <a:latin typeface="Cambria Math" panose="02040503050406030204" pitchFamily="18" charset="0"/>
+                            </a:rPr>
+                            <m:t>−</m:t>
+                          </m:r>
+                          <m:sSub>
+                            <m:sSubPr>
+                              <m:ctrlPr>
+                                <a:rPr lang="en-US" b="0" i="1" smtClean="0">
+                                  <a:latin typeface="Cambria Math" panose="02040503050406030204" pitchFamily="18" charset="0"/>
+                                </a:rPr>
+                              </m:ctrlPr>
+                            </m:sSubPr>
+                            <m:e>
+                              <m:r>
+                                <a:rPr lang="en-US" b="0" i="1" smtClean="0">
+                                  <a:latin typeface="Cambria Math" panose="02040503050406030204" pitchFamily="18" charset="0"/>
+                                </a:rPr>
+                                <m:t>𝑢</m:t>
+                              </m:r>
+                            </m:e>
+                            <m:sub>
+                              <m:r>
+                                <a:rPr lang="en-US" b="0" i="1" smtClean="0">
+                                  <a:latin typeface="Cambria Math" panose="02040503050406030204" pitchFamily="18" charset="0"/>
+                                </a:rPr>
+                                <m:t>𝑑</m:t>
+                              </m:r>
+                            </m:sub>
+                          </m:sSub>
+                          <m:r>
+                            <a:rPr lang="en-US" b="0" i="1" smtClean="0">
+                              <a:latin typeface="Cambria Math" panose="02040503050406030204" pitchFamily="18" charset="0"/>
+                            </a:rPr>
+                            <m:t>)</m:t>
+                          </m:r>
+                        </m:num>
+                        <m:den>
+                          <m:r>
+                            <a:rPr lang="en-US" b="0" i="1" smtClean="0">
+                              <a:latin typeface="Cambria Math" panose="02040503050406030204" pitchFamily="18" charset="0"/>
+                            </a:rPr>
+                            <m:t>𝑣𝑎𝑟</m:t>
+                          </m:r>
+                          <m:r>
+                            <a:rPr lang="en-US" b="0" i="1" smtClean="0">
+                              <a:latin typeface="Cambria Math" panose="02040503050406030204" pitchFamily="18" charset="0"/>
+                            </a:rPr>
+                            <m:t>(</m:t>
+                          </m:r>
+                          <m:sSub>
+                            <m:sSubPr>
+                              <m:ctrlPr>
+                                <a:rPr lang="en-US" b="0" i="1" smtClean="0">
+                                  <a:latin typeface="Cambria Math" panose="02040503050406030204" pitchFamily="18" charset="0"/>
+                                </a:rPr>
+                              </m:ctrlPr>
+                            </m:sSubPr>
+                            <m:e>
+                              <m:r>
+                                <a:rPr lang="en-US" b="0" i="1" smtClean="0">
+                                  <a:latin typeface="Cambria Math" panose="02040503050406030204" pitchFamily="18" charset="0"/>
+                                </a:rPr>
+                                <m:t>𝑢</m:t>
+                              </m:r>
+                            </m:e>
+                            <m:sub>
+                              <m:r>
+                                <a:rPr lang="en-US" b="0" i="1" smtClean="0">
+                                  <a:latin typeface="Cambria Math" panose="02040503050406030204" pitchFamily="18" charset="0"/>
+                                </a:rPr>
+                                <m:t>𝑑</m:t>
+                              </m:r>
+                            </m:sub>
+                          </m:sSub>
+                          <m:r>
+                            <a:rPr lang="en-US" b="0" i="1" smtClean="0">
+                              <a:latin typeface="Cambria Math" panose="02040503050406030204" pitchFamily="18" charset="0"/>
+                            </a:rPr>
+                            <m:t>)</m:t>
+                          </m:r>
+                        </m:den>
+                      </m:f>
+                    </m:oMath>
+                  </m:oMathPara>
+                </a14:m>
+                <a:endParaRPr lang="en-US" dirty="0"/>
+              </a:p>
+            </p:txBody>
+          </p:sp>
+        </mc:Choice>
+        <mc:Fallback>
+          <p:sp>
+            <p:nvSpPr>
+              <p:cNvPr id="8" name="TextBox 7"/>
+              <p:cNvSpPr txBox="1">
+                <a:spLocks noRot="1" noChangeAspect="1" noMove="1" noResize="1" noEditPoints="1" noAdjustHandles="1" noChangeArrowheads="1" noChangeShapeType="1" noTextEdit="1"/>
+              </p:cNvSpPr>
+              <p:nvPr/>
+            </p:nvSpPr>
+            <p:spPr>
+              <a:xfrm>
+                <a:off x="3585194" y="5853598"/>
+                <a:ext cx="2190343" cy="584712"/>
+              </a:xfrm>
+              <a:prstGeom prst="rect">
+                <a:avLst/>
+              </a:prstGeom>
+              <a:blipFill>
+                <a:blip r:embed="rId5"/>
+                <a:stretch>
+                  <a:fillRect/>
+                </a:stretch>
+              </a:blipFill>
+            </p:spPr>
+            <p:txBody>
+              <a:bodyPr/>
+              <a:lstStyle/>
+              <a:p>
+                <a:r>
+                  <a:rPr lang="en-US">
+                    <a:noFill/>
+                  </a:rPr>
+                  <a:t> </a:t>
+                </a:r>
+              </a:p>
+            </p:txBody>
+          </p:sp>
+        </mc:Fallback>
+      </mc:AlternateContent>
+      <mc:AlternateContent xmlns:mc="http://schemas.openxmlformats.org/markup-compatibility/2006">
+        <mc:Choice xmlns:a14="http://schemas.microsoft.com/office/drawing/2010/main" Requires="a14">
+          <p:sp>
+            <p:nvSpPr>
+              <p:cNvPr id="9" name="TextBox 8">
+                <a:extLst>
+                  <a:ext uri="{FF2B5EF4-FFF2-40B4-BE49-F238E27FC236}">
+                    <a16:creationId xmlns:a16="http://schemas.microsoft.com/office/drawing/2014/main" id="{530C8AAD-DEBD-1D4F-9DC0-F0C3B63E2EEE}"/>
+                  </a:ext>
+                </a:extLst>
+              </p:cNvPr>
+              <p:cNvSpPr txBox="1"/>
+              <p:nvPr/>
+            </p:nvSpPr>
+            <p:spPr>
+              <a:xfrm>
+                <a:off x="5220072" y="5643838"/>
+                <a:ext cx="3603261" cy="369332"/>
+              </a:xfrm>
+              <a:prstGeom prst="rect">
+                <a:avLst/>
+              </a:prstGeom>
+              <a:noFill/>
+            </p:spPr>
+            <p:txBody>
+              <a:bodyPr wrap="square" rtlCol="0">
+                <a:spAutoFit/>
+              </a:bodyPr>
+              <a:lstStyle/>
+              <a:p>
+                <a14:m>
+                  <m:oMathPara xmlns:m="http://schemas.openxmlformats.org/officeDocument/2006/math">
+                    <m:oMathParaPr>
+                      <m:jc m:val="centerGroup"/>
+                    </m:oMathParaPr>
+                    <m:oMath xmlns:m="http://schemas.openxmlformats.org/officeDocument/2006/math">
+                      <m:sSup>
+                        <m:sSupPr>
+                          <m:ctrlPr>
+                            <a:rPr lang="en-CA" i="1" smtClean="0">
+                              <a:latin typeface="Cambria Math" panose="02040503050406030204" pitchFamily="18" charset="0"/>
+                            </a:rPr>
+                          </m:ctrlPr>
+                        </m:sSupPr>
+                        <m:e>
+                          <m:r>
+                            <a:rPr lang="en-CA" i="1" smtClean="0">
+                              <a:latin typeface="Cambria Math" panose="02040503050406030204" pitchFamily="18" charset="0"/>
+                              <a:ea typeface="Cambria Math" panose="02040503050406030204" pitchFamily="18" charset="0"/>
+                            </a:rPr>
+                            <m:t>𝛾</m:t>
+                          </m:r>
+                        </m:e>
+                        <m:sup>
+                          <m:r>
+                            <a:rPr lang="en-US" b="0" i="1" smtClean="0">
+                              <a:latin typeface="Cambria Math" panose="02040503050406030204" pitchFamily="18" charset="0"/>
+                            </a:rPr>
+                            <m:t>2</m:t>
+                          </m:r>
+                        </m:sup>
+                      </m:sSup>
+                      <m:r>
+                        <a:rPr lang="en-US" b="0" i="1" smtClean="0">
+                          <a:latin typeface="Cambria Math" panose="02040503050406030204" pitchFamily="18" charset="0"/>
+                        </a:rPr>
+                        <m:t>=1.36</m:t>
+                      </m:r>
+                    </m:oMath>
+                  </m:oMathPara>
+                </a14:m>
+                <a:endParaRPr lang="en-CA" dirty="0"/>
+              </a:p>
+            </p:txBody>
+          </p:sp>
+        </mc:Choice>
+        <mc:Fallback>
+          <p:sp>
+            <p:nvSpPr>
+              <p:cNvPr id="9" name="TextBox 8">
+                <a:extLst>
+                  <a:ext uri="{FF2B5EF4-FFF2-40B4-BE49-F238E27FC236}">
+                    <a16:creationId xmlns:a16="http://schemas.microsoft.com/office/drawing/2014/main" id="{530C8AAD-DEBD-1D4F-9DC0-F0C3B63E2EEE}"/>
+                  </a:ext>
+                </a:extLst>
+              </p:cNvPr>
+              <p:cNvSpPr txBox="1">
+                <a:spLocks noRot="1" noChangeAspect="1" noMove="1" noResize="1" noEditPoints="1" noAdjustHandles="1" noChangeArrowheads="1" noChangeShapeType="1" noTextEdit="1"/>
+              </p:cNvSpPr>
+              <p:nvPr/>
+            </p:nvSpPr>
+            <p:spPr>
+              <a:xfrm>
+                <a:off x="5220072" y="5643838"/>
+                <a:ext cx="3603261" cy="369332"/>
+              </a:xfrm>
+              <a:prstGeom prst="rect">
+                <a:avLst/>
+              </a:prstGeom>
+              <a:blipFill>
+                <a:blip r:embed="rId6"/>
+                <a:stretch>
+                  <a:fillRect b="-6667"/>
+                </a:stretch>
+              </a:blipFill>
+            </p:spPr>
+            <p:txBody>
+              <a:bodyPr/>
+              <a:lstStyle/>
+              <a:p>
+                <a:r>
+                  <a:rPr lang="en-US">
+                    <a:noFill/>
+                  </a:rPr>
+                  <a:t> </a:t>
+                </a:r>
+              </a:p>
+            </p:txBody>
+          </p:sp>
+        </mc:Fallback>
+      </mc:AlternateContent>
+      <p:sp>
+        <p:nvSpPr>
+          <p:cNvPr id="10" name="TextBox 9"/>
+          <p:cNvSpPr txBox="1"/>
+          <p:nvPr/>
+        </p:nvSpPr>
+        <p:spPr>
+          <a:xfrm>
+            <a:off x="1975488" y="1616208"/>
+            <a:ext cx="2592288" cy="369332"/>
+          </a:xfrm>
+          <a:prstGeom prst="rect">
+            <a:avLst/>
+          </a:prstGeom>
+          <a:noFill/>
+        </p:spPr>
+        <p:txBody>
+          <a:bodyPr wrap="square" rtlCol="0">
+            <a:spAutoFit/>
+          </a:bodyPr>
+          <a:lstStyle/>
+          <a:p>
+            <a:r>
+              <a:rPr lang="en-US" b="1" dirty="0" smtClean="0"/>
+              <a:t>CIOPSE</a:t>
+            </a:r>
+            <a:endParaRPr lang="en-US" b="1" dirty="0"/>
+          </a:p>
+        </p:txBody>
+      </p:sp>
+      <p:sp>
+        <p:nvSpPr>
+          <p:cNvPr id="11" name="TextBox 10"/>
+          <p:cNvSpPr txBox="1"/>
+          <p:nvPr/>
+        </p:nvSpPr>
+        <p:spPr>
+          <a:xfrm>
+            <a:off x="6429707" y="1576403"/>
+            <a:ext cx="2592288" cy="369332"/>
+          </a:xfrm>
+          <a:prstGeom prst="rect">
+            <a:avLst/>
+          </a:prstGeom>
+          <a:noFill/>
+        </p:spPr>
+        <p:txBody>
+          <a:bodyPr wrap="square" rtlCol="0">
+            <a:spAutoFit/>
+          </a:bodyPr>
+          <a:lstStyle/>
+          <a:p>
+            <a:r>
+              <a:rPr lang="en-US" b="1" dirty="0" smtClean="0"/>
+              <a:t>GSL500</a:t>
+            </a:r>
+            <a:endParaRPr lang="en-US" b="1" dirty="0"/>
+          </a:p>
+        </p:txBody>
+      </p:sp>
+    </p:spTree>
+    <p:extLst>
+      <p:ext uri="{BB962C8B-B14F-4D97-AF65-F5344CB8AC3E}">
+        <p14:creationId xmlns:p14="http://schemas.microsoft.com/office/powerpoint/2010/main" val="2068513348"/>
+      </p:ext>
+    </p:extLst>
+  </p:cSld>
+  <p:clrMapOvr>
+    <a:masterClrMapping/>
+  </p:clrMapOvr>
+</p:sld>
+</file>
+
+<file path=ppt/slides/slide14.xml><?xml version="1.0" encoding="utf-8"?>
+<p:sld xmlns:a="http://schemas.openxmlformats.org/drawingml/2006/main" xmlns:r="http://schemas.openxmlformats.org/officeDocument/2006/relationships" xmlns:p="http://schemas.openxmlformats.org/presentationml/2006/main">
+  <p:cSld>
+    <p:spTree>
+      <p:nvGrpSpPr>
+        <p:cNvPr id="1" name=""/>
+        <p:cNvGrpSpPr/>
+        <p:nvPr/>
+      </p:nvGrpSpPr>
+      <p:grpSpPr>
+        <a:xfrm>
+          <a:off x="0" y="0"/>
+          <a:ext cx="0" cy="0"/>
+          <a:chOff x="0" y="0"/>
+          <a:chExt cx="0" cy="0"/>
+        </a:xfrm>
+      </p:grpSpPr>
+      <p:sp>
+        <p:nvSpPr>
+          <p:cNvPr id="2" name="Title 1"/>
+          <p:cNvSpPr>
+            <a:spLocks noGrp="1"/>
+          </p:cNvSpPr>
+          <p:nvPr>
+            <p:ph type="title"/>
+          </p:nvPr>
+        </p:nvSpPr>
+        <p:spPr/>
+        <p:txBody>
+          <a:bodyPr/>
+          <a:lstStyle/>
+          <a:p>
+            <a:r>
+              <a:rPr lang="en-US" dirty="0" smtClean="0"/>
+              <a:t>ROTARY </a:t>
+            </a:r>
+            <a:r>
+              <a:rPr lang="en-US" dirty="0" err="1" smtClean="0"/>
+              <a:t>SPECTRa</a:t>
+            </a:r>
+            <a:r>
+              <a:rPr lang="en-US" dirty="0"/>
+              <a:t>?</a:t>
+            </a:r>
+          </a:p>
+        </p:txBody>
+      </p:sp>
+      <p:sp>
+        <p:nvSpPr>
+          <p:cNvPr id="3" name="Content Placeholder 2"/>
+          <p:cNvSpPr>
+            <a:spLocks noGrp="1"/>
+          </p:cNvSpPr>
+          <p:nvPr>
+            <p:ph idx="1"/>
+          </p:nvPr>
+        </p:nvSpPr>
+        <p:spPr/>
+        <p:txBody>
+          <a:bodyPr/>
+          <a:lstStyle/>
+          <a:p>
+            <a:endParaRPr lang="en-US"/>
+          </a:p>
+        </p:txBody>
+      </p:sp>
+    </p:spTree>
+    <p:extLst>
+      <p:ext uri="{BB962C8B-B14F-4D97-AF65-F5344CB8AC3E}">
+        <p14:creationId xmlns:p14="http://schemas.microsoft.com/office/powerpoint/2010/main" val="2478731994"/>
+      </p:ext>
+    </p:extLst>
+  </p:cSld>
+  <p:clrMapOvr>
+    <a:masterClrMapping/>
+  </p:clrMapOvr>
+</p:sld>
+</file>
+
+<file path=ppt/slides/slide15.xml><?xml version="1.0" encoding="utf-8"?>
+<p:sld xmlns:a="http://schemas.openxmlformats.org/drawingml/2006/main" xmlns:r="http://schemas.openxmlformats.org/officeDocument/2006/relationships" xmlns:p="http://schemas.openxmlformats.org/presentationml/2006/main">
+  <p:cSld>
+    <p:spTree>
+      <p:nvGrpSpPr>
+        <p:cNvPr id="1" name=""/>
+        <p:cNvGrpSpPr/>
+        <p:nvPr/>
+      </p:nvGrpSpPr>
+      <p:grpSpPr>
+        <a:xfrm>
+          <a:off x="0" y="0"/>
+          <a:ext cx="0" cy="0"/>
+          <a:chOff x="0" y="0"/>
+          <a:chExt cx="0" cy="0"/>
+        </a:xfrm>
+      </p:grpSpPr>
+      <p:sp>
+        <p:nvSpPr>
+          <p:cNvPr id="2" name="Title 1">
+            <a:extLst>
+              <a:ext uri="{FF2B5EF4-FFF2-40B4-BE49-F238E27FC236}">
+                <a16:creationId xmlns:a16="http://schemas.microsoft.com/office/drawing/2014/main" id="{52F89091-A38D-CB48-8958-9075C24806CE}"/>
+              </a:ext>
+            </a:extLst>
+          </p:cNvPr>
+          <p:cNvSpPr>
+            <a:spLocks noGrp="1"/>
+          </p:cNvSpPr>
+          <p:nvPr>
+            <p:ph type="title"/>
+          </p:nvPr>
+        </p:nvSpPr>
+        <p:spPr/>
+        <p:txBody>
+          <a:bodyPr>
+            <a:normAutofit fontScale="90000"/>
+          </a:bodyPr>
+          <a:lstStyle/>
+          <a:p>
+            <a:r>
+              <a:rPr lang="en-CA" dirty="0"/>
+              <a:t>Finite Scale Lyapunov Exponent (FSLE)</a:t>
+            </a:r>
+          </a:p>
+        </p:txBody>
+      </p:sp>
+      <mc:AlternateContent xmlns:mc="http://schemas.openxmlformats.org/markup-compatibility/2006" xmlns:a14="http://schemas.microsoft.com/office/drawing/2010/main">
+        <mc:Choice Requires="a14">
+          <p:sp>
+            <p:nvSpPr>
+              <p:cNvPr id="3" name="Content Placeholder 2">
+                <a:extLst>
+                  <a:ext uri="{FF2B5EF4-FFF2-40B4-BE49-F238E27FC236}">
+                    <a16:creationId xmlns:a16="http://schemas.microsoft.com/office/drawing/2014/main" id="{0FE13DA4-569E-9E44-9E57-8543AA7273FE}"/>
+                  </a:ext>
+                </a:extLst>
+              </p:cNvPr>
+              <p:cNvSpPr>
+                <a:spLocks noGrp="1"/>
+              </p:cNvSpPr>
+              <p:nvPr>
+                <p:ph idx="1"/>
+              </p:nvPr>
+            </p:nvSpPr>
+            <p:spPr/>
+            <p:txBody>
+              <a:bodyPr>
+                <a:normAutofit fontScale="92500" lnSpcReduction="20000"/>
+              </a:bodyPr>
+              <a:lstStyle/>
+              <a:p>
+                <a:r>
+                  <a:rPr lang="en-CA" dirty="0"/>
+                  <a:t>An alternative approach to relative dispersion is to use the separation distance as the independent variable and average exit times</a:t>
+                </a:r>
+              </a:p>
+              <a:p>
+                <a:r>
+                  <a:rPr lang="en-CA" dirty="0"/>
+                  <a:t>Choose distances that increase multiplicatively </a:t>
+                </a:r>
+                <a14:m>
+                  <m:oMath xmlns:m="http://schemas.openxmlformats.org/officeDocument/2006/math">
+                    <m:sSub>
+                      <m:sSubPr>
+                        <m:ctrlPr>
+                          <a:rPr lang="en-US" b="0" i="1" smtClean="0">
+                            <a:latin typeface="Cambria Math" panose="02040503050406030204" pitchFamily="18" charset="0"/>
+                          </a:rPr>
+                        </m:ctrlPr>
+                      </m:sSubPr>
+                      <m:e>
+                        <m:r>
+                          <a:rPr lang="en-US" b="0" i="1" smtClean="0">
+                            <a:latin typeface="Cambria Math" panose="02040503050406030204" pitchFamily="18" charset="0"/>
+                          </a:rPr>
+                          <m:t>𝛿</m:t>
+                        </m:r>
+                      </m:e>
+                      <m:sub>
+                        <m:r>
+                          <a:rPr lang="en-US" b="0" i="1" smtClean="0">
+                            <a:latin typeface="Cambria Math" panose="02040503050406030204" pitchFamily="18" charset="0"/>
+                          </a:rPr>
+                          <m:t>𝑛</m:t>
+                        </m:r>
+                      </m:sub>
+                    </m:sSub>
+                    <m:r>
+                      <a:rPr lang="en-US" b="0" i="1" smtClean="0">
+                        <a:latin typeface="Cambria Math" panose="02040503050406030204" pitchFamily="18" charset="0"/>
+                      </a:rPr>
+                      <m:t>=</m:t>
+                    </m:r>
+                    <m:r>
+                      <a:rPr lang="en-US" b="0" i="1" smtClean="0">
+                        <a:latin typeface="Cambria Math" panose="02040503050406030204" pitchFamily="18" charset="0"/>
+                      </a:rPr>
+                      <m:t>𝑟</m:t>
+                    </m:r>
+                    <m:sSub>
+                      <m:sSubPr>
+                        <m:ctrlPr>
+                          <a:rPr lang="en-US" b="0" i="1" smtClean="0">
+                            <a:latin typeface="Cambria Math" panose="02040503050406030204" pitchFamily="18" charset="0"/>
+                          </a:rPr>
+                        </m:ctrlPr>
+                      </m:sSubPr>
+                      <m:e>
+                        <m:r>
+                          <a:rPr lang="en-US" b="0" i="1" smtClean="0">
+                            <a:latin typeface="Cambria Math" panose="02040503050406030204" pitchFamily="18" charset="0"/>
+                          </a:rPr>
+                          <m:t>𝛿</m:t>
+                        </m:r>
+                      </m:e>
+                      <m:sub>
+                        <m:r>
+                          <a:rPr lang="en-US" b="0" i="1" smtClean="0">
+                            <a:latin typeface="Cambria Math" panose="02040503050406030204" pitchFamily="18" charset="0"/>
+                          </a:rPr>
+                          <m:t>𝑛</m:t>
+                        </m:r>
+                        <m:r>
+                          <a:rPr lang="en-US" b="0" i="1" smtClean="0">
+                            <a:latin typeface="Cambria Math" panose="02040503050406030204" pitchFamily="18" charset="0"/>
+                          </a:rPr>
+                          <m:t>−1</m:t>
+                        </m:r>
+                      </m:sub>
+                    </m:sSub>
+                    <m:r>
+                      <a:rPr lang="en-US" b="0" i="1" smtClean="0">
+                        <a:latin typeface="Cambria Math" panose="02040503050406030204" pitchFamily="18" charset="0"/>
+                      </a:rPr>
+                      <m:t>=</m:t>
+                    </m:r>
+                    <m:sSup>
+                      <m:sSupPr>
+                        <m:ctrlPr>
+                          <a:rPr lang="en-US" b="0" i="1" smtClean="0">
+                            <a:latin typeface="Cambria Math" panose="02040503050406030204" pitchFamily="18" charset="0"/>
+                          </a:rPr>
+                        </m:ctrlPr>
+                      </m:sSupPr>
+                      <m:e>
+                        <m:r>
+                          <a:rPr lang="en-US" b="0" i="1" smtClean="0">
+                            <a:latin typeface="Cambria Math" panose="02040503050406030204" pitchFamily="18" charset="0"/>
+                          </a:rPr>
+                          <m:t>𝑟</m:t>
+                        </m:r>
+                      </m:e>
+                      <m:sup>
+                        <m:r>
+                          <a:rPr lang="en-US" b="0" i="1" smtClean="0">
+                            <a:latin typeface="Cambria Math" panose="02040503050406030204" pitchFamily="18" charset="0"/>
+                          </a:rPr>
+                          <m:t>𝑛</m:t>
+                        </m:r>
+                      </m:sup>
+                    </m:sSup>
+                    <m:sSub>
+                      <m:sSubPr>
+                        <m:ctrlPr>
+                          <a:rPr lang="en-US" b="0" i="1" smtClean="0">
+                            <a:latin typeface="Cambria Math" panose="02040503050406030204" pitchFamily="18" charset="0"/>
+                          </a:rPr>
+                        </m:ctrlPr>
+                      </m:sSubPr>
+                      <m:e>
+                        <m:r>
+                          <a:rPr lang="en-US" b="0" i="1" smtClean="0">
+                            <a:latin typeface="Cambria Math" panose="02040503050406030204" pitchFamily="18" charset="0"/>
+                          </a:rPr>
+                          <m:t>𝑑</m:t>
+                        </m:r>
+                      </m:e>
+                      <m:sub>
+                        <m:r>
+                          <a:rPr lang="en-US" b="0" i="1" smtClean="0">
+                            <a:latin typeface="Cambria Math" panose="02040503050406030204" pitchFamily="18" charset="0"/>
+                          </a:rPr>
+                          <m:t>0</m:t>
+                        </m:r>
+                      </m:sub>
+                    </m:sSub>
+                  </m:oMath>
+                </a14:m>
+                <a:endParaRPr lang="en-CA" dirty="0"/>
+              </a:p>
+              <a:p>
+                <a:r>
+                  <a:rPr lang="en-CA" dirty="0"/>
+                  <a:t>Assuming exponential increase between bins </a:t>
+                </a:r>
+                <a14:m>
+                  <m:oMath xmlns:m="http://schemas.openxmlformats.org/officeDocument/2006/math">
+                    <m:sSub>
+                      <m:sSubPr>
+                        <m:ctrlPr>
+                          <a:rPr lang="en-US" b="0" i="1" smtClean="0">
+                            <a:latin typeface="Cambria Math" panose="02040503050406030204" pitchFamily="18" charset="0"/>
+                          </a:rPr>
+                        </m:ctrlPr>
+                      </m:sSubPr>
+                      <m:e>
+                        <m:r>
+                          <a:rPr lang="en-US" b="0" i="1" smtClean="0">
+                            <a:latin typeface="Cambria Math" panose="02040503050406030204" pitchFamily="18" charset="0"/>
+                          </a:rPr>
+                          <m:t>𝛿</m:t>
+                        </m:r>
+                      </m:e>
+                      <m:sub>
+                        <m:r>
+                          <a:rPr lang="en-US" b="0" i="1" smtClean="0">
+                            <a:latin typeface="Cambria Math" panose="02040503050406030204" pitchFamily="18" charset="0"/>
+                          </a:rPr>
+                          <m:t>𝑛</m:t>
+                        </m:r>
+                      </m:sub>
+                    </m:sSub>
+                    <m:r>
+                      <a:rPr lang="en-US" b="0" i="1" smtClean="0">
+                        <a:latin typeface="Cambria Math" panose="02040503050406030204" pitchFamily="18" charset="0"/>
+                      </a:rPr>
+                      <m:t>=</m:t>
+                    </m:r>
+                    <m:sSub>
+                      <m:sSubPr>
+                        <m:ctrlPr>
+                          <a:rPr lang="en-US" b="0" i="1" smtClean="0">
+                            <a:latin typeface="Cambria Math" panose="02040503050406030204" pitchFamily="18" charset="0"/>
+                          </a:rPr>
+                        </m:ctrlPr>
+                      </m:sSubPr>
+                      <m:e>
+                        <m:r>
+                          <a:rPr lang="en-US" b="0" i="1" smtClean="0">
+                            <a:latin typeface="Cambria Math" panose="02040503050406030204" pitchFamily="18" charset="0"/>
+                          </a:rPr>
+                          <m:t>𝛿</m:t>
+                        </m:r>
+                      </m:e>
+                      <m:sub>
+                        <m:r>
+                          <a:rPr lang="en-US" b="0" i="1" smtClean="0">
+                            <a:latin typeface="Cambria Math" panose="02040503050406030204" pitchFamily="18" charset="0"/>
+                          </a:rPr>
+                          <m:t>𝑛</m:t>
+                        </m:r>
+                        <m:r>
+                          <a:rPr lang="en-US" b="0" i="1" smtClean="0">
+                            <a:latin typeface="Cambria Math" panose="02040503050406030204" pitchFamily="18" charset="0"/>
+                          </a:rPr>
+                          <m:t>−1</m:t>
+                        </m:r>
+                      </m:sub>
+                    </m:sSub>
+                    <m:sSup>
+                      <m:sSupPr>
+                        <m:ctrlPr>
+                          <a:rPr lang="en-US" b="0" i="1" smtClean="0">
+                            <a:latin typeface="Cambria Math" panose="02040503050406030204" pitchFamily="18" charset="0"/>
+                          </a:rPr>
+                        </m:ctrlPr>
+                      </m:sSupPr>
+                      <m:e>
+                        <m:r>
+                          <a:rPr lang="en-US" b="0" i="1" smtClean="0">
+                            <a:latin typeface="Cambria Math" panose="02040503050406030204" pitchFamily="18" charset="0"/>
+                          </a:rPr>
+                          <m:t>𝑒</m:t>
+                        </m:r>
+                      </m:e>
+                      <m:sup>
+                        <m:sSub>
+                          <m:sSubPr>
+                            <m:ctrlPr>
+                              <a:rPr lang="en-US" b="0" i="1" smtClean="0">
+                                <a:latin typeface="Cambria Math" panose="02040503050406030204" pitchFamily="18" charset="0"/>
+                              </a:rPr>
+                            </m:ctrlPr>
+                          </m:sSubPr>
+                          <m:e>
+                            <m:r>
+                              <a:rPr lang="en-US" b="0" i="1" smtClean="0">
+                                <a:latin typeface="Cambria Math" panose="02040503050406030204" pitchFamily="18" charset="0"/>
+                              </a:rPr>
+                              <m:t>𝜆</m:t>
+                            </m:r>
+                          </m:e>
+                          <m:sub>
+                            <m:r>
+                              <a:rPr lang="en-US" b="0" i="1" smtClean="0">
+                                <a:latin typeface="Cambria Math" panose="02040503050406030204" pitchFamily="18" charset="0"/>
+                              </a:rPr>
+                              <m:t>𝑛</m:t>
+                            </m:r>
+                          </m:sub>
+                        </m:sSub>
+                        <m:r>
+                          <a:rPr lang="en-US" b="0" i="1" smtClean="0">
+                            <a:latin typeface="Cambria Math" panose="02040503050406030204" pitchFamily="18" charset="0"/>
+                          </a:rPr>
+                          <m:t>𝑡</m:t>
+                        </m:r>
+                      </m:sup>
+                    </m:sSup>
+                    <m:r>
+                      <a:rPr lang="en-US" b="0" i="1" smtClean="0">
+                        <a:latin typeface="Cambria Math" panose="02040503050406030204" pitchFamily="18" charset="0"/>
+                      </a:rPr>
+                      <m:t>→</m:t>
+                    </m:r>
+                    <m:sSub>
+                      <m:sSubPr>
+                        <m:ctrlPr>
+                          <a:rPr lang="en-US" b="0" i="1" smtClean="0">
+                            <a:latin typeface="Cambria Math" panose="02040503050406030204" pitchFamily="18" charset="0"/>
+                          </a:rPr>
+                        </m:ctrlPr>
+                      </m:sSubPr>
+                      <m:e>
+                        <m:r>
+                          <a:rPr lang="en-US" b="0" i="1" smtClean="0">
+                            <a:latin typeface="Cambria Math" panose="02040503050406030204" pitchFamily="18" charset="0"/>
+                          </a:rPr>
+                          <m:t>𝜆</m:t>
+                        </m:r>
+                      </m:e>
+                      <m:sub>
+                        <m:r>
+                          <a:rPr lang="en-US" b="0" i="1" smtClean="0">
+                            <a:latin typeface="Cambria Math" panose="02040503050406030204" pitchFamily="18" charset="0"/>
+                          </a:rPr>
+                          <m:t>𝑛</m:t>
+                        </m:r>
+                      </m:sub>
+                    </m:sSub>
+                    <m:r>
+                      <a:rPr lang="en-US" b="0" i="1" smtClean="0">
+                        <a:latin typeface="Cambria Math" panose="02040503050406030204" pitchFamily="18" charset="0"/>
+                      </a:rPr>
+                      <m:t>=</m:t>
+                    </m:r>
+                    <m:f>
+                      <m:fPr>
+                        <m:ctrlPr>
+                          <a:rPr lang="en-US" b="0" i="1" smtClean="0">
+                            <a:latin typeface="Cambria Math" panose="02040503050406030204" pitchFamily="18" charset="0"/>
+                          </a:rPr>
+                        </m:ctrlPr>
+                      </m:fPr>
+                      <m:num>
+                        <m:func>
+                          <m:funcPr>
+                            <m:ctrlPr>
+                              <a:rPr lang="en-US" b="0" i="1" smtClean="0">
+                                <a:latin typeface="Cambria Math" panose="02040503050406030204" pitchFamily="18" charset="0"/>
+                              </a:rPr>
+                            </m:ctrlPr>
+                          </m:funcPr>
+                          <m:fName>
+                            <m:r>
+                              <m:rPr>
+                                <m:sty m:val="p"/>
+                              </m:rPr>
+                              <a:rPr lang="en-US" b="0" i="0" smtClean="0">
+                                <a:latin typeface="Cambria Math" panose="02040503050406030204" pitchFamily="18" charset="0"/>
+                              </a:rPr>
+                              <m:t>ln</m:t>
+                            </m:r>
+                          </m:fName>
+                          <m:e>
+                            <m:d>
+                              <m:dPr>
+                                <m:ctrlPr>
+                                  <a:rPr lang="en-US" b="0" i="1" smtClean="0">
+                                    <a:latin typeface="Cambria Math" panose="02040503050406030204" pitchFamily="18" charset="0"/>
+                                  </a:rPr>
+                                </m:ctrlPr>
+                              </m:dPr>
+                              <m:e>
+                                <m:r>
+                                  <a:rPr lang="en-US" b="0" i="1" smtClean="0">
+                                    <a:latin typeface="Cambria Math" panose="02040503050406030204" pitchFamily="18" charset="0"/>
+                                  </a:rPr>
+                                  <m:t>𝑟</m:t>
+                                </m:r>
+                              </m:e>
+                            </m:d>
+                          </m:e>
+                        </m:func>
+                      </m:num>
+                      <m:den>
+                        <m:r>
+                          <a:rPr lang="en-US" b="0" i="1" smtClean="0">
+                            <a:latin typeface="Cambria Math" panose="02040503050406030204" pitchFamily="18" charset="0"/>
+                          </a:rPr>
+                          <m:t>&lt;</m:t>
+                        </m:r>
+                        <m:sSub>
+                          <m:sSubPr>
+                            <m:ctrlPr>
+                              <a:rPr lang="en-US" b="0" i="1" smtClean="0">
+                                <a:latin typeface="Cambria Math" panose="02040503050406030204" pitchFamily="18" charset="0"/>
+                              </a:rPr>
+                            </m:ctrlPr>
+                          </m:sSubPr>
+                          <m:e>
+                            <m:r>
+                              <a:rPr lang="en-US" b="0" i="1" smtClean="0">
+                                <a:latin typeface="Cambria Math" panose="02040503050406030204" pitchFamily="18" charset="0"/>
+                              </a:rPr>
+                              <m:t>𝑇</m:t>
+                            </m:r>
+                          </m:e>
+                          <m:sub>
+                            <m:r>
+                              <a:rPr lang="en-US" b="0" i="1" smtClean="0">
+                                <a:latin typeface="Cambria Math" panose="02040503050406030204" pitchFamily="18" charset="0"/>
+                              </a:rPr>
+                              <m:t>𝑛</m:t>
+                            </m:r>
+                          </m:sub>
+                        </m:sSub>
+                        <m:r>
+                          <a:rPr lang="en-US" b="0" i="1" smtClean="0">
+                            <a:latin typeface="Cambria Math" panose="02040503050406030204" pitchFamily="18" charset="0"/>
+                          </a:rPr>
+                          <m:t>&gt;</m:t>
+                        </m:r>
+                      </m:den>
+                    </m:f>
+                  </m:oMath>
+                </a14:m>
+                <a:endParaRPr lang="en-CA" dirty="0"/>
+              </a:p>
+              <a:p>
+                <a14:m>
+                  <m:oMath xmlns:m="http://schemas.openxmlformats.org/officeDocument/2006/math">
+                    <m:r>
+                      <a:rPr lang="en-US" i="1">
+                        <a:latin typeface="Cambria Math" panose="02040503050406030204" pitchFamily="18" charset="0"/>
+                      </a:rPr>
+                      <m:t>𝜆</m:t>
+                    </m:r>
+                  </m:oMath>
+                </a14:m>
+                <a:r>
+                  <a:rPr lang="en-CA" dirty="0"/>
+                  <a:t> &gt; 0 implies chaos. Can also be used to assess scale dependence of dispersion</a:t>
+                </a:r>
+              </a:p>
+              <a:p>
+                <a:r>
+                  <a:rPr lang="en-CA" dirty="0"/>
+                  <a:t>If rms separation is </a:t>
+                </a:r>
+                <a14:m>
+                  <m:oMath xmlns:m="http://schemas.openxmlformats.org/officeDocument/2006/math">
+                    <m:r>
+                      <a:rPr lang="en-US" b="0" i="1" smtClean="0">
+                        <a:latin typeface="Cambria Math" panose="02040503050406030204" pitchFamily="18" charset="0"/>
+                      </a:rPr>
+                      <m:t>&lt;</m:t>
+                    </m:r>
+                    <m:sSup>
+                      <m:sSupPr>
+                        <m:ctrlPr>
+                          <a:rPr lang="en-US" b="0" i="1" smtClean="0">
+                            <a:latin typeface="Cambria Math" panose="02040503050406030204" pitchFamily="18" charset="0"/>
+                          </a:rPr>
+                        </m:ctrlPr>
+                      </m:sSupPr>
+                      <m:e>
+                        <m:r>
+                          <a:rPr lang="en-US" b="0" i="1" smtClean="0">
+                            <a:latin typeface="Cambria Math" panose="02040503050406030204" pitchFamily="18" charset="0"/>
+                          </a:rPr>
+                          <m:t>𝑦</m:t>
+                        </m:r>
+                      </m:e>
+                      <m:sup>
+                        <m:r>
+                          <a:rPr lang="en-US" b="0" i="1" smtClean="0">
+                            <a:latin typeface="Cambria Math" panose="02040503050406030204" pitchFamily="18" charset="0"/>
+                          </a:rPr>
+                          <m:t>2</m:t>
+                        </m:r>
+                      </m:sup>
+                    </m:sSup>
+                    <m:r>
+                      <a:rPr lang="en-US" b="0" i="1" smtClean="0">
+                        <a:latin typeface="Cambria Math" panose="02040503050406030204" pitchFamily="18" charset="0"/>
+                      </a:rPr>
+                      <m:t>&gt; ∝</m:t>
+                    </m:r>
+                    <m:sSup>
+                      <m:sSupPr>
+                        <m:ctrlPr>
+                          <a:rPr lang="en-US" b="0" i="1" smtClean="0">
+                            <a:latin typeface="Cambria Math" panose="02040503050406030204" pitchFamily="18" charset="0"/>
+                          </a:rPr>
+                        </m:ctrlPr>
+                      </m:sSupPr>
+                      <m:e>
+                        <m:r>
+                          <a:rPr lang="en-US" b="0" i="1" smtClean="0">
+                            <a:latin typeface="Cambria Math" panose="02040503050406030204" pitchFamily="18" charset="0"/>
+                          </a:rPr>
+                          <m:t>𝑡</m:t>
+                        </m:r>
+                      </m:e>
+                      <m:sup>
+                        <m:r>
+                          <a:rPr lang="en-US" b="0" i="1" smtClean="0">
+                            <a:latin typeface="Cambria Math" panose="02040503050406030204" pitchFamily="18" charset="0"/>
+                          </a:rPr>
+                          <m:t>𝛼</m:t>
+                        </m:r>
+                      </m:sup>
+                    </m:sSup>
+                    <m:r>
+                      <a:rPr lang="en-US" b="0" i="1" smtClean="0">
+                        <a:latin typeface="Cambria Math" panose="02040503050406030204" pitchFamily="18" charset="0"/>
+                      </a:rPr>
+                      <m:t>→</m:t>
+                    </m:r>
+                    <m:r>
+                      <a:rPr lang="en-US" b="0" i="1" smtClean="0">
+                        <a:latin typeface="Cambria Math" panose="02040503050406030204" pitchFamily="18" charset="0"/>
+                      </a:rPr>
+                      <m:t>𝜆</m:t>
+                    </m:r>
+                    <m:r>
+                      <a:rPr lang="en-US" b="0" i="1" smtClean="0">
+                        <a:latin typeface="Cambria Math" panose="02040503050406030204" pitchFamily="18" charset="0"/>
+                      </a:rPr>
+                      <m:t>∝</m:t>
+                    </m:r>
+                    <m:sSup>
+                      <m:sSupPr>
+                        <m:ctrlPr>
+                          <a:rPr lang="en-US" b="0" i="1" smtClean="0">
+                            <a:latin typeface="Cambria Math" panose="02040503050406030204" pitchFamily="18" charset="0"/>
+                          </a:rPr>
+                        </m:ctrlPr>
+                      </m:sSupPr>
+                      <m:e>
+                        <m:r>
+                          <a:rPr lang="en-US" b="0" i="1" smtClean="0">
+                            <a:latin typeface="Cambria Math" panose="02040503050406030204" pitchFamily="18" charset="0"/>
+                          </a:rPr>
+                          <m:t>𝑦</m:t>
+                        </m:r>
+                      </m:e>
+                      <m:sup>
+                        <m:r>
+                          <a:rPr lang="en-US" b="0" i="1" smtClean="0">
+                            <a:latin typeface="Cambria Math" panose="02040503050406030204" pitchFamily="18" charset="0"/>
+                          </a:rPr>
+                          <m:t>−2/</m:t>
+                        </m:r>
+                        <m:r>
+                          <a:rPr lang="en-US" b="0" i="1" smtClean="0">
+                            <a:latin typeface="Cambria Math" panose="02040503050406030204" pitchFamily="18" charset="0"/>
+                          </a:rPr>
+                          <m:t>𝛼</m:t>
+                        </m:r>
+                      </m:sup>
+                    </m:sSup>
+                  </m:oMath>
+                </a14:m>
+                <a:endParaRPr lang="en-CA" dirty="0"/>
+              </a:p>
+              <a:p>
+                <a:endParaRPr lang="en-CA" dirty="0"/>
+              </a:p>
+              <a:p>
+                <a:endParaRPr lang="en-CA" dirty="0"/>
+              </a:p>
+            </p:txBody>
+          </p:sp>
+        </mc:Choice>
+        <mc:Fallback xmlns="">
+          <p:sp>
+            <p:nvSpPr>
+              <p:cNvPr id="3" name="Content Placeholder 2">
+                <a:extLst>
+                  <a:ext uri="{FF2B5EF4-FFF2-40B4-BE49-F238E27FC236}">
+                    <a16:creationId xmlns:a16="http://schemas.microsoft.com/office/drawing/2014/main" id="{0FE13DA4-569E-9E44-9E57-8543AA7273FE}"/>
+                  </a:ext>
+                </a:extLst>
+              </p:cNvPr>
+              <p:cNvSpPr>
+                <a:spLocks noGrp="1" noRot="1" noChangeAspect="1" noMove="1" noResize="1" noEditPoints="1" noAdjustHandles="1" noChangeArrowheads="1" noChangeShapeType="1" noTextEdit="1"/>
+              </p:cNvSpPr>
+              <p:nvPr>
+                <p:ph idx="1"/>
+              </p:nvPr>
+            </p:nvSpPr>
+            <p:spPr>
+              <a:blipFill>
+                <a:blip r:embed="rId2"/>
+                <a:stretch>
+                  <a:fillRect l="-1698" t="-3641" r="-1852" b="-280"/>
+                </a:stretch>
+              </a:blipFill>
+            </p:spPr>
+            <p:txBody>
+              <a:bodyPr/>
+              <a:lstStyle/>
+              <a:p>
+                <a:r>
+                  <a:rPr lang="en-CA">
+                    <a:noFill/>
+                  </a:rPr>
+                  <a:t> </a:t>
+                </a:r>
+              </a:p>
+            </p:txBody>
+          </p:sp>
+        </mc:Fallback>
+      </mc:AlternateContent>
+    </p:spTree>
+    <p:extLst>
+      <p:ext uri="{BB962C8B-B14F-4D97-AF65-F5344CB8AC3E}">
+        <p14:creationId xmlns:p14="http://schemas.microsoft.com/office/powerpoint/2010/main" val="1751915560"/>
+      </p:ext>
+    </p:extLst>
+  </p:cSld>
+  <p:clrMapOvr>
+    <a:masterClrMapping/>
+  </p:clrMapOvr>
+</p:sld>
+</file>
+
+<file path=ppt/slides/slide16.xml><?xml version="1.0" encoding="utf-8"?>
+<p:sld xmlns:a="http://schemas.openxmlformats.org/drawingml/2006/main" xmlns:r="http://schemas.openxmlformats.org/officeDocument/2006/relationships" xmlns:p="http://schemas.openxmlformats.org/presentationml/2006/main">
+  <p:cSld>
+    <p:spTree>
+      <p:nvGrpSpPr>
+        <p:cNvPr id="1" name=""/>
+        <p:cNvGrpSpPr/>
+        <p:nvPr/>
+      </p:nvGrpSpPr>
+      <p:grpSpPr>
+        <a:xfrm>
+          <a:off x="0" y="0"/>
+          <a:ext cx="0" cy="0"/>
+          <a:chOff x="0" y="0"/>
+          <a:chExt cx="0" cy="0"/>
+        </a:xfrm>
+      </p:grpSpPr>
+      <p:sp>
+        <p:nvSpPr>
           <p:cNvPr id="2" name="Title 1">
             <a:extLst>
               <a:ext uri="{FF2B5EF4-FFF2-40B4-BE49-F238E27FC236}">
@@ -1131,8 +3247,8 @@
           </a:p>
         </p:txBody>
       </p:sp>
-      <mc:AlternateContent xmlns:mc="http://schemas.openxmlformats.org/markup-compatibility/2006">
-        <mc:Choice xmlns:a14="http://schemas.microsoft.com/office/drawing/2010/main" Requires="a14">
+      <mc:AlternateContent xmlns:mc="http://schemas.openxmlformats.org/markup-compatibility/2006" xmlns:a14="http://schemas.microsoft.com/office/drawing/2010/main">
+        <mc:Choice Requires="a14">
           <p:sp>
             <p:nvSpPr>
               <p:cNvPr id="3" name="Content Placeholder 2">
@@ -1290,7 +3406,7 @@
             </p:txBody>
           </p:sp>
         </mc:Choice>
-        <mc:Fallback>
+        <mc:Fallback xmlns="">
           <p:sp>
             <p:nvSpPr>
               <p:cNvPr id="3" name="Content Placeholder 2">
@@ -1343,7 +3459,7 @@
 </p:sld>
 </file>
 
-<file path=ppt/slides/slide11.xml><?xml version="1.0" encoding="utf-8"?>
+<file path=ppt/slides/slide17.xml><?xml version="1.0" encoding="utf-8"?>
 <p:sld xmlns:a="http://schemas.openxmlformats.org/drawingml/2006/main" xmlns:r="http://schemas.openxmlformats.org/officeDocument/2006/relationships" xmlns:p="http://schemas.openxmlformats.org/presentationml/2006/main">
   <p:cSld>
     <p:spTree>
@@ -1436,7 +3552,7 @@
 </p:sld>
 </file>
 
-<file path=ppt/slides/slide12.xml><?xml version="1.0" encoding="utf-8"?>
+<file path=ppt/slides/slide18.xml><?xml version="1.0" encoding="utf-8"?>
 <p:sld xmlns:a="http://schemas.openxmlformats.org/drawingml/2006/main" xmlns:r="http://schemas.openxmlformats.org/officeDocument/2006/relationships" xmlns:p="http://schemas.openxmlformats.org/presentationml/2006/main">
   <p:cSld>
     <p:spTree>
@@ -1529,7 +3645,7 @@
 </p:sld>
 </file>
 
-<file path=ppt/slides/slide13.xml><?xml version="1.0" encoding="utf-8"?>
+<file path=ppt/slides/slide19.xml><?xml version="1.0" encoding="utf-8"?>
 <p:sld xmlns:a="http://schemas.openxmlformats.org/drawingml/2006/main" xmlns:r="http://schemas.openxmlformats.org/officeDocument/2006/relationships" xmlns:p="http://schemas.openxmlformats.org/presentationml/2006/main">
   <p:cSld>
     <p:spTree>
@@ -1622,7 +3738,104 @@
 </p:sld>
 </file>
 
-<file path=ppt/slides/slide14.xml><?xml version="1.0" encoding="utf-8"?>
+<file path=ppt/slides/slide2.xml><?xml version="1.0" encoding="utf-8"?>
+<p:sld xmlns:a="http://schemas.openxmlformats.org/drawingml/2006/main" xmlns:r="http://schemas.openxmlformats.org/officeDocument/2006/relationships" xmlns:p="http://schemas.openxmlformats.org/presentationml/2006/main">
+  <p:cSld>
+    <p:spTree>
+      <p:nvGrpSpPr>
+        <p:cNvPr id="1" name=""/>
+        <p:cNvGrpSpPr/>
+        <p:nvPr/>
+      </p:nvGrpSpPr>
+      <p:grpSpPr>
+        <a:xfrm>
+          <a:off x="0" y="0"/>
+          <a:ext cx="0" cy="0"/>
+          <a:chOff x="0" y="0"/>
+          <a:chExt cx="0" cy="0"/>
+        </a:xfrm>
+      </p:grpSpPr>
+      <p:sp>
+        <p:nvSpPr>
+          <p:cNvPr id="2" name="Title 1"/>
+          <p:cNvSpPr>
+            <a:spLocks noGrp="1"/>
+          </p:cNvSpPr>
+          <p:nvPr>
+            <p:ph type="title"/>
+          </p:nvPr>
+        </p:nvSpPr>
+        <p:spPr/>
+        <p:txBody>
+          <a:bodyPr/>
+          <a:lstStyle/>
+          <a:p>
+            <a:r>
+              <a:rPr lang="en-US" dirty="0"/>
+              <a:t>outline</a:t>
+            </a:r>
+          </a:p>
+        </p:txBody>
+      </p:sp>
+      <p:sp>
+        <p:nvSpPr>
+          <p:cNvPr id="3" name="Content Placeholder 2"/>
+          <p:cNvSpPr>
+            <a:spLocks noGrp="1"/>
+          </p:cNvSpPr>
+          <p:nvPr>
+            <p:ph idx="1"/>
+          </p:nvPr>
+        </p:nvSpPr>
+        <p:spPr/>
+        <p:txBody>
+          <a:bodyPr/>
+          <a:lstStyle/>
+          <a:p>
+            <a:r>
+              <a:rPr lang="en-US" dirty="0"/>
+              <a:t>Focus on uncertainty (variance)</a:t>
+            </a:r>
+          </a:p>
+          <a:p>
+            <a:r>
+              <a:rPr lang="en-US" dirty="0"/>
+              <a:t>Windage tuning paper</a:t>
+            </a:r>
+          </a:p>
+          <a:p>
+            <a:r>
+              <a:rPr lang="en-US" dirty="0"/>
+              <a:t>FSLE-</a:t>
+            </a:r>
+            <a:r>
+              <a:rPr lang="en-US" dirty="0" err="1"/>
+              <a:t>TReX</a:t>
+            </a:r>
+            <a:endParaRPr lang="en-US" dirty="0"/>
+          </a:p>
+          <a:p>
+            <a:r>
+              <a:rPr lang="en-US" dirty="0"/>
+              <a:t>Nancy’s error maps</a:t>
+            </a:r>
+          </a:p>
+        </p:txBody>
+      </p:sp>
+    </p:spTree>
+    <p:extLst>
+      <p:ext uri="{BB962C8B-B14F-4D97-AF65-F5344CB8AC3E}">
+        <p14:creationId xmlns:p14="http://schemas.microsoft.com/office/powerpoint/2010/main" val="1955085122"/>
+      </p:ext>
+    </p:extLst>
+  </p:cSld>
+  <p:clrMapOvr>
+    <a:masterClrMapping/>
+  </p:clrMapOvr>
+</p:sld>
+</file>
+
+<file path=ppt/slides/slide20.xml><?xml version="1.0" encoding="utf-8"?>
 <p:sld xmlns:a="http://schemas.openxmlformats.org/drawingml/2006/main" xmlns:r="http://schemas.openxmlformats.org/officeDocument/2006/relationships" xmlns:p="http://schemas.openxmlformats.org/presentationml/2006/main">
   <p:cSld>
     <p:spTree>
@@ -1717,7 +3930,7 @@
 </p:sld>
 </file>
 
-<file path=ppt/slides/slide15.xml><?xml version="1.0" encoding="utf-8"?>
+<file path=ppt/slides/slide21.xml><?xml version="1.0" encoding="utf-8"?>
 <p:sld xmlns:a="http://schemas.openxmlformats.org/drawingml/2006/main" xmlns:r="http://schemas.openxmlformats.org/officeDocument/2006/relationships" xmlns:p="http://schemas.openxmlformats.org/presentationml/2006/main">
   <p:cSld>
     <p:spTree>
@@ -1801,103 +4014,6 @@
     <p:extLst>
       <p:ext uri="{BB962C8B-B14F-4D97-AF65-F5344CB8AC3E}">
         <p14:creationId xmlns:p14="http://schemas.microsoft.com/office/powerpoint/2010/main" val="3914736472"/>
-      </p:ext>
-    </p:extLst>
-  </p:cSld>
-  <p:clrMapOvr>
-    <a:masterClrMapping/>
-  </p:clrMapOvr>
-</p:sld>
-</file>
-
-<file path=ppt/slides/slide2.xml><?xml version="1.0" encoding="utf-8"?>
-<p:sld xmlns:a="http://schemas.openxmlformats.org/drawingml/2006/main" xmlns:r="http://schemas.openxmlformats.org/officeDocument/2006/relationships" xmlns:p="http://schemas.openxmlformats.org/presentationml/2006/main">
-  <p:cSld>
-    <p:spTree>
-      <p:nvGrpSpPr>
-        <p:cNvPr id="1" name=""/>
-        <p:cNvGrpSpPr/>
-        <p:nvPr/>
-      </p:nvGrpSpPr>
-      <p:grpSpPr>
-        <a:xfrm>
-          <a:off x="0" y="0"/>
-          <a:ext cx="0" cy="0"/>
-          <a:chOff x="0" y="0"/>
-          <a:chExt cx="0" cy="0"/>
-        </a:xfrm>
-      </p:grpSpPr>
-      <p:sp>
-        <p:nvSpPr>
-          <p:cNvPr id="2" name="Title 1"/>
-          <p:cNvSpPr>
-            <a:spLocks noGrp="1"/>
-          </p:cNvSpPr>
-          <p:nvPr>
-            <p:ph type="title"/>
-          </p:nvPr>
-        </p:nvSpPr>
-        <p:spPr/>
-        <p:txBody>
-          <a:bodyPr/>
-          <a:lstStyle/>
-          <a:p>
-            <a:r>
-              <a:rPr lang="en-US" dirty="0"/>
-              <a:t>outline</a:t>
-            </a:r>
-          </a:p>
-        </p:txBody>
-      </p:sp>
-      <p:sp>
-        <p:nvSpPr>
-          <p:cNvPr id="3" name="Content Placeholder 2"/>
-          <p:cNvSpPr>
-            <a:spLocks noGrp="1"/>
-          </p:cNvSpPr>
-          <p:nvPr>
-            <p:ph idx="1"/>
-          </p:nvPr>
-        </p:nvSpPr>
-        <p:spPr/>
-        <p:txBody>
-          <a:bodyPr/>
-          <a:lstStyle/>
-          <a:p>
-            <a:r>
-              <a:rPr lang="en-US" dirty="0"/>
-              <a:t>Focus on uncertainty (variance)</a:t>
-            </a:r>
-          </a:p>
-          <a:p>
-            <a:r>
-              <a:rPr lang="en-US" dirty="0"/>
-              <a:t>Windage tuning paper</a:t>
-            </a:r>
-          </a:p>
-          <a:p>
-            <a:r>
-              <a:rPr lang="en-US" dirty="0"/>
-              <a:t>FSLE-</a:t>
-            </a:r>
-            <a:r>
-              <a:rPr lang="en-US" dirty="0" err="1"/>
-              <a:t>TReX</a:t>
-            </a:r>
-            <a:endParaRPr lang="en-US" dirty="0"/>
-          </a:p>
-          <a:p>
-            <a:r>
-              <a:rPr lang="en-US" dirty="0"/>
-              <a:t>Nancy’s error maps</a:t>
-            </a:r>
-          </a:p>
-        </p:txBody>
-      </p:sp>
-    </p:spTree>
-    <p:extLst>
-      <p:ext uri="{BB962C8B-B14F-4D97-AF65-F5344CB8AC3E}">
-        <p14:creationId xmlns:p14="http://schemas.microsoft.com/office/powerpoint/2010/main" val="1955085122"/>
       </p:ext>
     </p:extLst>
   </p:cSld>
@@ -3293,13 +5409,7 @@
       </p:grpSpPr>
       <p:sp>
         <p:nvSpPr>
-          <p:cNvPr id="2" name="Title 1">
-            <a:extLst>
-              <a:ext uri="{FF2B5EF4-FFF2-40B4-BE49-F238E27FC236}">
-                <a16:creationId xmlns:a16="http://schemas.microsoft.com/office/drawing/2014/main" id="{52F89091-A38D-CB48-8958-9075C24806CE}"/>
-              </a:ext>
-            </a:extLst>
-          </p:cNvPr>
+          <p:cNvPr id="2" name="Title 1"/>
           <p:cNvSpPr>
             <a:spLocks noGrp="1"/>
           </p:cNvSpPr>
@@ -3309,623 +5419,283 @@
         </p:nvSpPr>
         <p:spPr/>
         <p:txBody>
-          <a:bodyPr>
-            <a:normAutofit fontScale="90000"/>
+          <a:bodyPr/>
+          <a:lstStyle/>
+          <a:p>
+            <a:r>
+              <a:rPr lang="en-US" dirty="0" smtClean="0"/>
+              <a:t>MEOPAR </a:t>
+            </a:r>
+            <a:r>
+              <a:rPr lang="en-US" dirty="0" err="1" smtClean="0"/>
+              <a:t>Trex</a:t>
+            </a:r>
+            <a:r>
+              <a:rPr lang="en-US" dirty="0" smtClean="0"/>
+              <a:t> Sept 2020</a:t>
+            </a:r>
+            <a:endParaRPr lang="en-US" dirty="0"/>
+          </a:p>
+        </p:txBody>
+      </p:sp>
+      <p:pic>
+        <p:nvPicPr>
+          <p:cNvPr id="7" name="Content Placeholder 6"/>
+          <p:cNvPicPr>
+            <a:picLocks noGrp="1" noChangeAspect="1"/>
+          </p:cNvPicPr>
+          <p:nvPr>
+            <p:ph idx="1"/>
+          </p:nvPr>
+        </p:nvPicPr>
+        <p:blipFill>
+          <a:blip r:embed="rId2">
+            <a:extLst>
+              <a:ext uri="{28A0092B-C50C-407E-A947-70E740481C1C}">
+                <a14:useLocalDpi xmlns:a14="http://schemas.microsoft.com/office/drawing/2010/main" val="0"/>
+              </a:ext>
+            </a:extLst>
+          </a:blip>
+          <a:stretch>
+            <a:fillRect/>
+          </a:stretch>
+        </p:blipFill>
+        <p:spPr>
+          <a:xfrm>
+            <a:off x="1115616" y="1092033"/>
+            <a:ext cx="6848870" cy="4206248"/>
+          </a:xfrm>
+        </p:spPr>
+      </p:pic>
+      <p:sp>
+        <p:nvSpPr>
+          <p:cNvPr id="8" name="TextBox 7">
+            <a:extLst>
+              <a:ext uri="{FF2B5EF4-FFF2-40B4-BE49-F238E27FC236}">
+                <a16:creationId xmlns:a16="http://schemas.microsoft.com/office/drawing/2014/main" id="{670BEC2E-DB07-1E43-96E4-352A721F5F61}"/>
+              </a:ext>
+            </a:extLst>
+          </p:cNvPr>
+          <p:cNvSpPr txBox="1"/>
+          <p:nvPr/>
+        </p:nvSpPr>
+        <p:spPr>
+          <a:xfrm>
+            <a:off x="4679504" y="5267503"/>
+            <a:ext cx="4464496" cy="1200329"/>
+          </a:xfrm>
+          <a:prstGeom prst="rect">
+            <a:avLst/>
+          </a:prstGeom>
+          <a:noFill/>
+        </p:spPr>
+        <p:txBody>
+          <a:bodyPr wrap="square" rtlCol="0">
+            <a:spAutoFit/>
           </a:bodyPr>
           <a:lstStyle/>
           <a:p>
             <a:r>
+              <a:rPr lang="en-CA" dirty="0" smtClean="0"/>
+              <a:t>Calculate </a:t>
+            </a:r>
+            <a:r>
               <a:rPr lang="en-CA" dirty="0"/>
-              <a:t>Finite Scale Lyapunov Exponent (FSLE)</a:t>
-            </a:r>
+              <a:t>⍺ using </a:t>
+            </a:r>
+            <a:r>
+              <a:rPr lang="en-CA" dirty="0" smtClean="0"/>
+              <a:t>two ocean/atmosphere modelling systems</a:t>
+            </a:r>
+            <a:endParaRPr lang="en-CA" dirty="0"/>
+          </a:p>
+          <a:p>
+            <a:pPr marL="285750" indent="-285750">
+              <a:buFont typeface="Arial" panose="020B0604020202020204" pitchFamily="34" charset="0"/>
+              <a:buChar char="•"/>
+            </a:pPr>
+            <a:r>
+              <a:rPr lang="en-CA" dirty="0" smtClean="0"/>
+              <a:t>1/36 </a:t>
+            </a:r>
+            <a:r>
+              <a:rPr lang="en-CA" dirty="0" err="1" smtClean="0"/>
+              <a:t>deg</a:t>
+            </a:r>
+            <a:r>
+              <a:rPr lang="en-CA" dirty="0" smtClean="0"/>
+              <a:t> CIOPSE + 1km RELOC</a:t>
+            </a:r>
+            <a:endParaRPr lang="en-CA" dirty="0"/>
+          </a:p>
+          <a:p>
+            <a:pPr marL="285750" indent="-285750">
+              <a:buFont typeface="Arial" panose="020B0604020202020204" pitchFamily="34" charset="0"/>
+              <a:buChar char="•"/>
+            </a:pPr>
+            <a:r>
+              <a:rPr lang="en-CA" dirty="0" smtClean="0"/>
+              <a:t>500m GSL + 1km RELOC</a:t>
+            </a:r>
+            <a:endParaRPr lang="en-CA" dirty="0"/>
           </a:p>
         </p:txBody>
       </p:sp>
-      <mc:AlternateContent xmlns:mc="http://schemas.openxmlformats.org/markup-compatibility/2006" xmlns:a14="http://schemas.microsoft.com/office/drawing/2010/main">
-        <mc:Choice Requires="a14">
-          <p:sp>
-            <p:nvSpPr>
-              <p:cNvPr id="3" name="Content Placeholder 2">
-                <a:extLst>
-                  <a:ext uri="{FF2B5EF4-FFF2-40B4-BE49-F238E27FC236}">
-                    <a16:creationId xmlns:a16="http://schemas.microsoft.com/office/drawing/2014/main" id="{0FE13DA4-569E-9E44-9E57-8543AA7273FE}"/>
-                  </a:ext>
-                </a:extLst>
-              </p:cNvPr>
-              <p:cNvSpPr>
-                <a:spLocks noGrp="1"/>
-              </p:cNvSpPr>
-              <p:nvPr>
-                <p:ph idx="1"/>
-              </p:nvPr>
-            </p:nvSpPr>
-            <p:spPr/>
-            <p:txBody>
-              <a:bodyPr>
-                <a:normAutofit fontScale="92500" lnSpcReduction="20000"/>
-              </a:bodyPr>
-              <a:lstStyle/>
-              <a:p>
-                <a:r>
-                  <a:rPr lang="en-CA" dirty="0"/>
-                  <a:t>An alternative approach to relative dispersion is to use the separation distance as the independent variable and average exit times</a:t>
-                </a:r>
-              </a:p>
-              <a:p>
-                <a:r>
-                  <a:rPr lang="en-CA" dirty="0"/>
-                  <a:t>Choose distances that increase multiplicatively </a:t>
-                </a:r>
-                <a14:m>
-                  <m:oMath xmlns:m="http://schemas.openxmlformats.org/officeDocument/2006/math">
-                    <m:sSub>
-                      <m:sSubPr>
-                        <m:ctrlPr>
-                          <a:rPr lang="en-US" b="0" i="1" smtClean="0">
-                            <a:latin typeface="Cambria Math" panose="02040503050406030204" pitchFamily="18" charset="0"/>
-                          </a:rPr>
-                        </m:ctrlPr>
-                      </m:sSubPr>
-                      <m:e>
-                        <m:r>
-                          <a:rPr lang="en-US" b="0" i="1" smtClean="0">
-                            <a:latin typeface="Cambria Math" panose="02040503050406030204" pitchFamily="18" charset="0"/>
-                          </a:rPr>
-                          <m:t>𝛿</m:t>
-                        </m:r>
-                      </m:e>
-                      <m:sub>
-                        <m:r>
-                          <a:rPr lang="en-US" b="0" i="1" smtClean="0">
-                            <a:latin typeface="Cambria Math" panose="02040503050406030204" pitchFamily="18" charset="0"/>
-                          </a:rPr>
-                          <m:t>𝑛</m:t>
-                        </m:r>
-                      </m:sub>
-                    </m:sSub>
-                    <m:r>
-                      <a:rPr lang="en-US" b="0" i="1" smtClean="0">
-                        <a:latin typeface="Cambria Math" panose="02040503050406030204" pitchFamily="18" charset="0"/>
-                      </a:rPr>
-                      <m:t>=</m:t>
-                    </m:r>
-                    <m:r>
-                      <a:rPr lang="en-US" b="0" i="1" smtClean="0">
-                        <a:latin typeface="Cambria Math" panose="02040503050406030204" pitchFamily="18" charset="0"/>
-                      </a:rPr>
-                      <m:t>𝑟</m:t>
-                    </m:r>
-                    <m:sSub>
-                      <m:sSubPr>
-                        <m:ctrlPr>
-                          <a:rPr lang="en-US" b="0" i="1" smtClean="0">
-                            <a:latin typeface="Cambria Math" panose="02040503050406030204" pitchFamily="18" charset="0"/>
-                          </a:rPr>
-                        </m:ctrlPr>
-                      </m:sSubPr>
-                      <m:e>
-                        <m:r>
-                          <a:rPr lang="en-US" b="0" i="1" smtClean="0">
-                            <a:latin typeface="Cambria Math" panose="02040503050406030204" pitchFamily="18" charset="0"/>
-                          </a:rPr>
-                          <m:t>𝛿</m:t>
-                        </m:r>
-                      </m:e>
-                      <m:sub>
-                        <m:r>
-                          <a:rPr lang="en-US" b="0" i="1" smtClean="0">
-                            <a:latin typeface="Cambria Math" panose="02040503050406030204" pitchFamily="18" charset="0"/>
-                          </a:rPr>
-                          <m:t>𝑛</m:t>
-                        </m:r>
-                        <m:r>
-                          <a:rPr lang="en-US" b="0" i="1" smtClean="0">
-                            <a:latin typeface="Cambria Math" panose="02040503050406030204" pitchFamily="18" charset="0"/>
-                          </a:rPr>
-                          <m:t>−1</m:t>
-                        </m:r>
-                      </m:sub>
-                    </m:sSub>
-                    <m:r>
-                      <a:rPr lang="en-US" b="0" i="1" smtClean="0">
-                        <a:latin typeface="Cambria Math" panose="02040503050406030204" pitchFamily="18" charset="0"/>
-                      </a:rPr>
-                      <m:t>=</m:t>
-                    </m:r>
-                    <m:sSup>
-                      <m:sSupPr>
-                        <m:ctrlPr>
-                          <a:rPr lang="en-US" b="0" i="1" smtClean="0">
-                            <a:latin typeface="Cambria Math" panose="02040503050406030204" pitchFamily="18" charset="0"/>
-                          </a:rPr>
-                        </m:ctrlPr>
-                      </m:sSupPr>
-                      <m:e>
-                        <m:r>
-                          <a:rPr lang="en-US" b="0" i="1" smtClean="0">
-                            <a:latin typeface="Cambria Math" panose="02040503050406030204" pitchFamily="18" charset="0"/>
-                          </a:rPr>
-                          <m:t>𝑟</m:t>
-                        </m:r>
-                      </m:e>
-                      <m:sup>
-                        <m:r>
-                          <a:rPr lang="en-US" b="0" i="1" smtClean="0">
-                            <a:latin typeface="Cambria Math" panose="02040503050406030204" pitchFamily="18" charset="0"/>
-                          </a:rPr>
-                          <m:t>𝑛</m:t>
-                        </m:r>
-                      </m:sup>
-                    </m:sSup>
-                    <m:sSub>
-                      <m:sSubPr>
-                        <m:ctrlPr>
-                          <a:rPr lang="en-US" b="0" i="1" smtClean="0">
-                            <a:latin typeface="Cambria Math" panose="02040503050406030204" pitchFamily="18" charset="0"/>
-                          </a:rPr>
-                        </m:ctrlPr>
-                      </m:sSubPr>
-                      <m:e>
-                        <m:r>
-                          <a:rPr lang="en-US" b="0" i="1" smtClean="0">
-                            <a:latin typeface="Cambria Math" panose="02040503050406030204" pitchFamily="18" charset="0"/>
-                          </a:rPr>
-                          <m:t>𝑑</m:t>
-                        </m:r>
-                      </m:e>
-                      <m:sub>
-                        <m:r>
-                          <a:rPr lang="en-US" b="0" i="1" smtClean="0">
-                            <a:latin typeface="Cambria Math" panose="02040503050406030204" pitchFamily="18" charset="0"/>
-                          </a:rPr>
-                          <m:t>0</m:t>
-                        </m:r>
-                      </m:sub>
-                    </m:sSub>
-                  </m:oMath>
-                </a14:m>
-                <a:endParaRPr lang="en-CA" dirty="0"/>
-              </a:p>
-              <a:p>
-                <a:r>
-                  <a:rPr lang="en-CA" dirty="0"/>
-                  <a:t>Assuming exponential increase between bins </a:t>
-                </a:r>
-                <a14:m>
-                  <m:oMath xmlns:m="http://schemas.openxmlformats.org/officeDocument/2006/math">
-                    <m:sSub>
-                      <m:sSubPr>
-                        <m:ctrlPr>
-                          <a:rPr lang="en-US" b="0" i="1" smtClean="0">
-                            <a:latin typeface="Cambria Math" panose="02040503050406030204" pitchFamily="18" charset="0"/>
-                          </a:rPr>
-                        </m:ctrlPr>
-                      </m:sSubPr>
-                      <m:e>
-                        <m:r>
-                          <a:rPr lang="en-US" b="0" i="1" smtClean="0">
-                            <a:latin typeface="Cambria Math" panose="02040503050406030204" pitchFamily="18" charset="0"/>
-                          </a:rPr>
-                          <m:t>𝛿</m:t>
-                        </m:r>
-                      </m:e>
-                      <m:sub>
-                        <m:r>
-                          <a:rPr lang="en-US" b="0" i="1" smtClean="0">
-                            <a:latin typeface="Cambria Math" panose="02040503050406030204" pitchFamily="18" charset="0"/>
-                          </a:rPr>
-                          <m:t>𝑛</m:t>
-                        </m:r>
-                      </m:sub>
-                    </m:sSub>
-                    <m:r>
-                      <a:rPr lang="en-US" b="0" i="1" smtClean="0">
-                        <a:latin typeface="Cambria Math" panose="02040503050406030204" pitchFamily="18" charset="0"/>
-                      </a:rPr>
-                      <m:t>=</m:t>
-                    </m:r>
-                    <m:sSub>
-                      <m:sSubPr>
-                        <m:ctrlPr>
-                          <a:rPr lang="en-US" b="0" i="1" smtClean="0">
-                            <a:latin typeface="Cambria Math" panose="02040503050406030204" pitchFamily="18" charset="0"/>
-                          </a:rPr>
-                        </m:ctrlPr>
-                      </m:sSubPr>
-                      <m:e>
-                        <m:r>
-                          <a:rPr lang="en-US" b="0" i="1" smtClean="0">
-                            <a:latin typeface="Cambria Math" panose="02040503050406030204" pitchFamily="18" charset="0"/>
-                          </a:rPr>
-                          <m:t>𝛿</m:t>
-                        </m:r>
-                      </m:e>
-                      <m:sub>
-                        <m:r>
-                          <a:rPr lang="en-US" b="0" i="1" smtClean="0">
-                            <a:latin typeface="Cambria Math" panose="02040503050406030204" pitchFamily="18" charset="0"/>
-                          </a:rPr>
-                          <m:t>𝑛</m:t>
-                        </m:r>
-                        <m:r>
-                          <a:rPr lang="en-US" b="0" i="1" smtClean="0">
-                            <a:latin typeface="Cambria Math" panose="02040503050406030204" pitchFamily="18" charset="0"/>
-                          </a:rPr>
-                          <m:t>−1</m:t>
-                        </m:r>
-                      </m:sub>
-                    </m:sSub>
-                    <m:sSup>
-                      <m:sSupPr>
-                        <m:ctrlPr>
-                          <a:rPr lang="en-US" b="0" i="1" smtClean="0">
-                            <a:latin typeface="Cambria Math" panose="02040503050406030204" pitchFamily="18" charset="0"/>
-                          </a:rPr>
-                        </m:ctrlPr>
-                      </m:sSupPr>
-                      <m:e>
-                        <m:r>
-                          <a:rPr lang="en-US" b="0" i="1" smtClean="0">
-                            <a:latin typeface="Cambria Math" panose="02040503050406030204" pitchFamily="18" charset="0"/>
-                          </a:rPr>
-                          <m:t>𝑒</m:t>
-                        </m:r>
-                      </m:e>
-                      <m:sup>
-                        <m:sSub>
-                          <m:sSubPr>
-                            <m:ctrlPr>
-                              <a:rPr lang="en-US" b="0" i="1" smtClean="0">
-                                <a:latin typeface="Cambria Math" panose="02040503050406030204" pitchFamily="18" charset="0"/>
-                              </a:rPr>
-                            </m:ctrlPr>
-                          </m:sSubPr>
-                          <m:e>
-                            <m:r>
-                              <a:rPr lang="en-US" b="0" i="1" smtClean="0">
-                                <a:latin typeface="Cambria Math" panose="02040503050406030204" pitchFamily="18" charset="0"/>
-                              </a:rPr>
-                              <m:t>𝜆</m:t>
-                            </m:r>
-                          </m:e>
-                          <m:sub>
-                            <m:r>
-                              <a:rPr lang="en-US" b="0" i="1" smtClean="0">
-                                <a:latin typeface="Cambria Math" panose="02040503050406030204" pitchFamily="18" charset="0"/>
-                              </a:rPr>
-                              <m:t>𝑛</m:t>
-                            </m:r>
-                          </m:sub>
-                        </m:sSub>
-                        <m:r>
-                          <a:rPr lang="en-US" b="0" i="1" smtClean="0">
-                            <a:latin typeface="Cambria Math" panose="02040503050406030204" pitchFamily="18" charset="0"/>
-                          </a:rPr>
-                          <m:t>𝑡</m:t>
-                        </m:r>
-                      </m:sup>
-                    </m:sSup>
-                    <m:r>
-                      <a:rPr lang="en-US" b="0" i="1" smtClean="0">
-                        <a:latin typeface="Cambria Math" panose="02040503050406030204" pitchFamily="18" charset="0"/>
-                      </a:rPr>
-                      <m:t>→</m:t>
-                    </m:r>
-                    <m:sSub>
-                      <m:sSubPr>
-                        <m:ctrlPr>
-                          <a:rPr lang="en-US" b="0" i="1" smtClean="0">
-                            <a:latin typeface="Cambria Math" panose="02040503050406030204" pitchFamily="18" charset="0"/>
-                          </a:rPr>
-                        </m:ctrlPr>
-                      </m:sSubPr>
-                      <m:e>
-                        <m:r>
-                          <a:rPr lang="en-US" b="0" i="1" smtClean="0">
-                            <a:latin typeface="Cambria Math" panose="02040503050406030204" pitchFamily="18" charset="0"/>
-                          </a:rPr>
-                          <m:t>𝜆</m:t>
-                        </m:r>
-                      </m:e>
-                      <m:sub>
-                        <m:r>
-                          <a:rPr lang="en-US" b="0" i="1" smtClean="0">
-                            <a:latin typeface="Cambria Math" panose="02040503050406030204" pitchFamily="18" charset="0"/>
-                          </a:rPr>
-                          <m:t>𝑛</m:t>
-                        </m:r>
-                      </m:sub>
-                    </m:sSub>
-                    <m:r>
-                      <a:rPr lang="en-US" b="0" i="1" smtClean="0">
-                        <a:latin typeface="Cambria Math" panose="02040503050406030204" pitchFamily="18" charset="0"/>
-                      </a:rPr>
-                      <m:t>=</m:t>
-                    </m:r>
-                    <m:f>
-                      <m:fPr>
-                        <m:ctrlPr>
-                          <a:rPr lang="en-US" b="0" i="1" smtClean="0">
-                            <a:latin typeface="Cambria Math" panose="02040503050406030204" pitchFamily="18" charset="0"/>
-                          </a:rPr>
-                        </m:ctrlPr>
-                      </m:fPr>
-                      <m:num>
-                        <m:func>
-                          <m:funcPr>
-                            <m:ctrlPr>
-                              <a:rPr lang="en-US" b="0" i="1" smtClean="0">
-                                <a:latin typeface="Cambria Math" panose="02040503050406030204" pitchFamily="18" charset="0"/>
-                              </a:rPr>
-                            </m:ctrlPr>
-                          </m:funcPr>
-                          <m:fName>
-                            <m:r>
-                              <m:rPr>
-                                <m:sty m:val="p"/>
-                              </m:rPr>
-                              <a:rPr lang="en-US" b="0" i="0" smtClean="0">
-                                <a:latin typeface="Cambria Math" panose="02040503050406030204" pitchFamily="18" charset="0"/>
-                              </a:rPr>
-                              <m:t>ln</m:t>
-                            </m:r>
-                          </m:fName>
-                          <m:e>
-                            <m:d>
-                              <m:dPr>
-                                <m:ctrlPr>
-                                  <a:rPr lang="en-US" b="0" i="1" smtClean="0">
-                                    <a:latin typeface="Cambria Math" panose="02040503050406030204" pitchFamily="18" charset="0"/>
-                                  </a:rPr>
-                                </m:ctrlPr>
-                              </m:dPr>
-                              <m:e>
-                                <m:r>
-                                  <a:rPr lang="en-US" b="0" i="1" smtClean="0">
-                                    <a:latin typeface="Cambria Math" panose="02040503050406030204" pitchFamily="18" charset="0"/>
-                                  </a:rPr>
-                                  <m:t>𝑟</m:t>
-                                </m:r>
-                              </m:e>
-                            </m:d>
-                          </m:e>
-                        </m:func>
-                      </m:num>
-                      <m:den>
-                        <m:r>
-                          <a:rPr lang="en-US" b="0" i="1" smtClean="0">
-                            <a:latin typeface="Cambria Math" panose="02040503050406030204" pitchFamily="18" charset="0"/>
-                          </a:rPr>
-                          <m:t>&lt;</m:t>
-                        </m:r>
-                        <m:sSub>
-                          <m:sSubPr>
-                            <m:ctrlPr>
-                              <a:rPr lang="en-US" b="0" i="1" smtClean="0">
-                                <a:latin typeface="Cambria Math" panose="02040503050406030204" pitchFamily="18" charset="0"/>
-                              </a:rPr>
-                            </m:ctrlPr>
-                          </m:sSubPr>
-                          <m:e>
-                            <m:r>
-                              <a:rPr lang="en-US" b="0" i="1" smtClean="0">
-                                <a:latin typeface="Cambria Math" panose="02040503050406030204" pitchFamily="18" charset="0"/>
-                              </a:rPr>
-                              <m:t>𝑇</m:t>
-                            </m:r>
-                          </m:e>
-                          <m:sub>
-                            <m:r>
-                              <a:rPr lang="en-US" b="0" i="1" smtClean="0">
-                                <a:latin typeface="Cambria Math" panose="02040503050406030204" pitchFamily="18" charset="0"/>
-                              </a:rPr>
-                              <m:t>𝑛</m:t>
-                            </m:r>
-                          </m:sub>
-                        </m:sSub>
-                        <m:r>
-                          <a:rPr lang="en-US" b="0" i="1" smtClean="0">
-                            <a:latin typeface="Cambria Math" panose="02040503050406030204" pitchFamily="18" charset="0"/>
-                          </a:rPr>
-                          <m:t>&gt;</m:t>
-                        </m:r>
-                      </m:den>
-                    </m:f>
-                  </m:oMath>
-                </a14:m>
-                <a:endParaRPr lang="en-CA" dirty="0"/>
-              </a:p>
-              <a:p>
-                <a14:m>
-                  <m:oMath xmlns:m="http://schemas.openxmlformats.org/officeDocument/2006/math">
-                    <m:r>
-                      <a:rPr lang="en-US" i="1">
-                        <a:latin typeface="Cambria Math" panose="02040503050406030204" pitchFamily="18" charset="0"/>
-                      </a:rPr>
-                      <m:t>𝜆</m:t>
-                    </m:r>
-                  </m:oMath>
-                </a14:m>
-                <a:r>
-                  <a:rPr lang="en-CA" dirty="0"/>
-                  <a:t> &gt; 0 implies chaos. Can also be used to assess scale dependence of dispersion</a:t>
-                </a:r>
-              </a:p>
-              <a:p>
-                <a:r>
-                  <a:rPr lang="en-CA" dirty="0"/>
-                  <a:t>If rms separation is </a:t>
-                </a:r>
-                <a14:m>
-                  <m:oMath xmlns:m="http://schemas.openxmlformats.org/officeDocument/2006/math">
-                    <m:r>
-                      <a:rPr lang="en-US" b="0" i="1" smtClean="0">
-                        <a:latin typeface="Cambria Math" panose="02040503050406030204" pitchFamily="18" charset="0"/>
-                      </a:rPr>
-                      <m:t>&lt;</m:t>
-                    </m:r>
-                    <m:sSup>
-                      <m:sSupPr>
-                        <m:ctrlPr>
-                          <a:rPr lang="en-US" b="0" i="1" smtClean="0">
-                            <a:latin typeface="Cambria Math" panose="02040503050406030204" pitchFamily="18" charset="0"/>
-                          </a:rPr>
-                        </m:ctrlPr>
-                      </m:sSupPr>
-                      <m:e>
-                        <m:r>
-                          <a:rPr lang="en-US" b="0" i="1" smtClean="0">
-                            <a:latin typeface="Cambria Math" panose="02040503050406030204" pitchFamily="18" charset="0"/>
-                          </a:rPr>
-                          <m:t>𝑦</m:t>
-                        </m:r>
-                      </m:e>
-                      <m:sup>
-                        <m:r>
-                          <a:rPr lang="en-US" b="0" i="1" smtClean="0">
-                            <a:latin typeface="Cambria Math" panose="02040503050406030204" pitchFamily="18" charset="0"/>
-                          </a:rPr>
-                          <m:t>2</m:t>
-                        </m:r>
-                      </m:sup>
-                    </m:sSup>
-                    <m:r>
-                      <a:rPr lang="en-US" b="0" i="1" smtClean="0">
-                        <a:latin typeface="Cambria Math" panose="02040503050406030204" pitchFamily="18" charset="0"/>
-                      </a:rPr>
-                      <m:t>&gt; ∝</m:t>
-                    </m:r>
-                    <m:sSup>
-                      <m:sSupPr>
-                        <m:ctrlPr>
-                          <a:rPr lang="en-US" b="0" i="1" smtClean="0">
-                            <a:latin typeface="Cambria Math" panose="02040503050406030204" pitchFamily="18" charset="0"/>
-                          </a:rPr>
-                        </m:ctrlPr>
-                      </m:sSupPr>
-                      <m:e>
-                        <m:r>
-                          <a:rPr lang="en-US" b="0" i="1" smtClean="0">
-                            <a:latin typeface="Cambria Math" panose="02040503050406030204" pitchFamily="18" charset="0"/>
-                          </a:rPr>
-                          <m:t>𝑡</m:t>
-                        </m:r>
-                      </m:e>
-                      <m:sup>
-                        <m:r>
-                          <a:rPr lang="en-US" b="0" i="1" smtClean="0">
-                            <a:latin typeface="Cambria Math" panose="02040503050406030204" pitchFamily="18" charset="0"/>
-                          </a:rPr>
-                          <m:t>𝛼</m:t>
-                        </m:r>
-                      </m:sup>
-                    </m:sSup>
-                    <m:r>
-                      <a:rPr lang="en-US" b="0" i="1" smtClean="0">
-                        <a:latin typeface="Cambria Math" panose="02040503050406030204" pitchFamily="18" charset="0"/>
-                      </a:rPr>
-                      <m:t>→</m:t>
-                    </m:r>
-                    <m:r>
-                      <a:rPr lang="en-US" b="0" i="1" smtClean="0">
-                        <a:latin typeface="Cambria Math" panose="02040503050406030204" pitchFamily="18" charset="0"/>
-                      </a:rPr>
-                      <m:t>𝜆</m:t>
-                    </m:r>
-                    <m:r>
-                      <a:rPr lang="en-US" b="0" i="1" smtClean="0">
-                        <a:latin typeface="Cambria Math" panose="02040503050406030204" pitchFamily="18" charset="0"/>
-                      </a:rPr>
-                      <m:t>∝</m:t>
-                    </m:r>
-                    <m:sSup>
-                      <m:sSupPr>
-                        <m:ctrlPr>
-                          <a:rPr lang="en-US" b="0" i="1" smtClean="0">
-                            <a:latin typeface="Cambria Math" panose="02040503050406030204" pitchFamily="18" charset="0"/>
-                          </a:rPr>
-                        </m:ctrlPr>
-                      </m:sSupPr>
-                      <m:e>
-                        <m:r>
-                          <a:rPr lang="en-US" b="0" i="1" smtClean="0">
-                            <a:latin typeface="Cambria Math" panose="02040503050406030204" pitchFamily="18" charset="0"/>
-                          </a:rPr>
-                          <m:t>𝑦</m:t>
-                        </m:r>
-                      </m:e>
-                      <m:sup>
-                        <m:r>
-                          <a:rPr lang="en-US" b="0" i="1" smtClean="0">
-                            <a:latin typeface="Cambria Math" panose="02040503050406030204" pitchFamily="18" charset="0"/>
-                          </a:rPr>
-                          <m:t>−2/</m:t>
-                        </m:r>
-                        <m:r>
-                          <a:rPr lang="en-US" b="0" i="1" smtClean="0">
-                            <a:latin typeface="Cambria Math" panose="02040503050406030204" pitchFamily="18" charset="0"/>
-                          </a:rPr>
-                          <m:t>𝛼</m:t>
-                        </m:r>
-                      </m:sup>
-                    </m:sSup>
-                  </m:oMath>
-                </a14:m>
-                <a:endParaRPr lang="en-CA" dirty="0"/>
-              </a:p>
-              <a:p>
-                <a:endParaRPr lang="en-CA" dirty="0"/>
-              </a:p>
-              <a:p>
-                <a:endParaRPr lang="en-CA" dirty="0"/>
-              </a:p>
-            </p:txBody>
-          </p:sp>
-        </mc:Choice>
-        <mc:Fallback xmlns="">
-          <p:sp>
-            <p:nvSpPr>
-              <p:cNvPr id="3" name="Content Placeholder 2">
-                <a:extLst>
-                  <a:ext uri="{FF2B5EF4-FFF2-40B4-BE49-F238E27FC236}">
-                    <a16:creationId xmlns:a16="http://schemas.microsoft.com/office/drawing/2014/main" id="{0FE13DA4-569E-9E44-9E57-8543AA7273FE}"/>
-                  </a:ext>
-                </a:extLst>
-              </p:cNvPr>
-              <p:cNvSpPr>
-                <a:spLocks noGrp="1" noRot="1" noChangeAspect="1" noMove="1" noResize="1" noEditPoints="1" noAdjustHandles="1" noChangeArrowheads="1" noChangeShapeType="1" noTextEdit="1"/>
-              </p:cNvSpPr>
-              <p:nvPr>
-                <p:ph idx="1"/>
-              </p:nvPr>
-            </p:nvSpPr>
-            <p:spPr>
-              <a:blipFill>
-                <a:blip r:embed="rId2"/>
-                <a:stretch>
-                  <a:fillRect l="-1698" t="-3641" r="-1852" b="-280"/>
-                </a:stretch>
-              </a:blipFill>
-            </p:spPr>
-            <p:txBody>
-              <a:bodyPr/>
-              <a:lstStyle/>
-              <a:p>
-                <a:r>
-                  <a:rPr lang="en-CA">
-                    <a:noFill/>
-                  </a:rPr>
-                  <a:t> </a:t>
-                </a:r>
-              </a:p>
-            </p:txBody>
-          </p:sp>
-        </mc:Fallback>
-      </mc:AlternateContent>
+      <p:sp>
+        <p:nvSpPr>
+          <p:cNvPr id="10" name="TextBox 9">
+            <a:extLst>
+              <a:ext uri="{FF2B5EF4-FFF2-40B4-BE49-F238E27FC236}">
+                <a16:creationId xmlns:a16="http://schemas.microsoft.com/office/drawing/2014/main" id="{530C8AAD-DEBD-1D4F-9DC0-F0C3B63E2EEE}"/>
+              </a:ext>
+            </a:extLst>
+          </p:cNvPr>
+          <p:cNvSpPr txBox="1"/>
+          <p:nvPr/>
+        </p:nvSpPr>
+        <p:spPr>
+          <a:xfrm>
+            <a:off x="113331" y="5267503"/>
+            <a:ext cx="4566173" cy="1477328"/>
+          </a:xfrm>
+          <a:prstGeom prst="rect">
+            <a:avLst/>
+          </a:prstGeom>
+          <a:noFill/>
+        </p:spPr>
+        <p:txBody>
+          <a:bodyPr wrap="square" rtlCol="0">
+            <a:spAutoFit/>
+          </a:bodyPr>
+          <a:lstStyle/>
+          <a:p>
+            <a:r>
+              <a:rPr lang="en-CA" dirty="0" smtClean="0"/>
+              <a:t>~200 drifters released in St. Lawrence Estuary</a:t>
+            </a:r>
+            <a:endParaRPr lang="en-CA" dirty="0" smtClean="0"/>
+          </a:p>
+          <a:p>
+            <a:pPr marL="285750" indent="-285750">
+              <a:buFont typeface="Arial" panose="020B0604020202020204" pitchFamily="34" charset="0"/>
+              <a:buChar char="•"/>
+            </a:pPr>
+            <a:r>
+              <a:rPr lang="en-CA" dirty="0" smtClean="0"/>
+              <a:t>Surface</a:t>
+            </a:r>
+            <a:r>
+              <a:rPr lang="en-CA" dirty="0"/>
+              <a:t>: </a:t>
+            </a:r>
+            <a:r>
+              <a:rPr lang="en-CA" dirty="0" err="1" smtClean="0"/>
+              <a:t>Osker</a:t>
+            </a:r>
+            <a:r>
+              <a:rPr lang="en-CA" dirty="0" smtClean="0"/>
+              <a:t>, </a:t>
+            </a:r>
+            <a:r>
+              <a:rPr lang="en-CA" dirty="0" err="1" smtClean="0"/>
+              <a:t>iSphere</a:t>
+            </a:r>
+            <a:r>
+              <a:rPr lang="en-CA" dirty="0" smtClean="0"/>
+              <a:t>, ISMER</a:t>
+            </a:r>
+            <a:endParaRPr lang="en-CA" dirty="0"/>
+          </a:p>
+          <a:p>
+            <a:pPr marL="285750" indent="-285750">
+              <a:buFont typeface="Arial" panose="020B0604020202020204" pitchFamily="34" charset="0"/>
+              <a:buChar char="•"/>
+            </a:pPr>
+            <a:r>
+              <a:rPr lang="en-CA" dirty="0" smtClean="0"/>
+              <a:t>Intermediate</a:t>
+            </a:r>
+            <a:r>
+              <a:rPr lang="en-CA" dirty="0"/>
+              <a:t>: </a:t>
+            </a:r>
+            <a:r>
+              <a:rPr lang="en-CA" dirty="0" smtClean="0"/>
+              <a:t>SCT, </a:t>
+            </a:r>
+            <a:r>
+              <a:rPr lang="en-CA" dirty="0"/>
+              <a:t>UBC</a:t>
+            </a:r>
+            <a:endParaRPr lang="en-CA" dirty="0"/>
+          </a:p>
+          <a:p>
+            <a:pPr marL="285750" indent="-285750">
+              <a:buFont typeface="Arial" panose="020B0604020202020204" pitchFamily="34" charset="0"/>
+              <a:buChar char="•"/>
+            </a:pPr>
+            <a:r>
+              <a:rPr lang="en-CA" dirty="0" err="1" smtClean="0"/>
+              <a:t>Drogued</a:t>
+            </a:r>
+            <a:r>
+              <a:rPr lang="en-CA" dirty="0" smtClean="0"/>
+              <a:t>: CARTHE</a:t>
+            </a:r>
+            <a:r>
+              <a:rPr lang="en-CA" dirty="0"/>
+              <a:t>, CODE</a:t>
+            </a:r>
+            <a:r>
+              <a:rPr lang="en-CA" dirty="0" smtClean="0"/>
+              <a:t>, </a:t>
+            </a:r>
+            <a:r>
+              <a:rPr lang="en-CA" dirty="0" err="1" smtClean="0"/>
+              <a:t>iSVP</a:t>
+            </a:r>
+            <a:endParaRPr lang="en-CA" dirty="0"/>
+          </a:p>
+        </p:txBody>
+      </p:sp>
+      <p:sp>
+        <p:nvSpPr>
+          <p:cNvPr id="11" name="Rectangle 10"/>
+          <p:cNvSpPr/>
+          <p:nvPr/>
+        </p:nvSpPr>
+        <p:spPr>
+          <a:xfrm>
+            <a:off x="4504044" y="6546562"/>
+            <a:ext cx="4572000" cy="307777"/>
+          </a:xfrm>
+          <a:prstGeom prst="rect">
+            <a:avLst/>
+          </a:prstGeom>
+        </p:spPr>
+        <p:txBody>
+          <a:bodyPr>
+            <a:spAutoFit/>
+          </a:bodyPr>
+          <a:lstStyle/>
+          <a:p>
+            <a:r>
+              <a:rPr lang="en-US" sz="1400" i="1" dirty="0">
+                <a:solidFill>
+                  <a:schemeClr val="bg1">
+                    <a:lumMod val="50000"/>
+                  </a:schemeClr>
+                </a:solidFill>
+              </a:rPr>
+              <a:t>https://meopar.ca/research/tracer-release-experiment/</a:t>
+            </a:r>
+          </a:p>
+        </p:txBody>
+      </p:sp>
     </p:spTree>
     <p:extLst>
       <p:ext uri="{BB962C8B-B14F-4D97-AF65-F5344CB8AC3E}">
-        <p14:creationId xmlns:p14="http://schemas.microsoft.com/office/powerpoint/2010/main" val="1751915560"/>
+        <p14:creationId xmlns:p14="http://schemas.microsoft.com/office/powerpoint/2010/main" val="897923488"/>
       </p:ext>
     </p:extLst>
   </p:cSld>
@@ -4224,15 +5994,6 @@
 </file>
 
 <file path=customXml/item1.xml><?xml version="1.0" encoding="utf-8"?>
-<?mso-contentType ?>
-<FormTemplates xmlns="http://schemas.microsoft.com/sharepoint/v3/contenttype/forms">
-  <Display>DocumentLibraryForm</Display>
-  <Edit>DocumentLibraryForm</Edit>
-  <New>DocumentLibraryForm</New>
-</FormTemplates>
-</file>
-
-<file path=customXml/item2.xml><?xml version="1.0" encoding="utf-8"?>
 <ct:contentTypeSchema xmlns:ct="http://schemas.microsoft.com/office/2006/metadata/contentType" xmlns:ma="http://schemas.microsoft.com/office/2006/metadata/properties/metaAttributes" ct:_="" ma:_="" ma:contentTypeName="Document" ma:contentTypeID="0x01010075D0B20BB41BF245A74357C5242D202F" ma:contentTypeVersion="10" ma:contentTypeDescription="Create a new document." ma:contentTypeScope="" ma:versionID="1d63c453300229499d35ee3cdb122db5">
   <xsd:schema xmlns:xsd="http://www.w3.org/2001/XMLSchema" xmlns:xs="http://www.w3.org/2001/XMLSchema" xmlns:p="http://schemas.microsoft.com/office/2006/metadata/properties" xmlns:ns3="acbb3e5d-5d9a-41a2-b23c-a652c639d82c" xmlns:ns4="b6e7370b-7179-4676-9a6f-0d2482e7e8cc" targetNamespace="http://schemas.microsoft.com/office/2006/metadata/properties" ma:root="true" ma:fieldsID="d0431d3bfc2050b05195e48dfbe7c542" ns3:_="" ns4:_="">
     <xsd:import namespace="acbb3e5d-5d9a-41a2-b23c-a652c639d82c"/>
@@ -4449,6 +6210,15 @@
 </ct:contentTypeSchema>
 </file>
 
+<file path=customXml/item2.xml><?xml version="1.0" encoding="utf-8"?>
+<?mso-contentType ?>
+<FormTemplates xmlns="http://schemas.microsoft.com/sharepoint/v3/contenttype/forms">
+  <Display>DocumentLibraryForm</Display>
+  <Edit>DocumentLibraryForm</Edit>
+  <New>DocumentLibraryForm</New>
+</FormTemplates>
+</file>
+
 <file path=customXml/item3.xml><?xml version="1.0" encoding="utf-8"?>
 <p:properties xmlns:p="http://schemas.microsoft.com/office/2006/metadata/properties" xmlns:xsi="http://www.w3.org/2001/XMLSchema-instance" xmlns:pc="http://schemas.microsoft.com/office/infopath/2007/PartnerControls">
   <documentManagement>
@@ -4470,14 +6240,6 @@
 </file>
 
 <file path=customXml/itemProps1.xml><?xml version="1.0" encoding="utf-8"?>
-<ds:datastoreItem xmlns:ds="http://schemas.openxmlformats.org/officeDocument/2006/customXml" ds:itemID="{3FEA80A5-E996-4AFB-AE99-8EED984C9B80}">
-  <ds:schemaRefs>
-    <ds:schemaRef ds:uri="http://schemas.microsoft.com/sharepoint/v3/contenttype/forms"/>
-  </ds:schemaRefs>
-</ds:datastoreItem>
-</file>
-
-<file path=customXml/itemProps2.xml><?xml version="1.0" encoding="utf-8"?>
 <ds:datastoreItem xmlns:ds="http://schemas.openxmlformats.org/officeDocument/2006/customXml" ds:itemID="{2C5073C6-8F39-4D0C-98A3-3188256BBC8F}">
   <ds:schemaRefs>
     <ds:schemaRef ds:uri="http://schemas.microsoft.com/office/2006/metadata/contentType"/>
@@ -4492,6 +6254,14 @@
     <ds:schemaRef ds:uri="http://purl.org/dc/elements/1.1/"/>
     <ds:schemaRef ds:uri="http://purl.org/dc/terms/"/>
     <ds:schemaRef ds:uri="http://schemas.microsoft.com/internal/obd"/>
+  </ds:schemaRefs>
+</ds:datastoreItem>
+</file>
+
+<file path=customXml/itemProps2.xml><?xml version="1.0" encoding="utf-8"?>
+<ds:datastoreItem xmlns:ds="http://schemas.openxmlformats.org/officeDocument/2006/customXml" ds:itemID="{3FEA80A5-E996-4AFB-AE99-8EED984C9B80}">
+  <ds:schemaRefs>
+    <ds:schemaRef ds:uri="http://schemas.microsoft.com/sharepoint/v3/contenttype/forms"/>
   </ds:schemaRefs>
 </ds:datastoreItem>
 </file>

</xml_diff>

<commit_message>
small edits in 2021 pres
</commit_message>
<xml_diff>
--- a/presentations/MOI-CONCEPTS-2021/Soontiens_Sutherland_drift_DFO-MOI.pptx
+++ b/presentations/MOI-CONCEPTS-2021/Soontiens_Sutherland_drift_DFO-MOI.pptx
@@ -4,6 +4,9 @@
   <p:sldMasterIdLst>
     <p:sldMasterId id="2147483648" r:id="rId4"/>
   </p:sldMasterIdLst>
+  <p:notesMasterIdLst>
+    <p:notesMasterId r:id="rId24"/>
+  </p:notesMasterIdLst>
   <p:sldIdLst>
     <p:sldId id="256" r:id="rId5"/>
     <p:sldId id="257" r:id="rId6"/>
@@ -18,14 +21,12 @@
     <p:sldId id="273" r:id="rId15"/>
     <p:sldId id="274" r:id="rId16"/>
     <p:sldId id="275" r:id="rId17"/>
-    <p:sldId id="276" r:id="rId18"/>
-    <p:sldId id="264" r:id="rId19"/>
-    <p:sldId id="265" r:id="rId20"/>
-    <p:sldId id="266" r:id="rId21"/>
-    <p:sldId id="267" r:id="rId22"/>
-    <p:sldId id="268" r:id="rId23"/>
-    <p:sldId id="269" r:id="rId24"/>
-    <p:sldId id="270" r:id="rId25"/>
+    <p:sldId id="264" r:id="rId18"/>
+    <p:sldId id="265" r:id="rId19"/>
+    <p:sldId id="278" r:id="rId20"/>
+    <p:sldId id="277" r:id="rId21"/>
+    <p:sldId id="268" r:id="rId22"/>
+    <p:sldId id="279" r:id="rId23"/>
   </p:sldIdLst>
   <p:sldSz cx="9144000" cy="6858000" type="screen4x3"/>
   <p:notesSz cx="6858000" cy="9144000"/>
@@ -143,6 +144,356 @@
 </p:presentation>
 </file>
 
+<file path=ppt/notesMasters/notesMaster1.xml><?xml version="1.0" encoding="utf-8"?>
+<p:notesMaster xmlns:a="http://schemas.openxmlformats.org/drawingml/2006/main" xmlns:r="http://schemas.openxmlformats.org/officeDocument/2006/relationships" xmlns:p="http://schemas.openxmlformats.org/presentationml/2006/main">
+  <p:cSld>
+    <p:bg>
+      <p:bgRef idx="1001">
+        <a:schemeClr val="bg1"/>
+      </p:bgRef>
+    </p:bg>
+    <p:spTree>
+      <p:nvGrpSpPr>
+        <p:cNvPr id="1" name=""/>
+        <p:cNvGrpSpPr/>
+        <p:nvPr/>
+      </p:nvGrpSpPr>
+      <p:grpSpPr>
+        <a:xfrm>
+          <a:off x="0" y="0"/>
+          <a:ext cx="0" cy="0"/>
+          <a:chOff x="0" y="0"/>
+          <a:chExt cx="0" cy="0"/>
+        </a:xfrm>
+      </p:grpSpPr>
+      <p:sp>
+        <p:nvSpPr>
+          <p:cNvPr id="2" name="Header Placeholder 1"/>
+          <p:cNvSpPr>
+            <a:spLocks noGrp="1"/>
+          </p:cNvSpPr>
+          <p:nvPr>
+            <p:ph type="hdr" sz="quarter"/>
+          </p:nvPr>
+        </p:nvSpPr>
+        <p:spPr>
+          <a:xfrm>
+            <a:off x="0" y="0"/>
+            <a:ext cx="2971800" cy="458788"/>
+          </a:xfrm>
+          <a:prstGeom prst="rect">
+            <a:avLst/>
+          </a:prstGeom>
+        </p:spPr>
+        <p:txBody>
+          <a:bodyPr vert="horz" lIns="91440" tIns="45720" rIns="91440" bIns="45720" rtlCol="0"/>
+          <a:lstStyle>
+            <a:lvl1pPr algn="l">
+              <a:defRPr sz="1200"/>
+            </a:lvl1pPr>
+          </a:lstStyle>
+          <a:p>
+            <a:endParaRPr lang="en-CA"/>
+          </a:p>
+        </p:txBody>
+      </p:sp>
+      <p:sp>
+        <p:nvSpPr>
+          <p:cNvPr id="3" name="Date Placeholder 2"/>
+          <p:cNvSpPr>
+            <a:spLocks noGrp="1"/>
+          </p:cNvSpPr>
+          <p:nvPr>
+            <p:ph type="dt" idx="1"/>
+          </p:nvPr>
+        </p:nvSpPr>
+        <p:spPr>
+          <a:xfrm>
+            <a:off x="3884613" y="0"/>
+            <a:ext cx="2971800" cy="458788"/>
+          </a:xfrm>
+          <a:prstGeom prst="rect">
+            <a:avLst/>
+          </a:prstGeom>
+        </p:spPr>
+        <p:txBody>
+          <a:bodyPr vert="horz" lIns="91440" tIns="45720" rIns="91440" bIns="45720" rtlCol="0"/>
+          <a:lstStyle>
+            <a:lvl1pPr algn="r">
+              <a:defRPr sz="1200"/>
+            </a:lvl1pPr>
+          </a:lstStyle>
+          <a:p>
+            <a:fld id="{C5A28BFE-5696-48E1-B238-D04A1C88E3F2}" type="datetimeFigureOut">
+              <a:rPr lang="en-CA" smtClean="0"/>
+              <a:t>2021-10-06</a:t>
+            </a:fld>
+            <a:endParaRPr lang="en-CA"/>
+          </a:p>
+        </p:txBody>
+      </p:sp>
+      <p:sp>
+        <p:nvSpPr>
+          <p:cNvPr id="4" name="Slide Image Placeholder 3"/>
+          <p:cNvSpPr>
+            <a:spLocks noGrp="1" noRot="1" noChangeAspect="1"/>
+          </p:cNvSpPr>
+          <p:nvPr>
+            <p:ph type="sldImg" idx="2"/>
+          </p:nvPr>
+        </p:nvSpPr>
+        <p:spPr>
+          <a:xfrm>
+            <a:off x="1371600" y="1143000"/>
+            <a:ext cx="4114800" cy="3086100"/>
+          </a:xfrm>
+          <a:prstGeom prst="rect">
+            <a:avLst/>
+          </a:prstGeom>
+          <a:noFill/>
+          <a:ln w="12700">
+            <a:solidFill>
+              <a:prstClr val="black"/>
+            </a:solidFill>
+          </a:ln>
+        </p:spPr>
+        <p:txBody>
+          <a:bodyPr vert="horz" lIns="91440" tIns="45720" rIns="91440" bIns="45720" rtlCol="0" anchor="ctr"/>
+          <a:lstStyle/>
+          <a:p>
+            <a:endParaRPr lang="en-CA"/>
+          </a:p>
+        </p:txBody>
+      </p:sp>
+      <p:sp>
+        <p:nvSpPr>
+          <p:cNvPr id="5" name="Notes Placeholder 4"/>
+          <p:cNvSpPr>
+            <a:spLocks noGrp="1"/>
+          </p:cNvSpPr>
+          <p:nvPr>
+            <p:ph type="body" sz="quarter" idx="3"/>
+          </p:nvPr>
+        </p:nvSpPr>
+        <p:spPr>
+          <a:xfrm>
+            <a:off x="685800" y="4400550"/>
+            <a:ext cx="5486400" cy="3600450"/>
+          </a:xfrm>
+          <a:prstGeom prst="rect">
+            <a:avLst/>
+          </a:prstGeom>
+        </p:spPr>
+        <p:txBody>
+          <a:bodyPr vert="horz" lIns="91440" tIns="45720" rIns="91440" bIns="45720" rtlCol="0"/>
+          <a:lstStyle/>
+          <a:p>
+            <a:pPr lvl="0"/>
+            <a:r>
+              <a:rPr lang="en-US" smtClean="0"/>
+              <a:t>Edit Master text styles</a:t>
+            </a:r>
+          </a:p>
+          <a:p>
+            <a:pPr lvl="1"/>
+            <a:r>
+              <a:rPr lang="en-US" smtClean="0"/>
+              <a:t>Second level</a:t>
+            </a:r>
+          </a:p>
+          <a:p>
+            <a:pPr lvl="2"/>
+            <a:r>
+              <a:rPr lang="en-US" smtClean="0"/>
+              <a:t>Third level</a:t>
+            </a:r>
+          </a:p>
+          <a:p>
+            <a:pPr lvl="3"/>
+            <a:r>
+              <a:rPr lang="en-US" smtClean="0"/>
+              <a:t>Fourth level</a:t>
+            </a:r>
+          </a:p>
+          <a:p>
+            <a:pPr lvl="4"/>
+            <a:r>
+              <a:rPr lang="en-US" smtClean="0"/>
+              <a:t>Fifth level</a:t>
+            </a:r>
+            <a:endParaRPr lang="en-CA"/>
+          </a:p>
+        </p:txBody>
+      </p:sp>
+      <p:sp>
+        <p:nvSpPr>
+          <p:cNvPr id="6" name="Footer Placeholder 5"/>
+          <p:cNvSpPr>
+            <a:spLocks noGrp="1"/>
+          </p:cNvSpPr>
+          <p:nvPr>
+            <p:ph type="ftr" sz="quarter" idx="4"/>
+          </p:nvPr>
+        </p:nvSpPr>
+        <p:spPr>
+          <a:xfrm>
+            <a:off x="0" y="8685213"/>
+            <a:ext cx="2971800" cy="458787"/>
+          </a:xfrm>
+          <a:prstGeom prst="rect">
+            <a:avLst/>
+          </a:prstGeom>
+        </p:spPr>
+        <p:txBody>
+          <a:bodyPr vert="horz" lIns="91440" tIns="45720" rIns="91440" bIns="45720" rtlCol="0" anchor="b"/>
+          <a:lstStyle>
+            <a:lvl1pPr algn="l">
+              <a:defRPr sz="1200"/>
+            </a:lvl1pPr>
+          </a:lstStyle>
+          <a:p>
+            <a:endParaRPr lang="en-CA"/>
+          </a:p>
+        </p:txBody>
+      </p:sp>
+      <p:sp>
+        <p:nvSpPr>
+          <p:cNvPr id="7" name="Slide Number Placeholder 6"/>
+          <p:cNvSpPr>
+            <a:spLocks noGrp="1"/>
+          </p:cNvSpPr>
+          <p:nvPr>
+            <p:ph type="sldNum" sz="quarter" idx="5"/>
+          </p:nvPr>
+        </p:nvSpPr>
+        <p:spPr>
+          <a:xfrm>
+            <a:off x="3884613" y="8685213"/>
+            <a:ext cx="2971800" cy="458787"/>
+          </a:xfrm>
+          <a:prstGeom prst="rect">
+            <a:avLst/>
+          </a:prstGeom>
+        </p:spPr>
+        <p:txBody>
+          <a:bodyPr vert="horz" lIns="91440" tIns="45720" rIns="91440" bIns="45720" rtlCol="0" anchor="b"/>
+          <a:lstStyle>
+            <a:lvl1pPr algn="r">
+              <a:defRPr sz="1200"/>
+            </a:lvl1pPr>
+          </a:lstStyle>
+          <a:p>
+            <a:fld id="{7CD6D6D6-7134-4D7B-80F7-49B745E4ECE6}" type="slidenum">
+              <a:rPr lang="en-CA" smtClean="0"/>
+              <a:t>‹#›</a:t>
+            </a:fld>
+            <a:endParaRPr lang="en-CA"/>
+          </a:p>
+        </p:txBody>
+      </p:sp>
+    </p:spTree>
+    <p:extLst>
+      <p:ext uri="{BB962C8B-B14F-4D97-AF65-F5344CB8AC3E}">
+        <p14:creationId xmlns:p14="http://schemas.microsoft.com/office/powerpoint/2010/main" val="3645580672"/>
+      </p:ext>
+    </p:extLst>
+  </p:cSld>
+  <p:clrMap bg1="lt1" tx1="dk1" bg2="lt2" tx2="dk2" accent1="accent1" accent2="accent2" accent3="accent3" accent4="accent4" accent5="accent5" accent6="accent6" hlink="hlink" folHlink="folHlink"/>
+  <p:notesStyle>
+    <a:lvl1pPr marL="0" algn="l" defTabSz="914400" rtl="0" eaLnBrk="1" latinLnBrk="0" hangingPunct="1">
+      <a:defRPr sz="1200" kern="1200">
+        <a:solidFill>
+          <a:schemeClr val="tx1"/>
+        </a:solidFill>
+        <a:latin typeface="+mn-lt"/>
+        <a:ea typeface="+mn-ea"/>
+        <a:cs typeface="+mn-cs"/>
+      </a:defRPr>
+    </a:lvl1pPr>
+    <a:lvl2pPr marL="457200" algn="l" defTabSz="914400" rtl="0" eaLnBrk="1" latinLnBrk="0" hangingPunct="1">
+      <a:defRPr sz="1200" kern="1200">
+        <a:solidFill>
+          <a:schemeClr val="tx1"/>
+        </a:solidFill>
+        <a:latin typeface="+mn-lt"/>
+        <a:ea typeface="+mn-ea"/>
+        <a:cs typeface="+mn-cs"/>
+      </a:defRPr>
+    </a:lvl2pPr>
+    <a:lvl3pPr marL="914400" algn="l" defTabSz="914400" rtl="0" eaLnBrk="1" latinLnBrk="0" hangingPunct="1">
+      <a:defRPr sz="1200" kern="1200">
+        <a:solidFill>
+          <a:schemeClr val="tx1"/>
+        </a:solidFill>
+        <a:latin typeface="+mn-lt"/>
+        <a:ea typeface="+mn-ea"/>
+        <a:cs typeface="+mn-cs"/>
+      </a:defRPr>
+    </a:lvl3pPr>
+    <a:lvl4pPr marL="1371600" algn="l" defTabSz="914400" rtl="0" eaLnBrk="1" latinLnBrk="0" hangingPunct="1">
+      <a:defRPr sz="1200" kern="1200">
+        <a:solidFill>
+          <a:schemeClr val="tx1"/>
+        </a:solidFill>
+        <a:latin typeface="+mn-lt"/>
+        <a:ea typeface="+mn-ea"/>
+        <a:cs typeface="+mn-cs"/>
+      </a:defRPr>
+    </a:lvl4pPr>
+    <a:lvl5pPr marL="1828800" algn="l" defTabSz="914400" rtl="0" eaLnBrk="1" latinLnBrk="0" hangingPunct="1">
+      <a:defRPr sz="1200" kern="1200">
+        <a:solidFill>
+          <a:schemeClr val="tx1"/>
+        </a:solidFill>
+        <a:latin typeface="+mn-lt"/>
+        <a:ea typeface="+mn-ea"/>
+        <a:cs typeface="+mn-cs"/>
+      </a:defRPr>
+    </a:lvl5pPr>
+    <a:lvl6pPr marL="2286000" algn="l" defTabSz="914400" rtl="0" eaLnBrk="1" latinLnBrk="0" hangingPunct="1">
+      <a:defRPr sz="1200" kern="1200">
+        <a:solidFill>
+          <a:schemeClr val="tx1"/>
+        </a:solidFill>
+        <a:latin typeface="+mn-lt"/>
+        <a:ea typeface="+mn-ea"/>
+        <a:cs typeface="+mn-cs"/>
+      </a:defRPr>
+    </a:lvl6pPr>
+    <a:lvl7pPr marL="2743200" algn="l" defTabSz="914400" rtl="0" eaLnBrk="1" latinLnBrk="0" hangingPunct="1">
+      <a:defRPr sz="1200" kern="1200">
+        <a:solidFill>
+          <a:schemeClr val="tx1"/>
+        </a:solidFill>
+        <a:latin typeface="+mn-lt"/>
+        <a:ea typeface="+mn-ea"/>
+        <a:cs typeface="+mn-cs"/>
+      </a:defRPr>
+    </a:lvl7pPr>
+    <a:lvl8pPr marL="3200400" algn="l" defTabSz="914400" rtl="0" eaLnBrk="1" latinLnBrk="0" hangingPunct="1">
+      <a:defRPr sz="1200" kern="1200">
+        <a:solidFill>
+          <a:schemeClr val="tx1"/>
+        </a:solidFill>
+        <a:latin typeface="+mn-lt"/>
+        <a:ea typeface="+mn-ea"/>
+        <a:cs typeface="+mn-cs"/>
+      </a:defRPr>
+    </a:lvl8pPr>
+    <a:lvl9pPr marL="3657600" algn="l" defTabSz="914400" rtl="0" eaLnBrk="1" latinLnBrk="0" hangingPunct="1">
+      <a:defRPr sz="1200" kern="1200">
+        <a:solidFill>
+          <a:schemeClr val="tx1"/>
+        </a:solidFill>
+        <a:latin typeface="+mn-lt"/>
+        <a:ea typeface="+mn-ea"/>
+        <a:cs typeface="+mn-cs"/>
+      </a:defRPr>
+    </a:lvl9pPr>
+  </p:notesStyle>
+</p:notesMaster>
+</file>
+
 <file path=ppt/slideLayouts/slideLayout1.xml><?xml version="1.0" encoding="utf-8"?>
 <p:sldLayout xmlns:a="http://schemas.openxmlformats.org/drawingml/2006/main" xmlns:r="http://schemas.openxmlformats.org/officeDocument/2006/relationships" xmlns:p="http://schemas.openxmlformats.org/presentationml/2006/main" type="title" preserve="1">
   <p:cSld name="Title Slide">
@@ -355,7 +706,7 @@
           <a:p>
             <a:fld id="{6F037ADB-4FB9-482D-A1A4-E1F489B212F5}" type="datetimeFigureOut">
               <a:rPr lang="en-US" smtClean="0"/>
-              <a:t>10/5/2021</a:t>
+              <a:t>10/6/2021</a:t>
             </a:fld>
             <a:endParaRPr lang="en-US" dirty="0"/>
           </a:p>
@@ -502,7 +853,7 @@
           <a:p>
             <a:fld id="{6F037ADB-4FB9-482D-A1A4-E1F489B212F5}" type="datetimeFigureOut">
               <a:rPr lang="en-US" smtClean="0"/>
-              <a:t>10/5/2021</a:t>
+              <a:t>10/6/2021</a:t>
             </a:fld>
             <a:endParaRPr lang="en-US"/>
           </a:p>
@@ -705,7 +1056,7 @@
           <a:p>
             <a:fld id="{6F037ADB-4FB9-482D-A1A4-E1F489B212F5}" type="datetimeFigureOut">
               <a:rPr lang="en-US" smtClean="0"/>
-              <a:t>10/5/2021</a:t>
+              <a:t>10/6/2021</a:t>
             </a:fld>
             <a:endParaRPr lang="en-US"/>
           </a:p>
@@ -1061,9 +1412,16 @@
             <p:ph type="subTitle" idx="1"/>
           </p:nvPr>
         </p:nvSpPr>
-        <p:spPr/>
+        <p:spPr>
+          <a:xfrm>
+            <a:off x="850666" y="2883051"/>
+            <a:ext cx="4945470" cy="1122013"/>
+          </a:xfrm>
+        </p:spPr>
         <p:txBody>
-          <a:bodyPr/>
+          <a:bodyPr>
+            <a:normAutofit lnSpcReduction="10000"/>
+          </a:bodyPr>
           <a:lstStyle/>
           <a:p>
             <a:r>
@@ -1081,6 +1439,50 @@
               <a:t>Soontiens</a:t>
             </a:r>
             <a:endParaRPr lang="en-US" dirty="0"/>
+          </a:p>
+        </p:txBody>
+      </p:sp>
+      <p:sp>
+        <p:nvSpPr>
+          <p:cNvPr id="4" name="TextBox 3"/>
+          <p:cNvSpPr txBox="1"/>
+          <p:nvPr/>
+        </p:nvSpPr>
+        <p:spPr>
+          <a:xfrm>
+            <a:off x="683568" y="4509120"/>
+            <a:ext cx="3672408" cy="923330"/>
+          </a:xfrm>
+          <a:prstGeom prst="rect">
+            <a:avLst/>
+          </a:prstGeom>
+          <a:noFill/>
+        </p:spPr>
+        <p:txBody>
+          <a:bodyPr wrap="square" rtlCol="0">
+            <a:spAutoFit/>
+          </a:bodyPr>
+          <a:lstStyle/>
+          <a:p>
+            <a:r>
+              <a:rPr lang="en-US" dirty="0" smtClean="0">
+                <a:hlinkClick r:id="rId2"/>
+              </a:rPr>
+              <a:t>Graigory.Sutherland@ec.gc.ca</a:t>
+            </a:r>
+            <a:endParaRPr lang="en-US" dirty="0" smtClean="0"/>
+          </a:p>
+          <a:p>
+            <a:r>
+              <a:rPr lang="en-US" dirty="0" smtClean="0">
+                <a:hlinkClick r:id="rId3"/>
+              </a:rPr>
+              <a:t>Nancy.Soontiens@dfo-mpo.gc.ca</a:t>
+            </a:r>
+            <a:endParaRPr lang="en-US" dirty="0" smtClean="0"/>
+          </a:p>
+          <a:p>
+            <a:endParaRPr lang="en-US" dirty="0" smtClean="0"/>
           </a:p>
         </p:txBody>
       </p:sp>
@@ -1132,8 +1534,8 @@
           </a:p>
         </p:txBody>
       </p:sp>
-      <mc:AlternateContent xmlns:mc="http://schemas.openxmlformats.org/markup-compatibility/2006">
-        <mc:Choice xmlns:a14="http://schemas.microsoft.com/office/drawing/2010/main" Requires="a14">
+      <mc:AlternateContent xmlns:mc="http://schemas.openxmlformats.org/markup-compatibility/2006" xmlns:a14="http://schemas.microsoft.com/office/drawing/2010/main">
+        <mc:Choice Requires="a14">
           <p:sp>
             <p:nvSpPr>
               <p:cNvPr id="3" name="Content Placeholder 2"/>
@@ -1598,7 +2000,7 @@
             </p:txBody>
           </p:sp>
         </mc:Choice>
-        <mc:Fallback>
+        <mc:Fallback xmlns="">
           <p:sp>
             <p:nvSpPr>
               <p:cNvPr id="3" name="Content Placeholder 2"/>
@@ -1908,8 +2310,8 @@
           </a:prstGeom>
         </p:spPr>
       </p:pic>
-      <mc:AlternateContent xmlns:mc="http://schemas.openxmlformats.org/markup-compatibility/2006">
-        <mc:Choice xmlns:a14="http://schemas.microsoft.com/office/drawing/2010/main" Requires="a14">
+      <mc:AlternateContent xmlns:mc="http://schemas.openxmlformats.org/markup-compatibility/2006" xmlns:a14="http://schemas.microsoft.com/office/drawing/2010/main">
+        <mc:Choice Requires="a14">
           <p:sp>
             <p:nvSpPr>
               <p:cNvPr id="6" name="TextBox 5">
@@ -1938,6 +2340,7 @@
               </a:bodyPr>
               <a:lstStyle/>
               <a:p>
+                <a:pPr/>
                 <a14:m>
                   <m:oMathPara xmlns:m="http://schemas.openxmlformats.org/officeDocument/2006/math">
                     <m:oMathParaPr>
@@ -1984,7 +2387,7 @@
             </p:txBody>
           </p:sp>
         </mc:Choice>
-        <mc:Fallback>
+        <mc:Fallback xmlns="">
           <p:sp>
             <p:nvSpPr>
               <p:cNvPr id="6" name="TextBox 5">
@@ -2029,8 +2432,8 @@
           </p:sp>
         </mc:Fallback>
       </mc:AlternateContent>
-      <mc:AlternateContent xmlns:mc="http://schemas.openxmlformats.org/markup-compatibility/2006">
-        <mc:Choice xmlns:a14="http://schemas.microsoft.com/office/drawing/2010/main" Requires="a14">
+      <mc:AlternateContent xmlns:mc="http://schemas.openxmlformats.org/markup-compatibility/2006" xmlns:a14="http://schemas.microsoft.com/office/drawing/2010/main">
+        <mc:Choice Requires="a14">
           <p:sp>
             <p:nvSpPr>
               <p:cNvPr id="8" name="TextBox 7"/>
@@ -2053,6 +2456,7 @@
               </a:bodyPr>
               <a:lstStyle/>
               <a:p>
+                <a:pPr/>
                 <a14:m>
                   <m:oMathPara xmlns:m="http://schemas.openxmlformats.org/officeDocument/2006/math">
                     <m:oMathParaPr>
@@ -2229,7 +2633,7 @@
             </p:txBody>
           </p:sp>
         </mc:Choice>
-        <mc:Fallback>
+        <mc:Fallback xmlns="">
           <p:sp>
             <p:nvSpPr>
               <p:cNvPr id="8" name="TextBox 7"/>
@@ -2268,8 +2672,8 @@
           </p:sp>
         </mc:Fallback>
       </mc:AlternateContent>
-      <mc:AlternateContent xmlns:mc="http://schemas.openxmlformats.org/markup-compatibility/2006">
-        <mc:Choice xmlns:a14="http://schemas.microsoft.com/office/drawing/2010/main" Requires="a14">
+      <mc:AlternateContent xmlns:mc="http://schemas.openxmlformats.org/markup-compatibility/2006" xmlns:a14="http://schemas.microsoft.com/office/drawing/2010/main">
+        <mc:Choice Requires="a14">
           <p:sp>
             <p:nvSpPr>
               <p:cNvPr id="9" name="TextBox 8">
@@ -2298,6 +2702,7 @@
               </a:bodyPr>
               <a:lstStyle/>
               <a:p>
+                <a:pPr/>
                 <a14:m>
                   <m:oMathPara xmlns:m="http://schemas.openxmlformats.org/officeDocument/2006/math">
                     <m:oMathParaPr>
@@ -2344,7 +2749,7 @@
             </p:txBody>
           </p:sp>
         </mc:Choice>
-        <mc:Fallback>
+        <mc:Fallback xmlns="">
           <p:sp>
             <p:nvSpPr>
               <p:cNvPr id="9" name="TextBox 8">
@@ -2481,85 +2886,6 @@
       </p:grpSpPr>
       <p:sp>
         <p:nvSpPr>
-          <p:cNvPr id="2" name="Title 1"/>
-          <p:cNvSpPr>
-            <a:spLocks noGrp="1"/>
-          </p:cNvSpPr>
-          <p:nvPr>
-            <p:ph type="title"/>
-          </p:nvPr>
-        </p:nvSpPr>
-        <p:spPr/>
-        <p:txBody>
-          <a:bodyPr/>
-          <a:lstStyle/>
-          <a:p>
-            <a:r>
-              <a:rPr lang="en-US" dirty="0" smtClean="0"/>
-              <a:t>ROTARY </a:t>
-            </a:r>
-            <a:r>
-              <a:rPr lang="en-US" dirty="0" err="1" smtClean="0"/>
-              <a:t>SPECTRa</a:t>
-            </a:r>
-            <a:r>
-              <a:rPr lang="en-US" dirty="0"/>
-              <a:t>?</a:t>
-            </a:r>
-          </a:p>
-        </p:txBody>
-      </p:sp>
-      <p:sp>
-        <p:nvSpPr>
-          <p:cNvPr id="3" name="Content Placeholder 2"/>
-          <p:cNvSpPr>
-            <a:spLocks noGrp="1"/>
-          </p:cNvSpPr>
-          <p:nvPr>
-            <p:ph idx="1"/>
-          </p:nvPr>
-        </p:nvSpPr>
-        <p:spPr/>
-        <p:txBody>
-          <a:bodyPr/>
-          <a:lstStyle/>
-          <a:p>
-            <a:endParaRPr lang="en-US"/>
-          </a:p>
-        </p:txBody>
-      </p:sp>
-    </p:spTree>
-    <p:extLst>
-      <p:ext uri="{BB962C8B-B14F-4D97-AF65-F5344CB8AC3E}">
-        <p14:creationId xmlns:p14="http://schemas.microsoft.com/office/powerpoint/2010/main" val="2478731994"/>
-      </p:ext>
-    </p:extLst>
-  </p:cSld>
-  <p:clrMapOvr>
-    <a:masterClrMapping/>
-  </p:clrMapOvr>
-</p:sld>
-</file>
-
-<file path=ppt/slides/slide15.xml><?xml version="1.0" encoding="utf-8"?>
-<p:sld xmlns:a="http://schemas.openxmlformats.org/drawingml/2006/main" xmlns:r="http://schemas.openxmlformats.org/officeDocument/2006/relationships" xmlns:p="http://schemas.openxmlformats.org/presentationml/2006/main">
-  <p:cSld>
-    <p:spTree>
-      <p:nvGrpSpPr>
-        <p:cNvPr id="1" name=""/>
-        <p:cNvGrpSpPr/>
-        <p:nvPr/>
-      </p:nvGrpSpPr>
-      <p:grpSpPr>
-        <a:xfrm>
-          <a:off x="0" y="0"/>
-          <a:ext cx="0" cy="0"/>
-          <a:chOff x="0" y="0"/>
-          <a:chExt cx="0" cy="0"/>
-        </a:xfrm>
-      </p:grpSpPr>
-      <p:sp>
-        <p:nvSpPr>
           <p:cNvPr id="2" name="Title 1">
             <a:extLst>
               <a:ext uri="{FF2B5EF4-FFF2-40B4-BE49-F238E27FC236}">
@@ -2588,8 +2914,8 @@
           </a:p>
         </p:txBody>
       </p:sp>
-      <mc:AlternateContent xmlns:mc="http://schemas.openxmlformats.org/markup-compatibility/2006" xmlns:a14="http://schemas.microsoft.com/office/drawing/2010/main">
-        <mc:Choice Requires="a14">
+      <mc:AlternateContent xmlns:mc="http://schemas.openxmlformats.org/markup-compatibility/2006">
+        <mc:Choice xmlns:a14="http://schemas.microsoft.com/office/drawing/2010/main" Requires="a14">
           <p:sp>
             <p:nvSpPr>
               <p:cNvPr id="3" name="Content Placeholder 2">
@@ -2609,12 +2935,12 @@
             <p:spPr/>
             <p:txBody>
               <a:bodyPr>
-                <a:normAutofit fontScale="92500" lnSpcReduction="20000"/>
+                <a:normAutofit/>
               </a:bodyPr>
               <a:lstStyle/>
               <a:p>
                 <a:r>
-                  <a:rPr lang="en-CA" dirty="0"/>
+                  <a:rPr lang="en-CA" dirty="0" smtClean="0"/>
                   <a:t>An alternative approach to relative dispersion is to use the separation distance as the independent variable and average exit times</a:t>
                 </a:r>
               </a:p>
@@ -2737,7 +3063,7 @@
                           <a:rPr lang="en-US" b="0" i="1" smtClean="0">
                             <a:latin typeface="Cambria Math" panose="02040503050406030204" pitchFamily="18" charset="0"/>
                           </a:rPr>
-                          <m:t>𝑑</m:t>
+                          <m:t>𝛿</m:t>
                         </m:r>
                       </m:e>
                       <m:sub>
@@ -3003,141 +3329,6 @@
                 <a:endParaRPr lang="en-CA" dirty="0"/>
               </a:p>
               <a:p>
-                <a14:m>
-                  <m:oMath xmlns:m="http://schemas.openxmlformats.org/officeDocument/2006/math">
-                    <m:r>
-                      <a:rPr lang="en-US" i="1">
-                        <a:latin typeface="Cambria Math" panose="02040503050406030204" pitchFamily="18" charset="0"/>
-                      </a:rPr>
-                      <m:t>𝜆</m:t>
-                    </m:r>
-                  </m:oMath>
-                </a14:m>
-                <a:r>
-                  <a:rPr lang="en-CA" dirty="0"/>
-                  <a:t> &gt; 0 implies chaos. Can also be used to assess scale dependence of dispersion</a:t>
-                </a:r>
-              </a:p>
-              <a:p>
-                <a:r>
-                  <a:rPr lang="en-CA" dirty="0"/>
-                  <a:t>If rms separation is </a:t>
-                </a:r>
-                <a14:m>
-                  <m:oMath xmlns:m="http://schemas.openxmlformats.org/officeDocument/2006/math">
-                    <m:r>
-                      <a:rPr lang="en-US" b="0" i="1" smtClean="0">
-                        <a:latin typeface="Cambria Math" panose="02040503050406030204" pitchFamily="18" charset="0"/>
-                      </a:rPr>
-                      <m:t>&lt;</m:t>
-                    </m:r>
-                    <m:sSup>
-                      <m:sSupPr>
-                        <m:ctrlPr>
-                          <a:rPr lang="en-US" b="0" i="1" smtClean="0">
-                            <a:latin typeface="Cambria Math" panose="02040503050406030204" pitchFamily="18" charset="0"/>
-                          </a:rPr>
-                        </m:ctrlPr>
-                      </m:sSupPr>
-                      <m:e>
-                        <m:r>
-                          <a:rPr lang="en-US" b="0" i="1" smtClean="0">
-                            <a:latin typeface="Cambria Math" panose="02040503050406030204" pitchFamily="18" charset="0"/>
-                          </a:rPr>
-                          <m:t>𝑦</m:t>
-                        </m:r>
-                      </m:e>
-                      <m:sup>
-                        <m:r>
-                          <a:rPr lang="en-US" b="0" i="1" smtClean="0">
-                            <a:latin typeface="Cambria Math" panose="02040503050406030204" pitchFamily="18" charset="0"/>
-                          </a:rPr>
-                          <m:t>2</m:t>
-                        </m:r>
-                      </m:sup>
-                    </m:sSup>
-                    <m:r>
-                      <a:rPr lang="en-US" b="0" i="1" smtClean="0">
-                        <a:latin typeface="Cambria Math" panose="02040503050406030204" pitchFamily="18" charset="0"/>
-                      </a:rPr>
-                      <m:t>&gt; ∝</m:t>
-                    </m:r>
-                    <m:sSup>
-                      <m:sSupPr>
-                        <m:ctrlPr>
-                          <a:rPr lang="en-US" b="0" i="1" smtClean="0">
-                            <a:latin typeface="Cambria Math" panose="02040503050406030204" pitchFamily="18" charset="0"/>
-                          </a:rPr>
-                        </m:ctrlPr>
-                      </m:sSupPr>
-                      <m:e>
-                        <m:r>
-                          <a:rPr lang="en-US" b="0" i="1" smtClean="0">
-                            <a:latin typeface="Cambria Math" panose="02040503050406030204" pitchFamily="18" charset="0"/>
-                          </a:rPr>
-                          <m:t>𝑡</m:t>
-                        </m:r>
-                      </m:e>
-                      <m:sup>
-                        <m:r>
-                          <a:rPr lang="en-US" b="0" i="1" smtClean="0">
-                            <a:latin typeface="Cambria Math" panose="02040503050406030204" pitchFamily="18" charset="0"/>
-                          </a:rPr>
-                          <m:t>𝛼</m:t>
-                        </m:r>
-                      </m:sup>
-                    </m:sSup>
-                    <m:r>
-                      <a:rPr lang="en-US" b="0" i="1" smtClean="0">
-                        <a:latin typeface="Cambria Math" panose="02040503050406030204" pitchFamily="18" charset="0"/>
-                      </a:rPr>
-                      <m:t>→</m:t>
-                    </m:r>
-                    <m:r>
-                      <a:rPr lang="en-US" b="0" i="1" smtClean="0">
-                        <a:latin typeface="Cambria Math" panose="02040503050406030204" pitchFamily="18" charset="0"/>
-                      </a:rPr>
-                      <m:t>𝜆</m:t>
-                    </m:r>
-                    <m:r>
-                      <a:rPr lang="en-US" b="0" i="1" smtClean="0">
-                        <a:latin typeface="Cambria Math" panose="02040503050406030204" pitchFamily="18" charset="0"/>
-                      </a:rPr>
-                      <m:t>∝</m:t>
-                    </m:r>
-                    <m:sSup>
-                      <m:sSupPr>
-                        <m:ctrlPr>
-                          <a:rPr lang="en-US" b="0" i="1" smtClean="0">
-                            <a:latin typeface="Cambria Math" panose="02040503050406030204" pitchFamily="18" charset="0"/>
-                          </a:rPr>
-                        </m:ctrlPr>
-                      </m:sSupPr>
-                      <m:e>
-                        <m:r>
-                          <a:rPr lang="en-US" b="0" i="1" smtClean="0">
-                            <a:latin typeface="Cambria Math" panose="02040503050406030204" pitchFamily="18" charset="0"/>
-                          </a:rPr>
-                          <m:t>𝑦</m:t>
-                        </m:r>
-                      </m:e>
-                      <m:sup>
-                        <m:r>
-                          <a:rPr lang="en-US" b="0" i="1" smtClean="0">
-                            <a:latin typeface="Cambria Math" panose="02040503050406030204" pitchFamily="18" charset="0"/>
-                          </a:rPr>
-                          <m:t>−2/</m:t>
-                        </m:r>
-                        <m:r>
-                          <a:rPr lang="en-US" b="0" i="1" smtClean="0">
-                            <a:latin typeface="Cambria Math" panose="02040503050406030204" pitchFamily="18" charset="0"/>
-                          </a:rPr>
-                          <m:t>𝛼</m:t>
-                        </m:r>
-                      </m:sup>
-                    </m:sSup>
-                  </m:oMath>
-                </a14:m>
                 <a:endParaRPr lang="en-CA" dirty="0"/>
               </a:p>
               <a:p>
@@ -3149,7 +3340,7 @@
             </p:txBody>
           </p:sp>
         </mc:Choice>
-        <mc:Fallback xmlns="">
+        <mc:Fallback>
           <p:sp>
             <p:nvSpPr>
               <p:cNvPr id="3" name="Content Placeholder 2">
@@ -3170,7 +3361,7 @@
               <a:blipFill>
                 <a:blip r:embed="rId2"/>
                 <a:stretch>
-                  <a:fillRect l="-1698" t="-3641" r="-1852" b="-280"/>
+                  <a:fillRect l="-1704" t="-1752"/>
                 </a:stretch>
               </a:blipFill>
             </p:spPr>
@@ -3202,7 +3393,7 @@
 </p:sld>
 </file>
 
-<file path=ppt/slides/slide16.xml><?xml version="1.0" encoding="utf-8"?>
+<file path=ppt/slides/slide15.xml><?xml version="1.0" encoding="utf-8"?>
 <p:sld xmlns:a="http://schemas.openxmlformats.org/drawingml/2006/main" xmlns:r="http://schemas.openxmlformats.org/officeDocument/2006/relationships" xmlns:p="http://schemas.openxmlformats.org/presentationml/2006/main">
   <p:cSld>
     <p:spTree>
@@ -3459,7 +3650,7 @@
 </p:sld>
 </file>
 
-<file path=ppt/slides/slide17.xml><?xml version="1.0" encoding="utf-8"?>
+<file path=ppt/slides/slide16.xml><?xml version="1.0" encoding="utf-8"?>
 <p:sld xmlns:a="http://schemas.openxmlformats.org/drawingml/2006/main" xmlns:r="http://schemas.openxmlformats.org/officeDocument/2006/relationships" xmlns:p="http://schemas.openxmlformats.org/presentationml/2006/main">
   <p:cSld>
     <p:spTree>
@@ -3478,13 +3669,7 @@
       </p:grpSpPr>
       <p:sp>
         <p:nvSpPr>
-          <p:cNvPr id="2" name="Title 1">
-            <a:extLst>
-              <a:ext uri="{FF2B5EF4-FFF2-40B4-BE49-F238E27FC236}">
-                <a16:creationId xmlns:a16="http://schemas.microsoft.com/office/drawing/2014/main" id="{A8BDAEC8-8A68-1E4F-A8CA-703AFD78CF5F}"/>
-              </a:ext>
-            </a:extLst>
-          </p:cNvPr>
+          <p:cNvPr id="2" name="Title 1"/>
           <p:cNvSpPr>
             <a:spLocks noGrp="1"/>
           </p:cNvSpPr>
@@ -3498,15 +3683,16 @@
           <a:lstStyle/>
           <a:p>
             <a:r>
-              <a:rPr lang="en-CA" dirty="0"/>
-              <a:t>FSLE: CIOPSE + HRDPS</a:t>
-            </a:r>
+              <a:rPr lang="en-US" dirty="0" smtClean="0"/>
+              <a:t>FSLE: CIOPS + HRDPS</a:t>
+            </a:r>
+            <a:endParaRPr lang="en-CA" dirty="0"/>
           </a:p>
         </p:txBody>
       </p:sp>
       <p:pic>
         <p:nvPicPr>
-          <p:cNvPr id="5" name="Content Placeholder 4">
+          <p:cNvPr id="4" name="Content Placeholder 4">
             <a:extLst>
               <a:ext uri="{FF2B5EF4-FFF2-40B4-BE49-F238E27FC236}">
                 <a16:creationId xmlns:a16="http://schemas.microsoft.com/office/drawing/2014/main" id="{165CC40B-D9F9-5A4E-B959-D15186399D8B}"/>
@@ -3534,15 +3720,125 @@
         </p:blipFill>
         <p:spPr>
           <a:xfrm>
-            <a:off x="2512502" y="1600200"/>
+            <a:off x="457200" y="1772816"/>
             <a:ext cx="4118996" cy="4525963"/>
           </a:xfrm>
         </p:spPr>
       </p:pic>
+      <p:pic>
+        <p:nvPicPr>
+          <p:cNvPr id="5" name="Content Placeholder 4">
+            <a:extLst>
+              <a:ext uri="{FF2B5EF4-FFF2-40B4-BE49-F238E27FC236}">
+                <a16:creationId xmlns:a16="http://schemas.microsoft.com/office/drawing/2014/main" id="{9DB35F43-1587-BA43-AC33-AA170BA78D03}"/>
+              </a:ext>
+            </a:extLst>
+          </p:cNvPr>
+          <p:cNvPicPr>
+            <a:picLocks noChangeAspect="1"/>
+          </p:cNvPicPr>
+          <p:nvPr/>
+        </p:nvPicPr>
+        <p:blipFill>
+          <a:blip r:embed="rId3">
+            <a:extLst>
+              <a:ext uri="{28A0092B-C50C-407E-A947-70E740481C1C}">
+                <a14:useLocalDpi xmlns:a14="http://schemas.microsoft.com/office/drawing/2010/main" val="0"/>
+              </a:ext>
+            </a:extLst>
+          </a:blip>
+          <a:stretch>
+            <a:fillRect/>
+          </a:stretch>
+        </p:blipFill>
+        <p:spPr>
+          <a:xfrm>
+            <a:off x="4572000" y="1772815"/>
+            <a:ext cx="4118996" cy="4525963"/>
+          </a:xfrm>
+          <a:prstGeom prst="rect">
+            <a:avLst/>
+          </a:prstGeom>
+        </p:spPr>
+      </p:pic>
+      <p:sp>
+        <p:nvSpPr>
+          <p:cNvPr id="6" name="TextBox 5"/>
+          <p:cNvSpPr txBox="1"/>
+          <p:nvPr/>
+        </p:nvSpPr>
+        <p:spPr>
+          <a:xfrm>
+            <a:off x="1115616" y="1417638"/>
+            <a:ext cx="3384376" cy="369332"/>
+          </a:xfrm>
+          <a:prstGeom prst="rect">
+            <a:avLst/>
+          </a:prstGeom>
+          <a:noFill/>
+        </p:spPr>
+        <p:txBody>
+          <a:bodyPr wrap="square" rtlCol="0">
+            <a:spAutoFit/>
+          </a:bodyPr>
+          <a:lstStyle/>
+          <a:p>
+            <a:pPr algn="ctr"/>
+            <a:r>
+              <a:rPr lang="en-US" dirty="0" smtClean="0"/>
+              <a:t>0% </a:t>
+            </a:r>
+            <a:r>
+              <a:rPr lang="en-US" dirty="0" err="1" smtClean="0"/>
+              <a:t>windage</a:t>
+            </a:r>
+            <a:endParaRPr lang="en-CA" dirty="0"/>
+          </a:p>
+        </p:txBody>
+      </p:sp>
+      <p:sp>
+        <p:nvSpPr>
+          <p:cNvPr id="7" name="TextBox 6"/>
+          <p:cNvSpPr txBox="1"/>
+          <p:nvPr/>
+        </p:nvSpPr>
+        <p:spPr>
+          <a:xfrm>
+            <a:off x="5234612" y="1456298"/>
+            <a:ext cx="3384376" cy="369332"/>
+          </a:xfrm>
+          <a:prstGeom prst="rect">
+            <a:avLst/>
+          </a:prstGeom>
+          <a:noFill/>
+        </p:spPr>
+        <p:txBody>
+          <a:bodyPr wrap="square" rtlCol="0">
+            <a:spAutoFit/>
+          </a:bodyPr>
+          <a:lstStyle/>
+          <a:p>
+            <a:pPr algn="ctr"/>
+            <a:r>
+              <a:rPr lang="en-US" dirty="0"/>
+              <a:t>2</a:t>
+            </a:r>
+            <a:r>
+              <a:rPr lang="en-US" dirty="0" smtClean="0"/>
+              <a:t>% </a:t>
+            </a:r>
+            <a:r>
+              <a:rPr lang="en-US" dirty="0" err="1" smtClean="0"/>
+              <a:t>windage</a:t>
+            </a:r>
+            <a:endParaRPr lang="en-CA" dirty="0"/>
+          </a:p>
+        </p:txBody>
+      </p:sp>
     </p:spTree>
     <p:extLst>
       <p:ext uri="{BB962C8B-B14F-4D97-AF65-F5344CB8AC3E}">
-        <p14:creationId xmlns:p14="http://schemas.microsoft.com/office/powerpoint/2010/main" val="679001275"/>
+        <p14:creationId xmlns:p14="http://schemas.microsoft.com/office/powerpoint/2010/main" val="2289464262"/>
       </p:ext>
     </p:extLst>
   </p:cSld>
@@ -3552,7 +3848,7 @@
 </p:sld>
 </file>
 
-<file path=ppt/slides/slide18.xml><?xml version="1.0" encoding="utf-8"?>
+<file path=ppt/slides/slide17.xml><?xml version="1.0" encoding="utf-8"?>
 <p:sld xmlns:a="http://schemas.openxmlformats.org/drawingml/2006/main" xmlns:r="http://schemas.openxmlformats.org/officeDocument/2006/relationships" xmlns:p="http://schemas.openxmlformats.org/presentationml/2006/main">
   <p:cSld>
     <p:spTree>
@@ -3571,13 +3867,7 @@
       </p:grpSpPr>
       <p:sp>
         <p:nvSpPr>
-          <p:cNvPr id="2" name="Title 1">
-            <a:extLst>
-              <a:ext uri="{FF2B5EF4-FFF2-40B4-BE49-F238E27FC236}">
-                <a16:creationId xmlns:a16="http://schemas.microsoft.com/office/drawing/2014/main" id="{96D8972D-CF09-EF48-9459-41D7DE392652}"/>
-              </a:ext>
-            </a:extLst>
-          </p:cNvPr>
+          <p:cNvPr id="2" name="Title 1"/>
           <p:cNvSpPr>
             <a:spLocks noGrp="1"/>
           </p:cNvSpPr>
@@ -3591,15 +3881,20 @@
           <a:lstStyle/>
           <a:p>
             <a:r>
-              <a:rPr lang="en-CA" dirty="0"/>
-              <a:t>FSLE: GSL500 + HRDPS</a:t>
-            </a:r>
+              <a:rPr lang="en-US" dirty="0" err="1" smtClean="0"/>
+              <a:t>FSLe</a:t>
+            </a:r>
+            <a:r>
+              <a:rPr lang="en-US" dirty="0" smtClean="0"/>
+              <a:t>: GSL500 + HRDPS</a:t>
+            </a:r>
+            <a:endParaRPr lang="en-CA" dirty="0"/>
           </a:p>
         </p:txBody>
       </p:sp>
       <p:pic>
         <p:nvPicPr>
-          <p:cNvPr id="5" name="Content Placeholder 4">
+          <p:cNvPr id="4" name="Content Placeholder 4">
             <a:extLst>
               <a:ext uri="{FF2B5EF4-FFF2-40B4-BE49-F238E27FC236}">
                 <a16:creationId xmlns:a16="http://schemas.microsoft.com/office/drawing/2014/main" id="{970C5E7A-122A-B14F-8DDE-96A4D3305138}"/>
@@ -3627,15 +3922,51 @@
         </p:blipFill>
         <p:spPr>
           <a:xfrm>
-            <a:off x="2512502" y="1600200"/>
+            <a:off x="457200" y="1600198"/>
             <a:ext cx="4118996" cy="4525963"/>
           </a:xfrm>
+        </p:spPr>
+      </p:pic>
+      <p:pic>
+        <p:nvPicPr>
+          <p:cNvPr id="5" name="Content Placeholder 4">
+            <a:extLst>
+              <a:ext uri="{FF2B5EF4-FFF2-40B4-BE49-F238E27FC236}">
+                <a16:creationId xmlns:a16="http://schemas.microsoft.com/office/drawing/2014/main" id="{816E7166-FA43-2A45-B453-21AB70AE0CA2}"/>
+              </a:ext>
+            </a:extLst>
+          </p:cNvPr>
+          <p:cNvPicPr>
+            <a:picLocks noChangeAspect="1"/>
+          </p:cNvPicPr>
+          <p:nvPr/>
+        </p:nvPicPr>
+        <p:blipFill>
+          <a:blip r:embed="rId3">
+            <a:extLst>
+              <a:ext uri="{28A0092B-C50C-407E-A947-70E740481C1C}">
+                <a14:useLocalDpi xmlns:a14="http://schemas.microsoft.com/office/drawing/2010/main" val="0"/>
+              </a:ext>
+            </a:extLst>
+          </a:blip>
+          <a:stretch>
+            <a:fillRect/>
+          </a:stretch>
+        </p:blipFill>
+        <p:spPr>
+          <a:xfrm>
+            <a:off x="4567804" y="1593093"/>
+            <a:ext cx="4118996" cy="4525963"/>
+          </a:xfrm>
+          <a:prstGeom prst="rect">
+            <a:avLst/>
+          </a:prstGeom>
         </p:spPr>
       </p:pic>
     </p:spTree>
     <p:extLst>
       <p:ext uri="{BB962C8B-B14F-4D97-AF65-F5344CB8AC3E}">
-        <p14:creationId xmlns:p14="http://schemas.microsoft.com/office/powerpoint/2010/main" val="1782880595"/>
+        <p14:creationId xmlns:p14="http://schemas.microsoft.com/office/powerpoint/2010/main" val="3782700883"/>
       </p:ext>
     </p:extLst>
   </p:cSld>
@@ -3645,7 +3976,7 @@
 </p:sld>
 </file>
 
-<file path=ppt/slides/slide19.xml><?xml version="1.0" encoding="utf-8"?>
+<file path=ppt/slides/slide18.xml><?xml version="1.0" encoding="utf-8"?>
 <p:sld xmlns:a="http://schemas.openxmlformats.org/drawingml/2006/main" xmlns:r="http://schemas.openxmlformats.org/officeDocument/2006/relationships" xmlns:p="http://schemas.openxmlformats.org/presentationml/2006/main">
   <p:cSld>
     <p:spTree>
@@ -3720,7 +4051,7 @@
         </p:blipFill>
         <p:spPr>
           <a:xfrm>
-            <a:off x="2512502" y="1600200"/>
+            <a:off x="2195736" y="1417638"/>
             <a:ext cx="4118996" cy="4525963"/>
           </a:xfrm>
         </p:spPr>
@@ -3729,6 +4060,102 @@
     <p:extLst>
       <p:ext uri="{BB962C8B-B14F-4D97-AF65-F5344CB8AC3E}">
         <p14:creationId xmlns:p14="http://schemas.microsoft.com/office/powerpoint/2010/main" val="4167055406"/>
+      </p:ext>
+    </p:extLst>
+  </p:cSld>
+  <p:clrMapOvr>
+    <a:masterClrMapping/>
+  </p:clrMapOvr>
+</p:sld>
+</file>
+
+<file path=ppt/slides/slide19.xml><?xml version="1.0" encoding="utf-8"?>
+<p:sld xmlns:a="http://schemas.openxmlformats.org/drawingml/2006/main" xmlns:r="http://schemas.openxmlformats.org/officeDocument/2006/relationships" xmlns:p="http://schemas.openxmlformats.org/presentationml/2006/main">
+  <p:cSld>
+    <p:spTree>
+      <p:nvGrpSpPr>
+        <p:cNvPr id="1" name=""/>
+        <p:cNvGrpSpPr/>
+        <p:nvPr/>
+      </p:nvGrpSpPr>
+      <p:grpSpPr>
+        <a:xfrm>
+          <a:off x="0" y="0"/>
+          <a:ext cx="0" cy="0"/>
+          <a:chOff x="0" y="0"/>
+          <a:chExt cx="0" cy="0"/>
+        </a:xfrm>
+      </p:grpSpPr>
+      <p:sp>
+        <p:nvSpPr>
+          <p:cNvPr id="2" name="Title 1"/>
+          <p:cNvSpPr>
+            <a:spLocks noGrp="1"/>
+          </p:cNvSpPr>
+          <p:nvPr>
+            <p:ph type="title"/>
+          </p:nvPr>
+        </p:nvSpPr>
+        <p:spPr/>
+        <p:txBody>
+          <a:bodyPr/>
+          <a:lstStyle/>
+          <a:p>
+            <a:r>
+              <a:rPr lang="en-US" dirty="0" smtClean="0"/>
+              <a:t>Summary</a:t>
+            </a:r>
+            <a:endParaRPr lang="en-CA" dirty="0"/>
+          </a:p>
+        </p:txBody>
+      </p:sp>
+      <p:sp>
+        <p:nvSpPr>
+          <p:cNvPr id="3" name="Content Placeholder 2"/>
+          <p:cNvSpPr>
+            <a:spLocks noGrp="1"/>
+          </p:cNvSpPr>
+          <p:nvPr>
+            <p:ph idx="1"/>
+          </p:nvPr>
+        </p:nvSpPr>
+        <p:spPr/>
+        <p:txBody>
+          <a:bodyPr/>
+          <a:lstStyle/>
+          <a:p>
+            <a:r>
+              <a:rPr lang="en-US" dirty="0" smtClean="0"/>
+              <a:t>Estimate model uncertainty using different types of drifters</a:t>
+            </a:r>
+          </a:p>
+          <a:p>
+            <a:r>
+              <a:rPr lang="en-US" dirty="0" smtClean="0"/>
+              <a:t>Calculate a bias correction as a linear function of the wind</a:t>
+            </a:r>
+          </a:p>
+          <a:p>
+            <a:r>
+              <a:rPr lang="en-US" dirty="0" smtClean="0"/>
+              <a:t>FSLE represent scale dependent dispersion </a:t>
+            </a:r>
+          </a:p>
+          <a:p>
+            <a:r>
+              <a:rPr lang="en-US" dirty="0" smtClean="0"/>
+              <a:t>Higher resolution models improve dispersion at larger scales</a:t>
+            </a:r>
+          </a:p>
+          <a:p>
+            <a:endParaRPr lang="en-CA" dirty="0"/>
+          </a:p>
+        </p:txBody>
+      </p:sp>
+    </p:spTree>
+    <p:extLst>
+      <p:ext uri="{BB962C8B-B14F-4D97-AF65-F5344CB8AC3E}">
+        <p14:creationId xmlns:p14="http://schemas.microsoft.com/office/powerpoint/2010/main" val="546391265"/>
       </p:ext>
     </p:extLst>
   </p:cSld>
@@ -3771,9 +4198,10 @@
           <a:lstStyle/>
           <a:p>
             <a:r>
-              <a:rPr lang="en-US" dirty="0"/>
-              <a:t>outline</a:t>
-            </a:r>
+              <a:rPr lang="en-US" dirty="0" smtClean="0"/>
+              <a:t>Introduction</a:t>
+            </a:r>
+            <a:endParaRPr lang="en-US" dirty="0"/>
           </a:p>
         </p:txBody>
       </p:sp>
@@ -3789,36 +4217,42 @@
         </p:nvSpPr>
         <p:spPr/>
         <p:txBody>
-          <a:bodyPr/>
+          <a:bodyPr>
+            <a:normAutofit/>
+          </a:bodyPr>
           <a:lstStyle/>
           <a:p>
             <a:r>
-              <a:rPr lang="en-US" dirty="0"/>
-              <a:t>Focus on uncertainty (variance)</a:t>
-            </a:r>
-          </a:p>
-          <a:p>
-            <a:r>
-              <a:rPr lang="en-US" dirty="0"/>
-              <a:t>Windage tuning paper</a:t>
-            </a:r>
-          </a:p>
-          <a:p>
-            <a:r>
-              <a:rPr lang="en-US" dirty="0"/>
-              <a:t>FSLE-</a:t>
-            </a:r>
-            <a:r>
-              <a:rPr lang="en-US" dirty="0" err="1"/>
-              <a:t>TReX</a:t>
+              <a:rPr lang="en-US" dirty="0" smtClean="0"/>
+              <a:t>The uncertainty of surface currents is important to know for many marine operations</a:t>
+            </a:r>
+          </a:p>
+          <a:p>
+            <a:r>
+              <a:rPr lang="en-US" dirty="0" smtClean="0"/>
+              <a:t>Most abundant source of surface current data is in the form of </a:t>
+            </a:r>
+            <a:r>
+              <a:rPr lang="en-US" dirty="0" err="1" smtClean="0"/>
+              <a:t>Lagrangian</a:t>
+            </a:r>
+            <a:r>
+              <a:rPr lang="en-US" dirty="0" smtClean="0"/>
+              <a:t> drifters</a:t>
+            </a:r>
+          </a:p>
+          <a:p>
+            <a:r>
+              <a:rPr lang="en-US" dirty="0" smtClean="0"/>
+              <a:t>Present a couple methods of assessing ocean model uncertainty with drifter data</a:t>
+            </a:r>
+          </a:p>
+          <a:p>
+            <a:r>
+              <a:rPr lang="en-US" dirty="0" smtClean="0"/>
+              <a:t>Look at both bias and variance</a:t>
             </a:r>
             <a:endParaRPr lang="en-US" dirty="0"/>
-          </a:p>
-          <a:p>
-            <a:r>
-              <a:rPr lang="en-US" dirty="0"/>
-              <a:t>Nancy’s error maps</a:t>
-            </a:r>
           </a:p>
         </p:txBody>
       </p:sp>
@@ -3826,194 +4260,6 @@
     <p:extLst>
       <p:ext uri="{BB962C8B-B14F-4D97-AF65-F5344CB8AC3E}">
         <p14:creationId xmlns:p14="http://schemas.microsoft.com/office/powerpoint/2010/main" val="1955085122"/>
-      </p:ext>
-    </p:extLst>
-  </p:cSld>
-  <p:clrMapOvr>
-    <a:masterClrMapping/>
-  </p:clrMapOvr>
-</p:sld>
-</file>
-
-<file path=ppt/slides/slide20.xml><?xml version="1.0" encoding="utf-8"?>
-<p:sld xmlns:a="http://schemas.openxmlformats.org/drawingml/2006/main" xmlns:r="http://schemas.openxmlformats.org/officeDocument/2006/relationships" xmlns:p="http://schemas.openxmlformats.org/presentationml/2006/main">
-  <p:cSld>
-    <p:spTree>
-      <p:nvGrpSpPr>
-        <p:cNvPr id="1" name=""/>
-        <p:cNvGrpSpPr/>
-        <p:nvPr/>
-      </p:nvGrpSpPr>
-      <p:grpSpPr>
-        <a:xfrm>
-          <a:off x="0" y="0"/>
-          <a:ext cx="0" cy="0"/>
-          <a:chOff x="0" y="0"/>
-          <a:chExt cx="0" cy="0"/>
-        </a:xfrm>
-      </p:grpSpPr>
-      <p:sp>
-        <p:nvSpPr>
-          <p:cNvPr id="2" name="Title 1">
-            <a:extLst>
-              <a:ext uri="{FF2B5EF4-FFF2-40B4-BE49-F238E27FC236}">
-                <a16:creationId xmlns:a16="http://schemas.microsoft.com/office/drawing/2014/main" id="{8C834AFE-71E9-A34A-A279-787547BBFF23}"/>
-              </a:ext>
-            </a:extLst>
-          </p:cNvPr>
-          <p:cNvSpPr>
-            <a:spLocks noGrp="1"/>
-          </p:cNvSpPr>
-          <p:nvPr>
-            <p:ph type="title"/>
-          </p:nvPr>
-        </p:nvSpPr>
-        <p:spPr/>
-        <p:txBody>
-          <a:bodyPr>
-            <a:normAutofit/>
-          </a:bodyPr>
-          <a:lstStyle/>
-          <a:p>
-            <a:r>
-              <a:rPr lang="en-CA" dirty="0"/>
-              <a:t>FSLE: CIOPSE + HRDPS + 2% wind</a:t>
-            </a:r>
-          </a:p>
-        </p:txBody>
-      </p:sp>
-      <p:pic>
-        <p:nvPicPr>
-          <p:cNvPr id="5" name="Content Placeholder 4">
-            <a:extLst>
-              <a:ext uri="{FF2B5EF4-FFF2-40B4-BE49-F238E27FC236}">
-                <a16:creationId xmlns:a16="http://schemas.microsoft.com/office/drawing/2014/main" id="{9DB35F43-1587-BA43-AC33-AA170BA78D03}"/>
-              </a:ext>
-            </a:extLst>
-          </p:cNvPr>
-          <p:cNvPicPr>
-            <a:picLocks noGrp="1" noChangeAspect="1"/>
-          </p:cNvPicPr>
-          <p:nvPr>
-            <p:ph idx="1"/>
-          </p:nvPr>
-        </p:nvPicPr>
-        <p:blipFill>
-          <a:blip r:embed="rId2">
-            <a:extLst>
-              <a:ext uri="{28A0092B-C50C-407E-A947-70E740481C1C}">
-                <a14:useLocalDpi xmlns:a14="http://schemas.microsoft.com/office/drawing/2010/main" val="0"/>
-              </a:ext>
-            </a:extLst>
-          </a:blip>
-          <a:stretch>
-            <a:fillRect/>
-          </a:stretch>
-        </p:blipFill>
-        <p:spPr>
-          <a:xfrm>
-            <a:off x="2512502" y="1600200"/>
-            <a:ext cx="4118996" cy="4525963"/>
-          </a:xfrm>
-        </p:spPr>
-      </p:pic>
-    </p:spTree>
-    <p:extLst>
-      <p:ext uri="{BB962C8B-B14F-4D97-AF65-F5344CB8AC3E}">
-        <p14:creationId xmlns:p14="http://schemas.microsoft.com/office/powerpoint/2010/main" val="885411843"/>
-      </p:ext>
-    </p:extLst>
-  </p:cSld>
-  <p:clrMapOvr>
-    <a:masterClrMapping/>
-  </p:clrMapOvr>
-</p:sld>
-</file>
-
-<file path=ppt/slides/slide21.xml><?xml version="1.0" encoding="utf-8"?>
-<p:sld xmlns:a="http://schemas.openxmlformats.org/drawingml/2006/main" xmlns:r="http://schemas.openxmlformats.org/officeDocument/2006/relationships" xmlns:p="http://schemas.openxmlformats.org/presentationml/2006/main">
-  <p:cSld>
-    <p:spTree>
-      <p:nvGrpSpPr>
-        <p:cNvPr id="1" name=""/>
-        <p:cNvGrpSpPr/>
-        <p:nvPr/>
-      </p:nvGrpSpPr>
-      <p:grpSpPr>
-        <a:xfrm>
-          <a:off x="0" y="0"/>
-          <a:ext cx="0" cy="0"/>
-          <a:chOff x="0" y="0"/>
-          <a:chExt cx="0" cy="0"/>
-        </a:xfrm>
-      </p:grpSpPr>
-      <p:sp>
-        <p:nvSpPr>
-          <p:cNvPr id="2" name="Title 1">
-            <a:extLst>
-              <a:ext uri="{FF2B5EF4-FFF2-40B4-BE49-F238E27FC236}">
-                <a16:creationId xmlns:a16="http://schemas.microsoft.com/office/drawing/2014/main" id="{38C19242-F71A-6F4D-A57B-09C6E6C4905D}"/>
-              </a:ext>
-            </a:extLst>
-          </p:cNvPr>
-          <p:cNvSpPr>
-            <a:spLocks noGrp="1"/>
-          </p:cNvSpPr>
-          <p:nvPr>
-            <p:ph type="title"/>
-          </p:nvPr>
-        </p:nvSpPr>
-        <p:spPr/>
-        <p:txBody>
-          <a:bodyPr/>
-          <a:lstStyle/>
-          <a:p>
-            <a:r>
-              <a:rPr lang="en-CA" dirty="0"/>
-              <a:t>FSLE: GSL500 + HRDPS + 2% wind</a:t>
-            </a:r>
-          </a:p>
-        </p:txBody>
-      </p:sp>
-      <p:pic>
-        <p:nvPicPr>
-          <p:cNvPr id="5" name="Content Placeholder 4">
-            <a:extLst>
-              <a:ext uri="{FF2B5EF4-FFF2-40B4-BE49-F238E27FC236}">
-                <a16:creationId xmlns:a16="http://schemas.microsoft.com/office/drawing/2014/main" id="{816E7166-FA43-2A45-B453-21AB70AE0CA2}"/>
-              </a:ext>
-            </a:extLst>
-          </p:cNvPr>
-          <p:cNvPicPr>
-            <a:picLocks noGrp="1" noChangeAspect="1"/>
-          </p:cNvPicPr>
-          <p:nvPr>
-            <p:ph idx="1"/>
-          </p:nvPr>
-        </p:nvPicPr>
-        <p:blipFill>
-          <a:blip r:embed="rId2">
-            <a:extLst>
-              <a:ext uri="{28A0092B-C50C-407E-A947-70E740481C1C}">
-                <a14:useLocalDpi xmlns:a14="http://schemas.microsoft.com/office/drawing/2010/main" val="0"/>
-              </a:ext>
-            </a:extLst>
-          </a:blip>
-          <a:stretch>
-            <a:fillRect/>
-          </a:stretch>
-        </p:blipFill>
-        <p:spPr>
-          <a:xfrm>
-            <a:off x="2512502" y="1600200"/>
-            <a:ext cx="4118996" cy="4525963"/>
-          </a:xfrm>
-        </p:spPr>
-      </p:pic>
-    </p:spTree>
-    <p:extLst>
-      <p:ext uri="{BB962C8B-B14F-4D97-AF65-F5344CB8AC3E}">
-        <p14:creationId xmlns:p14="http://schemas.microsoft.com/office/powerpoint/2010/main" val="3914736472"/>
       </p:ext>
     </p:extLst>
   </p:cSld>
@@ -4872,8 +5118,8 @@
         </p:blipFill>
         <p:spPr>
           <a:xfrm>
-            <a:off x="2154589" y="1417638"/>
-            <a:ext cx="4834822" cy="3881757"/>
+            <a:off x="1907704" y="1361003"/>
+            <a:ext cx="5328592" cy="4278193"/>
           </a:xfrm>
         </p:spPr>
       </p:pic>
@@ -4891,7 +5137,7 @@
         </p:nvSpPr>
         <p:spPr>
           <a:xfrm>
-            <a:off x="457200" y="5299396"/>
+            <a:off x="457200" y="5589240"/>
             <a:ext cx="8229600" cy="646331"/>
           </a:xfrm>
           <a:prstGeom prst="rect">
@@ -5024,8 +5270,8 @@
         </p:blipFill>
         <p:spPr>
           <a:xfrm>
-            <a:off x="2149200" y="1417638"/>
-            <a:ext cx="4845600" cy="3880460"/>
+            <a:off x="1898082" y="1124744"/>
+            <a:ext cx="5347836" cy="4292640"/>
           </a:xfrm>
         </p:spPr>
       </p:pic>
@@ -5573,7 +5819,6 @@
               <a:rPr lang="en-CA" dirty="0" smtClean="0"/>
               <a:t>~200 drifters released in St. Lawrence Estuary</a:t>
             </a:r>
-            <a:endParaRPr lang="en-CA" dirty="0" smtClean="0"/>
           </a:p>
           <a:p>
             <a:pPr marL="285750" indent="-285750">
@@ -5627,7 +5872,6 @@
               <a:rPr lang="en-CA" dirty="0"/>
               <a:t>UBC</a:t>
             </a:r>
-            <a:endParaRPr lang="en-CA" dirty="0"/>
           </a:p>
           <a:p>
             <a:pPr marL="285750" indent="-285750">
@@ -5993,7 +6237,277 @@
 </a:theme>
 </file>
 
+<file path=ppt/theme/theme2.xml><?xml version="1.0" encoding="utf-8"?>
+<a:theme xmlns:a="http://schemas.openxmlformats.org/drawingml/2006/main" name="Office Theme">
+  <a:themeElements>
+    <a:clrScheme name="Office">
+      <a:dk1>
+        <a:sysClr val="windowText" lastClr="000000"/>
+      </a:dk1>
+      <a:lt1>
+        <a:sysClr val="window" lastClr="FFFFFF"/>
+      </a:lt1>
+      <a:dk2>
+        <a:srgbClr val="44546A"/>
+      </a:dk2>
+      <a:lt2>
+        <a:srgbClr val="E7E6E6"/>
+      </a:lt2>
+      <a:accent1>
+        <a:srgbClr val="5B9BD5"/>
+      </a:accent1>
+      <a:accent2>
+        <a:srgbClr val="ED7D31"/>
+      </a:accent2>
+      <a:accent3>
+        <a:srgbClr val="A5A5A5"/>
+      </a:accent3>
+      <a:accent4>
+        <a:srgbClr val="FFC000"/>
+      </a:accent4>
+      <a:accent5>
+        <a:srgbClr val="4472C4"/>
+      </a:accent5>
+      <a:accent6>
+        <a:srgbClr val="70AD47"/>
+      </a:accent6>
+      <a:hlink>
+        <a:srgbClr val="0563C1"/>
+      </a:hlink>
+      <a:folHlink>
+        <a:srgbClr val="954F72"/>
+      </a:folHlink>
+    </a:clrScheme>
+    <a:fontScheme name="Office">
+      <a:majorFont>
+        <a:latin typeface="Calibri Light" panose="020F0302020204030204"/>
+        <a:ea typeface=""/>
+        <a:cs typeface=""/>
+        <a:font script="Jpan" typeface="游ゴシック Light"/>
+        <a:font script="Hang" typeface="맑은 고딕"/>
+        <a:font script="Hans" typeface="等线 Light"/>
+        <a:font script="Hant" typeface="新細明體"/>
+        <a:font script="Arab" typeface="Times New Roman"/>
+        <a:font script="Hebr" typeface="Times New Roman"/>
+        <a:font script="Thai" typeface="Angsana New"/>
+        <a:font script="Ethi" typeface="Nyala"/>
+        <a:font script="Beng" typeface="Vrinda"/>
+        <a:font script="Gujr" typeface="Shruti"/>
+        <a:font script="Khmr" typeface="MoolBoran"/>
+        <a:font script="Knda" typeface="Tunga"/>
+        <a:font script="Guru" typeface="Raavi"/>
+        <a:font script="Cans" typeface="Euphemia"/>
+        <a:font script="Cher" typeface="Plantagenet Cherokee"/>
+        <a:font script="Yiii" typeface="Microsoft Yi Baiti"/>
+        <a:font script="Tibt" typeface="Microsoft Himalaya"/>
+        <a:font script="Thaa" typeface="MV Boli"/>
+        <a:font script="Deva" typeface="Mangal"/>
+        <a:font script="Telu" typeface="Gautami"/>
+        <a:font script="Taml" typeface="Latha"/>
+        <a:font script="Syrc" typeface="Estrangelo Edessa"/>
+        <a:font script="Orya" typeface="Kalinga"/>
+        <a:font script="Mlym" typeface="Kartika"/>
+        <a:font script="Laoo" typeface="DokChampa"/>
+        <a:font script="Sinh" typeface="Iskoola Pota"/>
+        <a:font script="Mong" typeface="Mongolian Baiti"/>
+        <a:font script="Viet" typeface="Times New Roman"/>
+        <a:font script="Uigh" typeface="Microsoft Uighur"/>
+        <a:font script="Geor" typeface="Sylfaen"/>
+      </a:majorFont>
+      <a:minorFont>
+        <a:latin typeface="Calibri" panose="020F0502020204030204"/>
+        <a:ea typeface=""/>
+        <a:cs typeface=""/>
+        <a:font script="Jpan" typeface="游ゴシック"/>
+        <a:font script="Hang" typeface="맑은 고딕"/>
+        <a:font script="Hans" typeface="等线"/>
+        <a:font script="Hant" typeface="新細明體"/>
+        <a:font script="Arab" typeface="Arial"/>
+        <a:font script="Hebr" typeface="Arial"/>
+        <a:font script="Thai" typeface="Cordia New"/>
+        <a:font script="Ethi" typeface="Nyala"/>
+        <a:font script="Beng" typeface="Vrinda"/>
+        <a:font script="Gujr" typeface="Shruti"/>
+        <a:font script="Khmr" typeface="DaunPenh"/>
+        <a:font script="Knda" typeface="Tunga"/>
+        <a:font script="Guru" typeface="Raavi"/>
+        <a:font script="Cans" typeface="Euphemia"/>
+        <a:font script="Cher" typeface="Plantagenet Cherokee"/>
+        <a:font script="Yiii" typeface="Microsoft Yi Baiti"/>
+        <a:font script="Tibt" typeface="Microsoft Himalaya"/>
+        <a:font script="Thaa" typeface="MV Boli"/>
+        <a:font script="Deva" typeface="Mangal"/>
+        <a:font script="Telu" typeface="Gautami"/>
+        <a:font script="Taml" typeface="Latha"/>
+        <a:font script="Syrc" typeface="Estrangelo Edessa"/>
+        <a:font script="Orya" typeface="Kalinga"/>
+        <a:font script="Mlym" typeface="Kartika"/>
+        <a:font script="Laoo" typeface="DokChampa"/>
+        <a:font script="Sinh" typeface="Iskoola Pota"/>
+        <a:font script="Mong" typeface="Mongolian Baiti"/>
+        <a:font script="Viet" typeface="Arial"/>
+        <a:font script="Uigh" typeface="Microsoft Uighur"/>
+        <a:font script="Geor" typeface="Sylfaen"/>
+      </a:minorFont>
+    </a:fontScheme>
+    <a:fmtScheme name="Office">
+      <a:fillStyleLst>
+        <a:solidFill>
+          <a:schemeClr val="phClr"/>
+        </a:solidFill>
+        <a:gradFill rotWithShape="1">
+          <a:gsLst>
+            <a:gs pos="0">
+              <a:schemeClr val="phClr">
+                <a:lumMod val="110000"/>
+                <a:satMod val="105000"/>
+                <a:tint val="67000"/>
+              </a:schemeClr>
+            </a:gs>
+            <a:gs pos="50000">
+              <a:schemeClr val="phClr">
+                <a:lumMod val="105000"/>
+                <a:satMod val="103000"/>
+                <a:tint val="73000"/>
+              </a:schemeClr>
+            </a:gs>
+            <a:gs pos="100000">
+              <a:schemeClr val="phClr">
+                <a:lumMod val="105000"/>
+                <a:satMod val="109000"/>
+                <a:tint val="81000"/>
+              </a:schemeClr>
+            </a:gs>
+          </a:gsLst>
+          <a:lin ang="5400000" scaled="0"/>
+        </a:gradFill>
+        <a:gradFill rotWithShape="1">
+          <a:gsLst>
+            <a:gs pos="0">
+              <a:schemeClr val="phClr">
+                <a:satMod val="103000"/>
+                <a:lumMod val="102000"/>
+                <a:tint val="94000"/>
+              </a:schemeClr>
+            </a:gs>
+            <a:gs pos="50000">
+              <a:schemeClr val="phClr">
+                <a:satMod val="110000"/>
+                <a:lumMod val="100000"/>
+                <a:shade val="100000"/>
+              </a:schemeClr>
+            </a:gs>
+            <a:gs pos="100000">
+              <a:schemeClr val="phClr">
+                <a:lumMod val="99000"/>
+                <a:satMod val="120000"/>
+                <a:shade val="78000"/>
+              </a:schemeClr>
+            </a:gs>
+          </a:gsLst>
+          <a:lin ang="5400000" scaled="0"/>
+        </a:gradFill>
+      </a:fillStyleLst>
+      <a:lnStyleLst>
+        <a:ln w="6350" cap="flat" cmpd="sng" algn="ctr">
+          <a:solidFill>
+            <a:schemeClr val="phClr"/>
+          </a:solidFill>
+          <a:prstDash val="solid"/>
+          <a:miter lim="800000"/>
+        </a:ln>
+        <a:ln w="12700" cap="flat" cmpd="sng" algn="ctr">
+          <a:solidFill>
+            <a:schemeClr val="phClr"/>
+          </a:solidFill>
+          <a:prstDash val="solid"/>
+          <a:miter lim="800000"/>
+        </a:ln>
+        <a:ln w="19050" cap="flat" cmpd="sng" algn="ctr">
+          <a:solidFill>
+            <a:schemeClr val="phClr"/>
+          </a:solidFill>
+          <a:prstDash val="solid"/>
+          <a:miter lim="800000"/>
+        </a:ln>
+      </a:lnStyleLst>
+      <a:effectStyleLst>
+        <a:effectStyle>
+          <a:effectLst/>
+        </a:effectStyle>
+        <a:effectStyle>
+          <a:effectLst/>
+        </a:effectStyle>
+        <a:effectStyle>
+          <a:effectLst>
+            <a:outerShdw blurRad="57150" dist="19050" dir="5400000" algn="ctr" rotWithShape="0">
+              <a:srgbClr val="000000">
+                <a:alpha val="63000"/>
+              </a:srgbClr>
+            </a:outerShdw>
+          </a:effectLst>
+        </a:effectStyle>
+      </a:effectStyleLst>
+      <a:bgFillStyleLst>
+        <a:solidFill>
+          <a:schemeClr val="phClr"/>
+        </a:solidFill>
+        <a:solidFill>
+          <a:schemeClr val="phClr">
+            <a:tint val="95000"/>
+            <a:satMod val="170000"/>
+          </a:schemeClr>
+        </a:solidFill>
+        <a:gradFill rotWithShape="1">
+          <a:gsLst>
+            <a:gs pos="0">
+              <a:schemeClr val="phClr">
+                <a:tint val="93000"/>
+                <a:satMod val="150000"/>
+                <a:shade val="98000"/>
+                <a:lumMod val="102000"/>
+              </a:schemeClr>
+            </a:gs>
+            <a:gs pos="50000">
+              <a:schemeClr val="phClr">
+                <a:tint val="98000"/>
+                <a:satMod val="130000"/>
+                <a:shade val="90000"/>
+                <a:lumMod val="103000"/>
+              </a:schemeClr>
+            </a:gs>
+            <a:gs pos="100000">
+              <a:schemeClr val="phClr">
+                <a:shade val="63000"/>
+                <a:satMod val="120000"/>
+              </a:schemeClr>
+            </a:gs>
+          </a:gsLst>
+          <a:lin ang="5400000" scaled="0"/>
+        </a:gradFill>
+      </a:bgFillStyleLst>
+    </a:fmtScheme>
+  </a:themeElements>
+  <a:objectDefaults/>
+  <a:extraClrSchemeLst/>
+  <a:extLst>
+    <a:ext uri="{05A4C25C-085E-4340-85A3-A5531E510DB2}">
+      <thm15:themeFamily xmlns:thm15="http://schemas.microsoft.com/office/thememl/2012/main" name="Office Theme" id="{62F939B6-93AF-4DB8-9C6B-D6C7DFDC589F}" vid="{4A3C46E8-61CC-4603-A589-7422A47A8E4A}"/>
+    </a:ext>
+  </a:extLst>
+</a:theme>
+</file>
+
 <file path=customXml/item1.xml><?xml version="1.0" encoding="utf-8"?>
+<?mso-contentType ?>
+<FormTemplates xmlns="http://schemas.microsoft.com/sharepoint/v3/contenttype/forms">
+  <Display>DocumentLibraryForm</Display>
+  <Edit>DocumentLibraryForm</Edit>
+  <New>DocumentLibraryForm</New>
+</FormTemplates>
+</file>
+
+<file path=customXml/item2.xml><?xml version="1.0" encoding="utf-8"?>
 <ct:contentTypeSchema xmlns:ct="http://schemas.microsoft.com/office/2006/metadata/contentType" xmlns:ma="http://schemas.microsoft.com/office/2006/metadata/properties/metaAttributes" ct:_="" ma:_="" ma:contentTypeName="Document" ma:contentTypeID="0x01010075D0B20BB41BF245A74357C5242D202F" ma:contentTypeVersion="10" ma:contentTypeDescription="Create a new document." ma:contentTypeScope="" ma:versionID="1d63c453300229499d35ee3cdb122db5">
   <xsd:schema xmlns:xsd="http://www.w3.org/2001/XMLSchema" xmlns:xs="http://www.w3.org/2001/XMLSchema" xmlns:p="http://schemas.microsoft.com/office/2006/metadata/properties" xmlns:ns3="acbb3e5d-5d9a-41a2-b23c-a652c639d82c" xmlns:ns4="b6e7370b-7179-4676-9a6f-0d2482e7e8cc" targetNamespace="http://schemas.microsoft.com/office/2006/metadata/properties" ma:root="true" ma:fieldsID="d0431d3bfc2050b05195e48dfbe7c542" ns3:_="" ns4:_="">
     <xsd:import namespace="acbb3e5d-5d9a-41a2-b23c-a652c639d82c"/>
@@ -6210,15 +6724,6 @@
 </ct:contentTypeSchema>
 </file>
 
-<file path=customXml/item2.xml><?xml version="1.0" encoding="utf-8"?>
-<?mso-contentType ?>
-<FormTemplates xmlns="http://schemas.microsoft.com/sharepoint/v3/contenttype/forms">
-  <Display>DocumentLibraryForm</Display>
-  <Edit>DocumentLibraryForm</Edit>
-  <New>DocumentLibraryForm</New>
-</FormTemplates>
-</file>
-
 <file path=customXml/item3.xml><?xml version="1.0" encoding="utf-8"?>
 <p:properties xmlns:p="http://schemas.microsoft.com/office/2006/metadata/properties" xmlns:xsi="http://www.w3.org/2001/XMLSchema-instance" xmlns:pc="http://schemas.microsoft.com/office/infopath/2007/PartnerControls">
   <documentManagement>
@@ -6240,6 +6745,14 @@
 </file>
 
 <file path=customXml/itemProps1.xml><?xml version="1.0" encoding="utf-8"?>
+<ds:datastoreItem xmlns:ds="http://schemas.openxmlformats.org/officeDocument/2006/customXml" ds:itemID="{3FEA80A5-E996-4AFB-AE99-8EED984C9B80}">
+  <ds:schemaRefs>
+    <ds:schemaRef ds:uri="http://schemas.microsoft.com/sharepoint/v3/contenttype/forms"/>
+  </ds:schemaRefs>
+</ds:datastoreItem>
+</file>
+
+<file path=customXml/itemProps2.xml><?xml version="1.0" encoding="utf-8"?>
 <ds:datastoreItem xmlns:ds="http://schemas.openxmlformats.org/officeDocument/2006/customXml" ds:itemID="{2C5073C6-8F39-4D0C-98A3-3188256BBC8F}">
   <ds:schemaRefs>
     <ds:schemaRef ds:uri="http://schemas.microsoft.com/office/2006/metadata/contentType"/>
@@ -6254,14 +6767,6 @@
     <ds:schemaRef ds:uri="http://purl.org/dc/elements/1.1/"/>
     <ds:schemaRef ds:uri="http://purl.org/dc/terms/"/>
     <ds:schemaRef ds:uri="http://schemas.microsoft.com/internal/obd"/>
-  </ds:schemaRefs>
-</ds:datastoreItem>
-</file>
-
-<file path=customXml/itemProps2.xml><?xml version="1.0" encoding="utf-8"?>
-<ds:datastoreItem xmlns:ds="http://schemas.openxmlformats.org/officeDocument/2006/customXml" ds:itemID="{3FEA80A5-E996-4AFB-AE99-8EED984C9B80}">
-  <ds:schemaRefs>
-    <ds:schemaRef ds:uri="http://schemas.microsoft.com/sharepoint/v3/contenttype/forms"/>
   </ds:schemaRefs>
 </ds:datastoreItem>
 </file>

</xml_diff>

<commit_message>
Added some text to map slides
</commit_message>
<xml_diff>
--- a/presentations/MOI-CONCEPTS-2021/Soontiens_Sutherland_drift_DFO-MOI.pptx
+++ b/presentations/MOI-CONCEPTS-2021/Soontiens_Sutherland_drift_DFO-MOI.pptx
@@ -126,6 +126,37 @@
     </a:lvl9pPr>
   </p:defaultTextStyle>
   <p:extLst>
+    <p:ext uri="{521415D9-36F7-43E2-AB2F-B90AF26B5E84}">
+      <p14:sectionLst xmlns:p14="http://schemas.microsoft.com/office/powerpoint/2010/main">
+        <p14:section name="Default Section" id="{66221BE4-2D67-4165-B1B0-A4FB7885388C}">
+          <p14:sldIdLst>
+            <p14:sldId id="256"/>
+            <p14:sldId id="257"/>
+            <p14:sldId id="258"/>
+            <p14:sldId id="259"/>
+            <p14:sldId id="260"/>
+            <p14:sldId id="261"/>
+            <p14:sldId id="262"/>
+            <p14:sldId id="263"/>
+            <p14:sldId id="271"/>
+            <p14:sldId id="272"/>
+          </p14:sldIdLst>
+        </p14:section>
+        <p14:section name="Untitled Section" id="{E41768C8-F262-44D5-B2AC-60A03BB3F2C7}">
+          <p14:sldIdLst>
+            <p14:sldId id="273"/>
+            <p14:sldId id="274"/>
+            <p14:sldId id="275"/>
+            <p14:sldId id="264"/>
+            <p14:sldId id="265"/>
+            <p14:sldId id="278"/>
+            <p14:sldId id="277"/>
+            <p14:sldId id="268"/>
+            <p14:sldId id="279"/>
+          </p14:sldIdLst>
+        </p14:section>
+      </p14:sectionLst>
+    </p:ext>
     <p:ext uri="{EFAFB233-063F-42B5-8137-9DF3F51BA10A}">
       <p15:sldGuideLst xmlns:p15="http://schemas.microsoft.com/office/powerpoint/2012/main">
         <p15:guide id="1" orient="horz" pos="2160" userDrawn="1">
@@ -2111,11 +2142,69 @@
         </p:blipFill>
         <p:spPr>
           <a:xfrm>
-            <a:off x="457200" y="1814688"/>
+            <a:off x="457200" y="1348238"/>
             <a:ext cx="8229600" cy="4096986"/>
           </a:xfrm>
         </p:spPr>
       </p:pic>
+      <p:sp>
+        <p:nvSpPr>
+          <p:cNvPr id="5" name="TextBox 4">
+            <a:extLst>
+              <a:ext uri="{FF2B5EF4-FFF2-40B4-BE49-F238E27FC236}">
+                <a16:creationId xmlns:a16="http://schemas.microsoft.com/office/drawing/2014/main" id="{530C8AAD-DEBD-1D4F-9DC0-F0C3B63E2EEE}"/>
+              </a:ext>
+            </a:extLst>
+          </p:cNvPr>
+          <p:cNvSpPr txBox="1"/>
+          <p:nvPr/>
+        </p:nvSpPr>
+        <p:spPr>
+          <a:xfrm>
+            <a:off x="302831" y="5589240"/>
+            <a:ext cx="8419109" cy="646331"/>
+          </a:xfrm>
+          <a:prstGeom prst="rect">
+            <a:avLst/>
+          </a:prstGeom>
+          <a:noFill/>
+        </p:spPr>
+        <p:txBody>
+          <a:bodyPr wrap="square" rtlCol="0">
+            <a:spAutoFit/>
+          </a:bodyPr>
+          <a:lstStyle/>
+          <a:p>
+            <a:pPr marL="285750" indent="-285750">
+              <a:buFont typeface="Arial" panose="020B0604020202020204" pitchFamily="34" charset="0"/>
+              <a:buChar char="•"/>
+            </a:pPr>
+            <a:r>
+              <a:rPr lang="en-CA" dirty="0" smtClean="0"/>
+              <a:t>Some eddies unaccounted for in model</a:t>
+            </a:r>
+          </a:p>
+          <a:p>
+            <a:pPr marL="285750" indent="-285750">
+              <a:buFont typeface="Arial" panose="020B0604020202020204" pitchFamily="34" charset="0"/>
+              <a:buChar char="•"/>
+            </a:pPr>
+            <a:r>
+              <a:rPr lang="en-CA" dirty="0" smtClean="0"/>
+              <a:t>Speeds in </a:t>
+            </a:r>
+            <a:r>
+              <a:rPr lang="en-CA" dirty="0" err="1" smtClean="0"/>
+              <a:t>Gaspé</a:t>
+            </a:r>
+            <a:r>
+              <a:rPr lang="en-CA" dirty="0" smtClean="0"/>
+              <a:t> current too low</a:t>
+            </a:r>
+            <a:endParaRPr lang="en-CA" dirty="0"/>
+          </a:p>
+        </p:txBody>
+      </p:sp>
     </p:spTree>
     <p:extLst>
       <p:ext uri="{BB962C8B-B14F-4D97-AF65-F5344CB8AC3E}">
@@ -2193,11 +2282,59 @@
         </p:blipFill>
         <p:spPr>
           <a:xfrm>
-            <a:off x="457200" y="1814688"/>
+            <a:off x="457200" y="1344168"/>
             <a:ext cx="8229600" cy="4096986"/>
           </a:xfrm>
         </p:spPr>
       </p:pic>
+      <p:sp>
+        <p:nvSpPr>
+          <p:cNvPr id="5" name="TextBox 4">
+            <a:extLst>
+              <a:ext uri="{FF2B5EF4-FFF2-40B4-BE49-F238E27FC236}">
+                <a16:creationId xmlns:a16="http://schemas.microsoft.com/office/drawing/2014/main" id="{530C8AAD-DEBD-1D4F-9DC0-F0C3B63E2EEE}"/>
+              </a:ext>
+            </a:extLst>
+          </p:cNvPr>
+          <p:cNvSpPr txBox="1"/>
+          <p:nvPr/>
+        </p:nvSpPr>
+        <p:spPr>
+          <a:xfrm>
+            <a:off x="302831" y="5589240"/>
+            <a:ext cx="8419109" cy="369332"/>
+          </a:xfrm>
+          <a:prstGeom prst="rect">
+            <a:avLst/>
+          </a:prstGeom>
+          <a:noFill/>
+        </p:spPr>
+        <p:txBody>
+          <a:bodyPr wrap="square" rtlCol="0">
+            <a:spAutoFit/>
+          </a:bodyPr>
+          <a:lstStyle/>
+          <a:p>
+            <a:pPr marL="285750" indent="-285750">
+              <a:buFont typeface="Arial" panose="020B0604020202020204" pitchFamily="34" charset="0"/>
+              <a:buChar char="•"/>
+            </a:pPr>
+            <a:r>
+              <a:rPr lang="en-CA" dirty="0" smtClean="0"/>
+              <a:t>Improvement to speeds in </a:t>
+            </a:r>
+            <a:r>
+              <a:rPr lang="en-CA" dirty="0" err="1" smtClean="0"/>
+              <a:t>Gaspé</a:t>
+            </a:r>
+            <a:r>
+              <a:rPr lang="en-CA" dirty="0" smtClean="0"/>
+              <a:t> current</a:t>
+            </a:r>
+            <a:endParaRPr lang="en-CA" dirty="0"/>
+          </a:p>
+        </p:txBody>
+      </p:sp>
     </p:spTree>
     <p:extLst>
       <p:ext uri="{BB962C8B-B14F-4D97-AF65-F5344CB8AC3E}">
@@ -2245,7 +2382,11 @@
           <a:p>
             <a:r>
               <a:rPr lang="en-US" dirty="0" smtClean="0"/>
-              <a:t>SPEED Error</a:t>
+              <a:t>SPEED </a:t>
+            </a:r>
+            <a:r>
+              <a:rPr lang="en-US" dirty="0" smtClean="0"/>
+              <a:t>Error Histograms</a:t>
             </a:r>
             <a:endParaRPr lang="en-US" dirty="0"/>
           </a:p>
@@ -2275,7 +2416,7 @@
         </p:blipFill>
         <p:spPr>
           <a:xfrm>
-            <a:off x="80384" y="2060848"/>
+            <a:off x="80384" y="1499810"/>
             <a:ext cx="4491615" cy="3626919"/>
           </a:xfrm>
         </p:spPr>
@@ -2302,7 +2443,7 @@
         </p:blipFill>
         <p:spPr>
           <a:xfrm>
-            <a:off x="4572000" y="2060849"/>
+            <a:off x="4572000" y="1499811"/>
             <a:ext cx="4458774" cy="3600400"/>
           </a:xfrm>
           <a:prstGeom prst="rect">
@@ -2310,8 +2451,8 @@
           </a:prstGeom>
         </p:spPr>
       </p:pic>
-      <mc:AlternateContent xmlns:mc="http://schemas.openxmlformats.org/markup-compatibility/2006" xmlns:a14="http://schemas.microsoft.com/office/drawing/2010/main">
-        <mc:Choice Requires="a14">
+      <mc:AlternateContent xmlns:mc="http://schemas.openxmlformats.org/markup-compatibility/2006">
+        <mc:Choice xmlns:a14="http://schemas.microsoft.com/office/drawing/2010/main" Requires="a14">
           <p:sp>
             <p:nvSpPr>
               <p:cNvPr id="6" name="TextBox 5">
@@ -2326,7 +2467,7 @@
             </p:nvSpPr>
             <p:spPr>
               <a:xfrm>
-                <a:off x="429033" y="5661249"/>
+                <a:off x="429033" y="5100211"/>
                 <a:ext cx="3603261" cy="369332"/>
               </a:xfrm>
               <a:prstGeom prst="rect">
@@ -2387,7 +2528,7 @@
             </p:txBody>
           </p:sp>
         </mc:Choice>
-        <mc:Fallback xmlns="">
+        <mc:Fallback>
           <p:sp>
             <p:nvSpPr>
               <p:cNvPr id="6" name="TextBox 5">
@@ -2404,7 +2545,7 @@
             </p:nvSpPr>
             <p:spPr>
               <a:xfrm>
-                <a:off x="429033" y="5661249"/>
+                <a:off x="429033" y="5100211"/>
                 <a:ext cx="3603261" cy="369332"/>
               </a:xfrm>
               <a:prstGeom prst="rect">
@@ -2432,8 +2573,8 @@
           </p:sp>
         </mc:Fallback>
       </mc:AlternateContent>
-      <mc:AlternateContent xmlns:mc="http://schemas.openxmlformats.org/markup-compatibility/2006" xmlns:a14="http://schemas.microsoft.com/office/drawing/2010/main">
-        <mc:Choice Requires="a14">
+      <mc:AlternateContent xmlns:mc="http://schemas.openxmlformats.org/markup-compatibility/2006">
+        <mc:Choice xmlns:a14="http://schemas.microsoft.com/office/drawing/2010/main" Requires="a14">
           <p:sp>
             <p:nvSpPr>
               <p:cNvPr id="8" name="TextBox 7"/>
@@ -2442,7 +2583,7 @@
             </p:nvSpPr>
             <p:spPr>
               <a:xfrm>
-                <a:off x="3585194" y="5853598"/>
+                <a:off x="3585194" y="5292560"/>
                 <a:ext cx="2190343" cy="584712"/>
               </a:xfrm>
               <a:prstGeom prst="rect">
@@ -2633,7 +2774,7 @@
             </p:txBody>
           </p:sp>
         </mc:Choice>
-        <mc:Fallback xmlns="">
+        <mc:Fallback>
           <p:sp>
             <p:nvSpPr>
               <p:cNvPr id="8" name="TextBox 7"/>
@@ -2644,7 +2785,7 @@
             </p:nvSpPr>
             <p:spPr>
               <a:xfrm>
-                <a:off x="3585194" y="5853598"/>
+                <a:off x="3585194" y="5292560"/>
                 <a:ext cx="2190343" cy="584712"/>
               </a:xfrm>
               <a:prstGeom prst="rect">
@@ -2672,8 +2813,8 @@
           </p:sp>
         </mc:Fallback>
       </mc:AlternateContent>
-      <mc:AlternateContent xmlns:mc="http://schemas.openxmlformats.org/markup-compatibility/2006" xmlns:a14="http://schemas.microsoft.com/office/drawing/2010/main">
-        <mc:Choice Requires="a14">
+      <mc:AlternateContent xmlns:mc="http://schemas.openxmlformats.org/markup-compatibility/2006">
+        <mc:Choice xmlns:a14="http://schemas.microsoft.com/office/drawing/2010/main" Requires="a14">
           <p:sp>
             <p:nvSpPr>
               <p:cNvPr id="9" name="TextBox 8">
@@ -2688,7 +2829,7 @@
             </p:nvSpPr>
             <p:spPr>
               <a:xfrm>
-                <a:off x="5220072" y="5643838"/>
+                <a:off x="5220072" y="5082800"/>
                 <a:ext cx="3603261" cy="369332"/>
               </a:xfrm>
               <a:prstGeom prst="rect">
@@ -2749,7 +2890,7 @@
             </p:txBody>
           </p:sp>
         </mc:Choice>
-        <mc:Fallback xmlns="">
+        <mc:Fallback>
           <p:sp>
             <p:nvSpPr>
               <p:cNvPr id="9" name="TextBox 8">
@@ -2766,7 +2907,7 @@
             </p:nvSpPr>
             <p:spPr>
               <a:xfrm>
-                <a:off x="5220072" y="5643838"/>
+                <a:off x="5220072" y="5082800"/>
                 <a:ext cx="3603261" cy="369332"/>
               </a:xfrm>
               <a:prstGeom prst="rect">
@@ -2802,7 +2943,7 @@
         </p:nvSpPr>
         <p:spPr>
           <a:xfrm>
-            <a:off x="1975488" y="1616208"/>
+            <a:off x="1975488" y="1055170"/>
             <a:ext cx="2592288" cy="369332"/>
           </a:xfrm>
           <a:prstGeom prst="rect">
@@ -2832,7 +2973,7 @@
         </p:nvSpPr>
         <p:spPr>
           <a:xfrm>
-            <a:off x="6429707" y="1576403"/>
+            <a:off x="6429707" y="1015365"/>
             <a:ext cx="2592288" cy="369332"/>
           </a:xfrm>
           <a:prstGeom prst="rect">
@@ -2851,6 +2992,46 @@
               <a:t>GSL500</a:t>
             </a:r>
             <a:endParaRPr lang="en-US" b="1" dirty="0"/>
+          </a:p>
+        </p:txBody>
+      </p:sp>
+      <p:sp>
+        <p:nvSpPr>
+          <p:cNvPr id="12" name="TextBox 11">
+            <a:extLst>
+              <a:ext uri="{FF2B5EF4-FFF2-40B4-BE49-F238E27FC236}">
+                <a16:creationId xmlns:a16="http://schemas.microsoft.com/office/drawing/2014/main" id="{530C8AAD-DEBD-1D4F-9DC0-F0C3B63E2EEE}"/>
+              </a:ext>
+            </a:extLst>
+          </p:cNvPr>
+          <p:cNvSpPr txBox="1"/>
+          <p:nvPr/>
+        </p:nvSpPr>
+        <p:spPr>
+          <a:xfrm>
+            <a:off x="240059" y="6027575"/>
+            <a:ext cx="8419109" cy="369332"/>
+          </a:xfrm>
+          <a:prstGeom prst="rect">
+            <a:avLst/>
+          </a:prstGeom>
+          <a:noFill/>
+        </p:spPr>
+        <p:txBody>
+          <a:bodyPr wrap="square" rtlCol="0">
+            <a:spAutoFit/>
+          </a:bodyPr>
+          <a:lstStyle/>
+          <a:p>
+            <a:pPr marL="285750" indent="-285750">
+              <a:buFont typeface="Arial" panose="020B0604020202020204" pitchFamily="34" charset="0"/>
+              <a:buChar char="•"/>
+            </a:pPr>
+            <a:r>
+              <a:rPr lang="en-CA" dirty="0" smtClean="0"/>
+              <a:t>Bias corrected speed contains high degree of variance</a:t>
+            </a:r>
+            <a:endParaRPr lang="en-CA" dirty="0"/>
           </a:p>
         </p:txBody>
       </p:sp>
@@ -2914,8 +3095,8 @@
           </a:p>
         </p:txBody>
       </p:sp>
-      <mc:AlternateContent xmlns:mc="http://schemas.openxmlformats.org/markup-compatibility/2006">
-        <mc:Choice xmlns:a14="http://schemas.microsoft.com/office/drawing/2010/main" Requires="a14">
+      <mc:AlternateContent xmlns:mc="http://schemas.openxmlformats.org/markup-compatibility/2006" xmlns:a14="http://schemas.microsoft.com/office/drawing/2010/main">
+        <mc:Choice Requires="a14">
           <p:sp>
             <p:nvSpPr>
               <p:cNvPr id="3" name="Content Placeholder 2">
@@ -3340,7 +3521,7 @@
             </p:txBody>
           </p:sp>
         </mc:Choice>
-        <mc:Fallback>
+        <mc:Fallback xmlns="">
           <p:sp>
             <p:nvSpPr>
               <p:cNvPr id="3" name="Content Placeholder 2">
@@ -6499,12 +6680,23 @@
 </file>
 
 <file path=customXml/item1.xml><?xml version="1.0" encoding="utf-8"?>
-<?mso-contentType ?>
-<FormTemplates xmlns="http://schemas.microsoft.com/sharepoint/v3/contenttype/forms">
-  <Display>DocumentLibraryForm</Display>
-  <Edit>DocumentLibraryForm</Edit>
-  <New>DocumentLibraryForm</New>
-</FormTemplates>
+<p:properties xmlns:p="http://schemas.microsoft.com/office/2006/metadata/properties" xmlns:xsi="http://www.w3.org/2001/XMLSchema-instance" xmlns:pc="http://schemas.microsoft.com/office/infopath/2007/PartnerControls">
+  <documentManagement>
+    <Branch xmlns="acbb3e5d-5d9a-41a2-b23c-a652c639d82c" xsi:nil="true"/>
+    <URL_x0020_of_x0020_the_x0020_document xmlns="acbb3e5d-5d9a-41a2-b23c-a652c639d82c">
+      <Url xsi:nil="true"/>
+      <Description xsi:nil="true"/>
+    </URL_x0020_of_x0020_the_x0020_document>
+    <Zone xmlns="acbb3e5d-5d9a-41a2-b23c-a652c639d82c">AE-VE</Zone>
+    <Last_x0020_Updates xmlns="acbb3e5d-5d9a-41a2-b23c-a652c639d82c" xsi:nil="true"/>
+    <URL xmlns="acbb3e5d-5d9a-41a2-b23c-a652c639d82c">
+      <Url xsi:nil="true"/>
+      <Description xsi:nil="true"/>
+    </URL>
+    <Type_x0020_of_x0020_Document xmlns="acbb3e5d-5d9a-41a2-b23c-a652c639d82c" xsi:nil="true"/>
+    <Language xmlns="acbb3e5d-5d9a-41a2-b23c-a652c639d82c">English</Language>
+  </documentManagement>
+</p:properties>
 </file>
 
 <file path=customXml/item2.xml><?xml version="1.0" encoding="utf-8"?>
@@ -6725,29 +6917,27 @@
 </file>
 
 <file path=customXml/item3.xml><?xml version="1.0" encoding="utf-8"?>
-<p:properties xmlns:p="http://schemas.microsoft.com/office/2006/metadata/properties" xmlns:xsi="http://www.w3.org/2001/XMLSchema-instance" xmlns:pc="http://schemas.microsoft.com/office/infopath/2007/PartnerControls">
-  <documentManagement>
-    <Branch xmlns="acbb3e5d-5d9a-41a2-b23c-a652c639d82c" xsi:nil="true"/>
-    <URL_x0020_of_x0020_the_x0020_document xmlns="acbb3e5d-5d9a-41a2-b23c-a652c639d82c">
-      <Url xsi:nil="true"/>
-      <Description xsi:nil="true"/>
-    </URL_x0020_of_x0020_the_x0020_document>
-    <Zone xmlns="acbb3e5d-5d9a-41a2-b23c-a652c639d82c">AE-VE</Zone>
-    <Last_x0020_Updates xmlns="acbb3e5d-5d9a-41a2-b23c-a652c639d82c" xsi:nil="true"/>
-    <URL xmlns="acbb3e5d-5d9a-41a2-b23c-a652c639d82c">
-      <Url xsi:nil="true"/>
-      <Description xsi:nil="true"/>
-    </URL>
-    <Type_x0020_of_x0020_Document xmlns="acbb3e5d-5d9a-41a2-b23c-a652c639d82c" xsi:nil="true"/>
-    <Language xmlns="acbb3e5d-5d9a-41a2-b23c-a652c639d82c">English</Language>
-  </documentManagement>
-</p:properties>
+<?mso-contentType ?>
+<FormTemplates xmlns="http://schemas.microsoft.com/sharepoint/v3/contenttype/forms">
+  <Display>DocumentLibraryForm</Display>
+  <Edit>DocumentLibraryForm</Edit>
+  <New>DocumentLibraryForm</New>
+</FormTemplates>
 </file>
 
 <file path=customXml/itemProps1.xml><?xml version="1.0" encoding="utf-8"?>
-<ds:datastoreItem xmlns:ds="http://schemas.openxmlformats.org/officeDocument/2006/customXml" ds:itemID="{3FEA80A5-E996-4AFB-AE99-8EED984C9B80}">
+<ds:datastoreItem xmlns:ds="http://schemas.openxmlformats.org/officeDocument/2006/customXml" ds:itemID="{D017B7C4-7C08-4A59-890F-4719C7EEBD0B}">
   <ds:schemaRefs>
-    <ds:schemaRef ds:uri="http://schemas.microsoft.com/sharepoint/v3/contenttype/forms"/>
+    <ds:schemaRef ds:uri="http://purl.org/dc/dcmitype/"/>
+    <ds:schemaRef ds:uri="http://schemas.openxmlformats.org/package/2006/metadata/core-properties"/>
+    <ds:schemaRef ds:uri="acbb3e5d-5d9a-41a2-b23c-a652c639d82c"/>
+    <ds:schemaRef ds:uri="http://purl.org/dc/elements/1.1/"/>
+    <ds:schemaRef ds:uri="http://schemas.microsoft.com/office/2006/metadata/properties"/>
+    <ds:schemaRef ds:uri="http://schemas.microsoft.com/office/2006/documentManagement/types"/>
+    <ds:schemaRef ds:uri="http://purl.org/dc/terms/"/>
+    <ds:schemaRef ds:uri="http://schemas.microsoft.com/office/infopath/2007/PartnerControls"/>
+    <ds:schemaRef ds:uri="b6e7370b-7179-4676-9a6f-0d2482e7e8cc"/>
+    <ds:schemaRef ds:uri="http://www.w3.org/XML/1998/namespace"/>
   </ds:schemaRefs>
 </ds:datastoreItem>
 </file>
@@ -6772,18 +6962,9 @@
 </file>
 
 <file path=customXml/itemProps3.xml><?xml version="1.0" encoding="utf-8"?>
-<ds:datastoreItem xmlns:ds="http://schemas.openxmlformats.org/officeDocument/2006/customXml" ds:itemID="{D017B7C4-7C08-4A59-890F-4719C7EEBD0B}">
+<ds:datastoreItem xmlns:ds="http://schemas.openxmlformats.org/officeDocument/2006/customXml" ds:itemID="{3FEA80A5-E996-4AFB-AE99-8EED984C9B80}">
   <ds:schemaRefs>
-    <ds:schemaRef ds:uri="http://purl.org/dc/dcmitype/"/>
-    <ds:schemaRef ds:uri="http://schemas.openxmlformats.org/package/2006/metadata/core-properties"/>
-    <ds:schemaRef ds:uri="acbb3e5d-5d9a-41a2-b23c-a652c639d82c"/>
-    <ds:schemaRef ds:uri="http://purl.org/dc/elements/1.1/"/>
-    <ds:schemaRef ds:uri="http://schemas.microsoft.com/office/2006/metadata/properties"/>
-    <ds:schemaRef ds:uri="http://schemas.microsoft.com/office/2006/documentManagement/types"/>
-    <ds:schemaRef ds:uri="http://purl.org/dc/terms/"/>
-    <ds:schemaRef ds:uri="http://schemas.microsoft.com/office/infopath/2007/PartnerControls"/>
-    <ds:schemaRef ds:uri="b6e7370b-7179-4676-9a6f-0d2482e7e8cc"/>
-    <ds:schemaRef ds:uri="http://www.w3.org/XML/1998/namespace"/>
+    <ds:schemaRef ds:uri="http://schemas.microsoft.com/sharepoint/v3/contenttype/forms"/>
   </ds:schemaRefs>
 </ds:datastoreItem>
 </file>
</xml_diff>